<commit_message>
Added order lineage function
</commit_message>
<xml_diff>
--- a/StockLoyal_DataFlow_Detailed.pptx
+++ b/StockLoyal_DataFlow_Detailed.pptx
@@ -8,7 +8,7 @@
     <p:notesMasterId r:id="rId5"/>
   </p:notesMasterIdLst>
   <p:sldIdLst>
-    <p:sldId id="258" r:id="rId2"/>
+    <p:sldId id="264" r:id="rId2"/>
     <p:sldId id="261" r:id="rId3"/>
     <p:sldId id="262" r:id="rId4"/>
   </p:sldIdLst>
@@ -2308,7 +2308,7 @@
             <a:buNone/>
           </a:pPr>
           <a:r>
-            <a:rPr lang="en-US" sz="1050" dirty="0">
+            <a:rPr lang="en-US" sz="1050">
               <a:latin typeface="Calibri" panose="020F0502020204030204"/>
               <a:ea typeface="+mn-ea"/>
               <a:cs typeface="+mn-cs"/>
@@ -2317,7 +2317,7 @@
 </a:t>
           </a:r>
           <a:r>
-            <a:rPr lang="en-US" sz="1050" b="1" dirty="0">
+            <a:rPr lang="en-US" sz="1050" b="1">
               <a:latin typeface="Calibri" panose="020F0502020204030204"/>
               <a:ea typeface="+mn-ea"/>
               <a:cs typeface="+mn-cs"/>
@@ -2325,7 +2325,7 @@
             <a:t>One-Time</a:t>
           </a:r>
           <a:r>
-            <a:rPr lang="en-US" sz="1050" dirty="0">
+            <a:rPr lang="en-US" sz="1050">
               <a:latin typeface="Calibri" panose="020F0502020204030204"/>
               <a:ea typeface="+mn-ea"/>
               <a:cs typeface="+mn-cs"/>
@@ -2335,7 +2335,7 @@
 </a:t>
           </a:r>
           <a:r>
-            <a:rPr lang="en-US" sz="1050" b="1" dirty="0">
+            <a:rPr lang="en-US" sz="1050" b="1">
               <a:latin typeface="Calibri" panose="020F0502020204030204"/>
               <a:ea typeface="+mn-ea"/>
               <a:cs typeface="+mn-cs"/>
@@ -2343,7 +2343,7 @@
             <a:t>Monthly</a:t>
           </a:r>
           <a:r>
-            <a:rPr lang="en-US" sz="1050" dirty="0">
+            <a:rPr lang="en-US" sz="1050">
               <a:latin typeface="Calibri" panose="020F0502020204030204"/>
               <a:ea typeface="+mn-ea"/>
               <a:cs typeface="+mn-cs"/>
@@ -2351,6 +2351,11 @@
             <a:t>, Recurring sweep process
 Executes when sufficient points are available</a:t>
           </a:r>
+          <a:endParaRPr lang="en-US" sz="1050" dirty="0">
+            <a:latin typeface="Calibri" panose="020F0502020204030204"/>
+            <a:ea typeface="+mn-ea"/>
+            <a:cs typeface="+mn-cs"/>
+          </a:endParaRPr>
         </a:p>
       </dgm:t>
     </dgm:pt>
@@ -2804,53 +2809,53 @@
   </dgm:ptLst>
   <dgm:cxnLst>
     <dgm:cxn modelId="{11829905-B4DB-4799-B4D3-03A24CCFFE19}" srcId="{54599F1E-9F16-45A0-B7A4-8B1E1A3BA92C}" destId="{B73B1238-7923-48C7-ABE9-FACBBB3832A7}" srcOrd="0" destOrd="0" parTransId="{10A1987A-D226-4C52-BA41-D89284095598}" sibTransId="{34E5E44F-CDAA-4BCB-B3F8-26B37AAAF740}"/>
-    <dgm:cxn modelId="{48465C0A-3FB0-42A2-BE9B-24128FD58321}" type="presOf" srcId="{54599F1E-9F16-45A0-B7A4-8B1E1A3BA92C}" destId="{D76D8A39-AFAB-4590-9ADA-70A843A078E6}" srcOrd="0" destOrd="0" presId="urn:microsoft.com/office/officeart/2016/7/layout/ChevronBlockProcess"/>
-    <dgm:cxn modelId="{E3EFDD0D-A51A-450C-9C1E-7A497853EA6F}" type="presOf" srcId="{B73B1238-7923-48C7-ABE9-FACBBB3832A7}" destId="{8EF171A3-6EBD-4520-9D64-FD9F390E1F97}" srcOrd="0" destOrd="0" presId="urn:microsoft.com/office/officeart/2016/7/layout/ChevronBlockProcess"/>
-    <dgm:cxn modelId="{48D6F810-FD6F-47B2-9254-4E34B74810A8}" type="presOf" srcId="{164F22A5-762B-4FAC-82CC-896C3F74798E}" destId="{8F47454C-CD4C-43AA-BAB1-888AE39FB8AE}" srcOrd="0" destOrd="0" presId="urn:microsoft.com/office/officeart/2016/7/layout/ChevronBlockProcess"/>
+    <dgm:cxn modelId="{DE5DC114-3BFB-4C27-8364-C24EB8A7F92C}" type="presOf" srcId="{B73B1238-7923-48C7-ABE9-FACBBB3832A7}" destId="{8EF171A3-6EBD-4520-9D64-FD9F390E1F97}" srcOrd="0" destOrd="0" presId="urn:microsoft.com/office/officeart/2016/7/layout/ChevronBlockProcess"/>
     <dgm:cxn modelId="{065EF615-78EE-4E9F-9D4F-B710F30A5468}" srcId="{FA5886CF-FD51-4E44-AD83-263774312FC7}" destId="{6CEFB56B-185C-4498-A5CF-7F9FD774AEE9}" srcOrd="0" destOrd="0" parTransId="{54375097-F752-4D17-90DD-CAFC058A0687}" sibTransId="{86F3C468-B52D-4E75-93A5-B7C113152FDE}"/>
+    <dgm:cxn modelId="{C02B0B20-D067-49AF-840A-8493EC6AE39C}" type="presOf" srcId="{6CEFB56B-185C-4498-A5CF-7F9FD774AEE9}" destId="{1A4602B5-3EA8-4E69-85C5-C39DCC9A1474}" srcOrd="0" destOrd="0" presId="urn:microsoft.com/office/officeart/2016/7/layout/ChevronBlockProcess"/>
     <dgm:cxn modelId="{2DF53028-2A18-4F86-AE85-D630E6E4BC83}" srcId="{B73B1238-7923-48C7-ABE9-FACBBB3832A7}" destId="{9E9DB2D8-3307-483E-A2F2-01A117A2DCD5}" srcOrd="0" destOrd="0" parTransId="{0F2643D4-9D26-426A-AB3B-B5C89018B4A7}" sibTransId="{699163D7-6CC3-453E-9CA1-63A0DC9C5BFF}"/>
-    <dgm:cxn modelId="{A5A0872E-5832-48EE-8B92-A7EFF3B0702B}" type="presOf" srcId="{9E9DB2D8-3307-483E-A2F2-01A117A2DCD5}" destId="{20D96762-97A0-470C-9FBB-632E6E27EFE9}" srcOrd="0" destOrd="0" presId="urn:microsoft.com/office/officeart/2016/7/layout/ChevronBlockProcess"/>
-    <dgm:cxn modelId="{280B5B32-9F62-4A35-AA1D-1B2996AB5D98}" type="presOf" srcId="{579AB975-B118-4E07-A06C-6B86D69C20CE}" destId="{61C35897-B2D8-4CF8-8744-3D042E4148E4}" srcOrd="0" destOrd="0" presId="urn:microsoft.com/office/officeart/2016/7/layout/ChevronBlockProcess"/>
+    <dgm:cxn modelId="{52C7F535-212C-400E-B7AD-377D81226578}" type="presOf" srcId="{164F22A5-762B-4FAC-82CC-896C3F74798E}" destId="{8F47454C-CD4C-43AA-BAB1-888AE39FB8AE}" srcOrd="0" destOrd="0" presId="urn:microsoft.com/office/officeart/2016/7/layout/ChevronBlockProcess"/>
     <dgm:cxn modelId="{CAD5585D-A026-4A17-BAB0-5DE75B595895}" srcId="{54599F1E-9F16-45A0-B7A4-8B1E1A3BA92C}" destId="{4B04FD52-8375-479F-80D5-E92F785095E6}" srcOrd="5" destOrd="0" parTransId="{1C62A4A5-3A94-4795-B21B-171B9ED3AA83}" sibTransId="{524C66BA-2E8F-42C5-A6DD-EEC623EADEE4}"/>
     <dgm:cxn modelId="{F52D785F-7A52-4C0D-B31C-E4F49FDC23C2}" srcId="{54599F1E-9F16-45A0-B7A4-8B1E1A3BA92C}" destId="{FA5886CF-FD51-4E44-AD83-263774312FC7}" srcOrd="2" destOrd="0" parTransId="{1370997F-5624-48AD-A9B0-A4AE9C593577}" sibTransId="{4745C1C1-D847-4A44-A276-F05D1976F4FF}"/>
+    <dgm:cxn modelId="{06F30543-C379-4F48-9452-6EE36202CFD6}" type="presOf" srcId="{579AB975-B118-4E07-A06C-6B86D69C20CE}" destId="{61C35897-B2D8-4CF8-8744-3D042E4148E4}" srcOrd="0" destOrd="0" presId="urn:microsoft.com/office/officeart/2016/7/layout/ChevronBlockProcess"/>
     <dgm:cxn modelId="{178FD743-A999-49B7-8E8E-01BC482ACB82}" srcId="{54599F1E-9F16-45A0-B7A4-8B1E1A3BA92C}" destId="{65C0A787-3CC5-424D-B175-F3D9E5EB30A5}" srcOrd="1" destOrd="0" parTransId="{8614B48E-2955-49F5-B7E3-AC013072F50F}" sibTransId="{BC45C334-BE47-47DF-8DD6-6211B4CA4C2A}"/>
     <dgm:cxn modelId="{B300C668-58B2-4014-990A-62942B0BADF5}" srcId="{54599F1E-9F16-45A0-B7A4-8B1E1A3BA92C}" destId="{164F22A5-762B-4FAC-82CC-896C3F74798E}" srcOrd="4" destOrd="0" parTransId="{8324E632-0A8F-4035-AE1A-5ACA9F50D783}" sibTransId="{CBC65CAE-3706-4222-8653-7113C9BF480F}"/>
     <dgm:cxn modelId="{E97B8D70-59FD-4A38-80CF-36DD5132673B}" srcId="{4B04FD52-8375-479F-80D5-E92F785095E6}" destId="{348C582F-8163-4F5D-9501-FA6406CC6B50}" srcOrd="0" destOrd="0" parTransId="{013A87C2-3F1B-4B75-BAF7-68BC40DD3852}" sibTransId="{8F975E85-664D-4E83-B204-FCC6DE8DA795}"/>
-    <dgm:cxn modelId="{AB88C970-EF55-403B-8DF4-93B7764D97AD}" type="presOf" srcId="{4B04FD52-8375-479F-80D5-E92F785095E6}" destId="{AC1B32DD-99DC-4BBC-B40E-D4107F6F543F}" srcOrd="0" destOrd="0" presId="urn:microsoft.com/office/officeart/2016/7/layout/ChevronBlockProcess"/>
     <dgm:cxn modelId="{47620875-9EB0-4F87-BCF9-95CFC78C0BA8}" srcId="{164F22A5-762B-4FAC-82CC-896C3F74798E}" destId="{4E42D4CE-47D6-4454-9E07-F2CD751F7210}" srcOrd="0" destOrd="0" parTransId="{9746F7E6-44A0-41B2-9980-7A1612C78A13}" sibTransId="{9230709E-2B60-4E94-A167-15C747583E3D}"/>
-    <dgm:cxn modelId="{2A50CA80-6EA6-47B7-AFC1-D7AA359228FF}" type="presOf" srcId="{FA5886CF-FD51-4E44-AD83-263774312FC7}" destId="{ADA6F0ED-BC77-443B-9E78-C088A566B8B3}" srcOrd="0" destOrd="0" presId="urn:microsoft.com/office/officeart/2016/7/layout/ChevronBlockProcess"/>
+    <dgm:cxn modelId="{10A8757C-C8D3-4703-861B-B5F446DCB9A9}" type="presOf" srcId="{FA5886CF-FD51-4E44-AD83-263774312FC7}" destId="{ADA6F0ED-BC77-443B-9E78-C088A566B8B3}" srcOrd="0" destOrd="0" presId="urn:microsoft.com/office/officeart/2016/7/layout/ChevronBlockProcess"/>
+    <dgm:cxn modelId="{6B489283-C029-4D4C-965B-27F114349C7A}" type="presOf" srcId="{EB07E3FC-8A45-42C4-AB09-4E42FB8C56F9}" destId="{02E8FB6B-C5B9-4806-B6A0-78B95474DA08}" srcOrd="0" destOrd="0" presId="urn:microsoft.com/office/officeart/2016/7/layout/ChevronBlockProcess"/>
+    <dgm:cxn modelId="{8A000184-92C9-4775-AB13-1D94C03F2A74}" type="presOf" srcId="{4B04FD52-8375-479F-80D5-E92F785095E6}" destId="{AC1B32DD-99DC-4BBC-B40E-D4107F6F543F}" srcOrd="0" destOrd="0" presId="urn:microsoft.com/office/officeart/2016/7/layout/ChevronBlockProcess"/>
     <dgm:cxn modelId="{A513A388-A9DD-4E46-A16F-8D5615FC35C9}" srcId="{54599F1E-9F16-45A0-B7A4-8B1E1A3BA92C}" destId="{579AB975-B118-4E07-A06C-6B86D69C20CE}" srcOrd="3" destOrd="0" parTransId="{CBEF76F3-2114-42EC-82B9-8B51B93AF6C5}" sibTransId="{FAB715FC-A1E2-4E3B-B7DF-2987C12AD6C5}"/>
     <dgm:cxn modelId="{5A3EE29B-ECB5-4A50-AE4F-DFB614874F55}" srcId="{579AB975-B118-4E07-A06C-6B86D69C20CE}" destId="{EB07E3FC-8A45-42C4-AB09-4E42FB8C56F9}" srcOrd="0" destOrd="0" parTransId="{F9EAB302-310D-4814-BAC3-BFE4BF9D317C}" sibTransId="{01038DEA-3A01-4463-BD06-FD921EFC8D17}"/>
-    <dgm:cxn modelId="{3ACD42BB-8188-4352-9ACA-CD09E5D8A7F1}" type="presOf" srcId="{6CEFB56B-185C-4498-A5CF-7F9FD774AEE9}" destId="{1A4602B5-3EA8-4E69-85C5-C39DCC9A1474}" srcOrd="0" destOrd="0" presId="urn:microsoft.com/office/officeart/2016/7/layout/ChevronBlockProcess"/>
-    <dgm:cxn modelId="{C73717C6-5682-4E44-BCBD-9CD417957A99}" type="presOf" srcId="{40F8A7C4-B85F-4483-A26E-BB926800E492}" destId="{1560CEEF-876F-42DB-8CFB-DEF1FD76DDCA}" srcOrd="0" destOrd="0" presId="urn:microsoft.com/office/officeart/2016/7/layout/ChevronBlockProcess"/>
-    <dgm:cxn modelId="{2A19C3C8-5ACE-4174-B338-8CD8A909E01C}" type="presOf" srcId="{4E42D4CE-47D6-4454-9E07-F2CD751F7210}" destId="{9EDB14A2-2BFD-42AF-97CD-17AFAD327B51}" srcOrd="0" destOrd="0" presId="urn:microsoft.com/office/officeart/2016/7/layout/ChevronBlockProcess"/>
-    <dgm:cxn modelId="{30BAF2E1-3D6C-407D-BB36-C6441520E6FE}" type="presOf" srcId="{348C582F-8163-4F5D-9501-FA6406CC6B50}" destId="{F0BDEB79-6224-40E1-B161-50D34EB6FB66}" srcOrd="0" destOrd="0" presId="urn:microsoft.com/office/officeart/2016/7/layout/ChevronBlockProcess"/>
-    <dgm:cxn modelId="{EFAC2AEB-E508-4CFB-9BA5-EFE4C44D4848}" type="presOf" srcId="{65C0A787-3CC5-424D-B175-F3D9E5EB30A5}" destId="{D734C0BC-C5A2-448A-BBF1-3B965B1DC6C5}" srcOrd="0" destOrd="0" presId="urn:microsoft.com/office/officeart/2016/7/layout/ChevronBlockProcess"/>
+    <dgm:cxn modelId="{C58F0AAE-1D09-4301-BE79-163FE113196A}" type="presOf" srcId="{54599F1E-9F16-45A0-B7A4-8B1E1A3BA92C}" destId="{D76D8A39-AFAB-4590-9ADA-70A843A078E6}" srcOrd="0" destOrd="0" presId="urn:microsoft.com/office/officeart/2016/7/layout/ChevronBlockProcess"/>
+    <dgm:cxn modelId="{E64C7AAE-C5FD-4499-9D74-560BF4EF4350}" type="presOf" srcId="{9E9DB2D8-3307-483E-A2F2-01A117A2DCD5}" destId="{20D96762-97A0-470C-9FBB-632E6E27EFE9}" srcOrd="0" destOrd="0" presId="urn:microsoft.com/office/officeart/2016/7/layout/ChevronBlockProcess"/>
+    <dgm:cxn modelId="{3761FFC9-1539-45EE-BD6C-BE4ADE9F9963}" type="presOf" srcId="{65C0A787-3CC5-424D-B175-F3D9E5EB30A5}" destId="{D734C0BC-C5A2-448A-BBF1-3B965B1DC6C5}" srcOrd="0" destOrd="0" presId="urn:microsoft.com/office/officeart/2016/7/layout/ChevronBlockProcess"/>
+    <dgm:cxn modelId="{4A2796CE-71CB-4967-8078-75AD1AAB8EF1}" type="presOf" srcId="{4E42D4CE-47D6-4454-9E07-F2CD751F7210}" destId="{9EDB14A2-2BFD-42AF-97CD-17AFAD327B51}" srcOrd="0" destOrd="0" presId="urn:microsoft.com/office/officeart/2016/7/layout/ChevronBlockProcess"/>
+    <dgm:cxn modelId="{514598D2-4AB4-4ACE-9650-0B4B509ECB65}" type="presOf" srcId="{40F8A7C4-B85F-4483-A26E-BB926800E492}" destId="{1560CEEF-876F-42DB-8CFB-DEF1FD76DDCA}" srcOrd="0" destOrd="0" presId="urn:microsoft.com/office/officeart/2016/7/layout/ChevronBlockProcess"/>
     <dgm:cxn modelId="{4965DBEC-D267-4755-B2B0-80DB81ACE87E}" srcId="{65C0A787-3CC5-424D-B175-F3D9E5EB30A5}" destId="{40F8A7C4-B85F-4483-A26E-BB926800E492}" srcOrd="0" destOrd="0" parTransId="{89FF5F54-3575-41BC-85E1-F0CC2AB848D5}" sibTransId="{DF0CF934-6E23-49C4-8EB9-5CD05FC322DE}"/>
-    <dgm:cxn modelId="{A2677CFB-3E0F-4F26-9B11-C4D6294C62CC}" type="presOf" srcId="{EB07E3FC-8A45-42C4-AB09-4E42FB8C56F9}" destId="{02E8FB6B-C5B9-4806-B6A0-78B95474DA08}" srcOrd="0" destOrd="0" presId="urn:microsoft.com/office/officeart/2016/7/layout/ChevronBlockProcess"/>
-    <dgm:cxn modelId="{6D552D0F-AC3B-44E1-896A-208D099C8E4C}" type="presParOf" srcId="{D76D8A39-AFAB-4590-9ADA-70A843A078E6}" destId="{CB6424A0-B346-4473-A5EC-B6CE292A004A}" srcOrd="0" destOrd="0" presId="urn:microsoft.com/office/officeart/2016/7/layout/ChevronBlockProcess"/>
-    <dgm:cxn modelId="{601F89AF-42CE-4A3E-9E47-33BCEEB87995}" type="presParOf" srcId="{CB6424A0-B346-4473-A5EC-B6CE292A004A}" destId="{8EF171A3-6EBD-4520-9D64-FD9F390E1F97}" srcOrd="0" destOrd="0" presId="urn:microsoft.com/office/officeart/2016/7/layout/ChevronBlockProcess"/>
-    <dgm:cxn modelId="{9670BB05-3354-4B63-B706-361CE54F19FE}" type="presParOf" srcId="{CB6424A0-B346-4473-A5EC-B6CE292A004A}" destId="{20D96762-97A0-470C-9FBB-632E6E27EFE9}" srcOrd="1" destOrd="0" presId="urn:microsoft.com/office/officeart/2016/7/layout/ChevronBlockProcess"/>
-    <dgm:cxn modelId="{ECE106F0-F5E9-4665-8555-C4936BEAE6B5}" type="presParOf" srcId="{D76D8A39-AFAB-4590-9ADA-70A843A078E6}" destId="{A0D78A87-978D-4F60-8D80-3E972265E049}" srcOrd="1" destOrd="0" presId="urn:microsoft.com/office/officeart/2016/7/layout/ChevronBlockProcess"/>
-    <dgm:cxn modelId="{33E60F37-C9C5-45AA-8CD0-B0745B0600B3}" type="presParOf" srcId="{D76D8A39-AFAB-4590-9ADA-70A843A078E6}" destId="{7DE0A340-A41F-4F07-8CDC-E5A799487704}" srcOrd="2" destOrd="0" presId="urn:microsoft.com/office/officeart/2016/7/layout/ChevronBlockProcess"/>
-    <dgm:cxn modelId="{56463461-24D6-451E-9646-622D1251722C}" type="presParOf" srcId="{7DE0A340-A41F-4F07-8CDC-E5A799487704}" destId="{D734C0BC-C5A2-448A-BBF1-3B965B1DC6C5}" srcOrd="0" destOrd="0" presId="urn:microsoft.com/office/officeart/2016/7/layout/ChevronBlockProcess"/>
-    <dgm:cxn modelId="{55754E29-BEBF-4681-9D83-433722D7498B}" type="presParOf" srcId="{7DE0A340-A41F-4F07-8CDC-E5A799487704}" destId="{1560CEEF-876F-42DB-8CFB-DEF1FD76DDCA}" srcOrd="1" destOrd="0" presId="urn:microsoft.com/office/officeart/2016/7/layout/ChevronBlockProcess"/>
-    <dgm:cxn modelId="{00AD310D-9CFE-43C3-A0E0-1D15B8152546}" type="presParOf" srcId="{D76D8A39-AFAB-4590-9ADA-70A843A078E6}" destId="{43CBCE8C-F959-43F9-A5BE-0761AAA1DDC7}" srcOrd="3" destOrd="0" presId="urn:microsoft.com/office/officeart/2016/7/layout/ChevronBlockProcess"/>
-    <dgm:cxn modelId="{16B65CFD-2F29-4B6C-BEF2-D0ABFEF165A6}" type="presParOf" srcId="{D76D8A39-AFAB-4590-9ADA-70A843A078E6}" destId="{0FD9C0F9-E93A-4955-9282-CECCC2AEC547}" srcOrd="4" destOrd="0" presId="urn:microsoft.com/office/officeart/2016/7/layout/ChevronBlockProcess"/>
-    <dgm:cxn modelId="{D3F5F4ED-A7E6-41F3-B511-334924AC808F}" type="presParOf" srcId="{0FD9C0F9-E93A-4955-9282-CECCC2AEC547}" destId="{ADA6F0ED-BC77-443B-9E78-C088A566B8B3}" srcOrd="0" destOrd="0" presId="urn:microsoft.com/office/officeart/2016/7/layout/ChevronBlockProcess"/>
-    <dgm:cxn modelId="{C37C1387-58B3-42C9-AF4D-C71DAB126605}" type="presParOf" srcId="{0FD9C0F9-E93A-4955-9282-CECCC2AEC547}" destId="{1A4602B5-3EA8-4E69-85C5-C39DCC9A1474}" srcOrd="1" destOrd="0" presId="urn:microsoft.com/office/officeart/2016/7/layout/ChevronBlockProcess"/>
-    <dgm:cxn modelId="{287C80BF-426E-461E-B84F-E62BEE36101A}" type="presParOf" srcId="{D76D8A39-AFAB-4590-9ADA-70A843A078E6}" destId="{7379480E-E044-4951-B491-CE8318F73F9A}" srcOrd="5" destOrd="0" presId="urn:microsoft.com/office/officeart/2016/7/layout/ChevronBlockProcess"/>
-    <dgm:cxn modelId="{A39000CB-B3A0-4C7A-A207-673FB0FEA3D4}" type="presParOf" srcId="{D76D8A39-AFAB-4590-9ADA-70A843A078E6}" destId="{551BBA4A-4A70-4B46-A27F-FA6EC5392F24}" srcOrd="6" destOrd="0" presId="urn:microsoft.com/office/officeart/2016/7/layout/ChevronBlockProcess"/>
-    <dgm:cxn modelId="{0F6A77A6-6E38-4DC2-8AEA-419057332577}" type="presParOf" srcId="{551BBA4A-4A70-4B46-A27F-FA6EC5392F24}" destId="{61C35897-B2D8-4CF8-8744-3D042E4148E4}" srcOrd="0" destOrd="0" presId="urn:microsoft.com/office/officeart/2016/7/layout/ChevronBlockProcess"/>
-    <dgm:cxn modelId="{F3FCA97E-55DF-4074-AECC-1D4C406289CB}" type="presParOf" srcId="{551BBA4A-4A70-4B46-A27F-FA6EC5392F24}" destId="{02E8FB6B-C5B9-4806-B6A0-78B95474DA08}" srcOrd="1" destOrd="0" presId="urn:microsoft.com/office/officeart/2016/7/layout/ChevronBlockProcess"/>
-    <dgm:cxn modelId="{5CB20722-318A-46BD-9DCE-6C0C9D29EE07}" type="presParOf" srcId="{D76D8A39-AFAB-4590-9ADA-70A843A078E6}" destId="{101C216D-91BE-4D45-B559-F56C2FB989F9}" srcOrd="7" destOrd="0" presId="urn:microsoft.com/office/officeart/2016/7/layout/ChevronBlockProcess"/>
-    <dgm:cxn modelId="{D1DED183-B78E-4872-B0B8-D3A359758888}" type="presParOf" srcId="{D76D8A39-AFAB-4590-9ADA-70A843A078E6}" destId="{4B39860A-E013-4F37-A973-5081EEF8809F}" srcOrd="8" destOrd="0" presId="urn:microsoft.com/office/officeart/2016/7/layout/ChevronBlockProcess"/>
-    <dgm:cxn modelId="{885493B3-0F60-4187-B9BE-AB8187ED29B7}" type="presParOf" srcId="{4B39860A-E013-4F37-A973-5081EEF8809F}" destId="{8F47454C-CD4C-43AA-BAB1-888AE39FB8AE}" srcOrd="0" destOrd="0" presId="urn:microsoft.com/office/officeart/2016/7/layout/ChevronBlockProcess"/>
-    <dgm:cxn modelId="{A120CB96-3E60-4CBA-871F-37836FB3E451}" type="presParOf" srcId="{4B39860A-E013-4F37-A973-5081EEF8809F}" destId="{9EDB14A2-2BFD-42AF-97CD-17AFAD327B51}" srcOrd="1" destOrd="0" presId="urn:microsoft.com/office/officeart/2016/7/layout/ChevronBlockProcess"/>
-    <dgm:cxn modelId="{0BCD52FB-12D3-45E2-952A-CFAC0D650BA7}" type="presParOf" srcId="{D76D8A39-AFAB-4590-9ADA-70A843A078E6}" destId="{1765C3DA-065D-4DA8-8F2F-75721833DB02}" srcOrd="9" destOrd="0" presId="urn:microsoft.com/office/officeart/2016/7/layout/ChevronBlockProcess"/>
-    <dgm:cxn modelId="{695A7168-BFB1-4F02-B393-D03CB4945875}" type="presParOf" srcId="{D76D8A39-AFAB-4590-9ADA-70A843A078E6}" destId="{C2426B30-CBE6-45FF-811F-2CDA2EA8FA9E}" srcOrd="10" destOrd="0" presId="urn:microsoft.com/office/officeart/2016/7/layout/ChevronBlockProcess"/>
-    <dgm:cxn modelId="{F92A7ED9-AC66-48D9-A495-BF8205B7FC87}" type="presParOf" srcId="{C2426B30-CBE6-45FF-811F-2CDA2EA8FA9E}" destId="{AC1B32DD-99DC-4BBC-B40E-D4107F6F543F}" srcOrd="0" destOrd="0" presId="urn:microsoft.com/office/officeart/2016/7/layout/ChevronBlockProcess"/>
-    <dgm:cxn modelId="{260D2B61-1C9C-4502-9430-705BF84B8AF5}" type="presParOf" srcId="{C2426B30-CBE6-45FF-811F-2CDA2EA8FA9E}" destId="{F0BDEB79-6224-40E1-B161-50D34EB6FB66}" srcOrd="1" destOrd="0" presId="urn:microsoft.com/office/officeart/2016/7/layout/ChevronBlockProcess"/>
+    <dgm:cxn modelId="{776ECBF6-179B-485E-AA86-3513FCEE4654}" type="presOf" srcId="{348C582F-8163-4F5D-9501-FA6406CC6B50}" destId="{F0BDEB79-6224-40E1-B161-50D34EB6FB66}" srcOrd="0" destOrd="0" presId="urn:microsoft.com/office/officeart/2016/7/layout/ChevronBlockProcess"/>
+    <dgm:cxn modelId="{9C0EBB3A-BB64-4328-88B9-61EEEF704E56}" type="presParOf" srcId="{D76D8A39-AFAB-4590-9ADA-70A843A078E6}" destId="{CB6424A0-B346-4473-A5EC-B6CE292A004A}" srcOrd="0" destOrd="0" presId="urn:microsoft.com/office/officeart/2016/7/layout/ChevronBlockProcess"/>
+    <dgm:cxn modelId="{6BEFAF67-0D15-4F7A-80E9-0DD046FA5F13}" type="presParOf" srcId="{CB6424A0-B346-4473-A5EC-B6CE292A004A}" destId="{8EF171A3-6EBD-4520-9D64-FD9F390E1F97}" srcOrd="0" destOrd="0" presId="urn:microsoft.com/office/officeart/2016/7/layout/ChevronBlockProcess"/>
+    <dgm:cxn modelId="{3964B436-C118-4C7C-A5E4-D586968C1A4F}" type="presParOf" srcId="{CB6424A0-B346-4473-A5EC-B6CE292A004A}" destId="{20D96762-97A0-470C-9FBB-632E6E27EFE9}" srcOrd="1" destOrd="0" presId="urn:microsoft.com/office/officeart/2016/7/layout/ChevronBlockProcess"/>
+    <dgm:cxn modelId="{C6066399-7843-41E2-9CF2-B469FFF41C1E}" type="presParOf" srcId="{D76D8A39-AFAB-4590-9ADA-70A843A078E6}" destId="{A0D78A87-978D-4F60-8D80-3E972265E049}" srcOrd="1" destOrd="0" presId="urn:microsoft.com/office/officeart/2016/7/layout/ChevronBlockProcess"/>
+    <dgm:cxn modelId="{34F230DC-E2AA-427C-907C-09CE584ACFDF}" type="presParOf" srcId="{D76D8A39-AFAB-4590-9ADA-70A843A078E6}" destId="{7DE0A340-A41F-4F07-8CDC-E5A799487704}" srcOrd="2" destOrd="0" presId="urn:microsoft.com/office/officeart/2016/7/layout/ChevronBlockProcess"/>
+    <dgm:cxn modelId="{A0FDE8EE-DD13-40E0-83F6-D99D025C004C}" type="presParOf" srcId="{7DE0A340-A41F-4F07-8CDC-E5A799487704}" destId="{D734C0BC-C5A2-448A-BBF1-3B965B1DC6C5}" srcOrd="0" destOrd="0" presId="urn:microsoft.com/office/officeart/2016/7/layout/ChevronBlockProcess"/>
+    <dgm:cxn modelId="{5E9D7057-2FAB-4BA2-8400-2211BE56F624}" type="presParOf" srcId="{7DE0A340-A41F-4F07-8CDC-E5A799487704}" destId="{1560CEEF-876F-42DB-8CFB-DEF1FD76DDCA}" srcOrd="1" destOrd="0" presId="urn:microsoft.com/office/officeart/2016/7/layout/ChevronBlockProcess"/>
+    <dgm:cxn modelId="{A23F3F16-F2D3-4169-A7E5-2B7F52BA50E3}" type="presParOf" srcId="{D76D8A39-AFAB-4590-9ADA-70A843A078E6}" destId="{43CBCE8C-F959-43F9-A5BE-0761AAA1DDC7}" srcOrd="3" destOrd="0" presId="urn:microsoft.com/office/officeart/2016/7/layout/ChevronBlockProcess"/>
+    <dgm:cxn modelId="{76EC8292-551A-4315-9BF5-368734B77CFA}" type="presParOf" srcId="{D76D8A39-AFAB-4590-9ADA-70A843A078E6}" destId="{0FD9C0F9-E93A-4955-9282-CECCC2AEC547}" srcOrd="4" destOrd="0" presId="urn:microsoft.com/office/officeart/2016/7/layout/ChevronBlockProcess"/>
+    <dgm:cxn modelId="{3D0F5105-E9F8-4DDD-96B3-37FE3628EE86}" type="presParOf" srcId="{0FD9C0F9-E93A-4955-9282-CECCC2AEC547}" destId="{ADA6F0ED-BC77-443B-9E78-C088A566B8B3}" srcOrd="0" destOrd="0" presId="urn:microsoft.com/office/officeart/2016/7/layout/ChevronBlockProcess"/>
+    <dgm:cxn modelId="{4D90157C-EFBE-47D5-8FE6-9BC6AEC2C9C9}" type="presParOf" srcId="{0FD9C0F9-E93A-4955-9282-CECCC2AEC547}" destId="{1A4602B5-3EA8-4E69-85C5-C39DCC9A1474}" srcOrd="1" destOrd="0" presId="urn:microsoft.com/office/officeart/2016/7/layout/ChevronBlockProcess"/>
+    <dgm:cxn modelId="{2230F538-4FB5-4E95-AC08-40AC0F10CF69}" type="presParOf" srcId="{D76D8A39-AFAB-4590-9ADA-70A843A078E6}" destId="{7379480E-E044-4951-B491-CE8318F73F9A}" srcOrd="5" destOrd="0" presId="urn:microsoft.com/office/officeart/2016/7/layout/ChevronBlockProcess"/>
+    <dgm:cxn modelId="{F812D07C-720F-405E-AE0A-BC313565F351}" type="presParOf" srcId="{D76D8A39-AFAB-4590-9ADA-70A843A078E6}" destId="{551BBA4A-4A70-4B46-A27F-FA6EC5392F24}" srcOrd="6" destOrd="0" presId="urn:microsoft.com/office/officeart/2016/7/layout/ChevronBlockProcess"/>
+    <dgm:cxn modelId="{81B0932E-5807-4A8D-87B9-24C92F5F987F}" type="presParOf" srcId="{551BBA4A-4A70-4B46-A27F-FA6EC5392F24}" destId="{61C35897-B2D8-4CF8-8744-3D042E4148E4}" srcOrd="0" destOrd="0" presId="urn:microsoft.com/office/officeart/2016/7/layout/ChevronBlockProcess"/>
+    <dgm:cxn modelId="{2B52BE42-1084-4E90-BF5D-2E0B68A5A394}" type="presParOf" srcId="{551BBA4A-4A70-4B46-A27F-FA6EC5392F24}" destId="{02E8FB6B-C5B9-4806-B6A0-78B95474DA08}" srcOrd="1" destOrd="0" presId="urn:microsoft.com/office/officeart/2016/7/layout/ChevronBlockProcess"/>
+    <dgm:cxn modelId="{167567A1-97D5-4952-B707-B3EA6096B366}" type="presParOf" srcId="{D76D8A39-AFAB-4590-9ADA-70A843A078E6}" destId="{101C216D-91BE-4D45-B559-F56C2FB989F9}" srcOrd="7" destOrd="0" presId="urn:microsoft.com/office/officeart/2016/7/layout/ChevronBlockProcess"/>
+    <dgm:cxn modelId="{A618356B-34C6-4A47-8CB5-58C2A0E8661F}" type="presParOf" srcId="{D76D8A39-AFAB-4590-9ADA-70A843A078E6}" destId="{4B39860A-E013-4F37-A973-5081EEF8809F}" srcOrd="8" destOrd="0" presId="urn:microsoft.com/office/officeart/2016/7/layout/ChevronBlockProcess"/>
+    <dgm:cxn modelId="{46ED8380-5298-416B-94F0-15155973EEBF}" type="presParOf" srcId="{4B39860A-E013-4F37-A973-5081EEF8809F}" destId="{8F47454C-CD4C-43AA-BAB1-888AE39FB8AE}" srcOrd="0" destOrd="0" presId="urn:microsoft.com/office/officeart/2016/7/layout/ChevronBlockProcess"/>
+    <dgm:cxn modelId="{FA68C6BF-7545-4FCB-B952-EDC1D8A77EBB}" type="presParOf" srcId="{4B39860A-E013-4F37-A973-5081EEF8809F}" destId="{9EDB14A2-2BFD-42AF-97CD-17AFAD327B51}" srcOrd="1" destOrd="0" presId="urn:microsoft.com/office/officeart/2016/7/layout/ChevronBlockProcess"/>
+    <dgm:cxn modelId="{0AC876A9-F54F-47D9-9B28-A7127C5AEB8F}" type="presParOf" srcId="{D76D8A39-AFAB-4590-9ADA-70A843A078E6}" destId="{1765C3DA-065D-4DA8-8F2F-75721833DB02}" srcOrd="9" destOrd="0" presId="urn:microsoft.com/office/officeart/2016/7/layout/ChevronBlockProcess"/>
+    <dgm:cxn modelId="{B133939C-6D41-44EF-8422-B0626A8C4022}" type="presParOf" srcId="{D76D8A39-AFAB-4590-9ADA-70A843A078E6}" destId="{C2426B30-CBE6-45FF-811F-2CDA2EA8FA9E}" srcOrd="10" destOrd="0" presId="urn:microsoft.com/office/officeart/2016/7/layout/ChevronBlockProcess"/>
+    <dgm:cxn modelId="{7EB944A3-7474-4FE6-A44F-2AEE5BB56097}" type="presParOf" srcId="{C2426B30-CBE6-45FF-811F-2CDA2EA8FA9E}" destId="{AC1B32DD-99DC-4BBC-B40E-D4107F6F543F}" srcOrd="0" destOrd="0" presId="urn:microsoft.com/office/officeart/2016/7/layout/ChevronBlockProcess"/>
+    <dgm:cxn modelId="{94E0A838-B542-4FBD-93C0-2E6E943001B6}" type="presParOf" srcId="{C2426B30-CBE6-45FF-811F-2CDA2EA8FA9E}" destId="{F0BDEB79-6224-40E1-B161-50D34EB6FB66}" srcOrd="1" destOrd="0" presId="urn:microsoft.com/office/officeart/2016/7/layout/ChevronBlockProcess"/>
   </dgm:cxnLst>
   <dgm:bg/>
   <dgm:whole/>
@@ -2883,11 +2888,6 @@
           <a:off x="4688" y="169"/>
           <a:ext cx="1156866" cy="347059"/>
         </a:xfrm>
-        <a:prstGeom prst="chevron">
-          <a:avLst>
-            <a:gd name="adj" fmla="val 30000"/>
-          </a:avLst>
-        </a:prstGeom>
         <a:solidFill>
           <a:srgbClr val="ED7D31">
             <a:hueOff val="0"/>
@@ -2918,7 +2918,7 @@
             <a:buNone/>
           </a:pPr>
           <a:r>
-            <a:rPr lang="en-US" sz="1050" dirty="0">
+            <a:rPr lang="en-US" sz="1050">
               <a:solidFill>
                 <a:sysClr val="window" lastClr="FFFFFF"/>
               </a:solidFill>
@@ -2928,6 +2928,14 @@
             </a:rPr>
             <a:t>Prepare</a:t>
           </a:r>
+          <a:endParaRPr lang="en-US" sz="1050" dirty="0">
+            <a:solidFill>
+              <a:sysClr val="window" lastClr="FFFFFF"/>
+            </a:solidFill>
+            <a:latin typeface="Calibri" panose="020F0502020204030204"/>
+            <a:ea typeface="+mn-ea"/>
+            <a:cs typeface="+mn-cs"/>
+          </a:endParaRPr>
         </a:p>
       </dgm:t>
     </dgm:pt>
@@ -2960,9 +2968,6 @@
           <a:off x="4688" y="347229"/>
           <a:ext cx="1052748" cy="2916104"/>
         </a:xfrm>
-        <a:prstGeom prst="rect">
-          <a:avLst/>
-        </a:prstGeom>
         <a:solidFill>
           <a:srgbClr val="ED7D31">
             <a:tint val="40000"/>
@@ -2997,7 +3002,7 @@
             <a:buNone/>
           </a:pPr>
           <a:r>
-            <a:rPr lang="en-US" sz="900" dirty="0">
+            <a:rPr lang="en-US" sz="900">
               <a:solidFill>
                 <a:sysClr val="windowText" lastClr="000000">
                   <a:hueOff val="0"/>
@@ -3017,7 +3022,7 @@
 Orders marked</a:t>
           </a:r>
           <a:r>
-            <a:rPr lang="en-US" sz="900" b="1" dirty="0">
+            <a:rPr lang="en-US" sz="900" b="1">
               <a:solidFill>
                 <a:sysClr val="windowText" lastClr="000000">
                   <a:hueOff val="0"/>
@@ -3032,6 +3037,19 @@
             </a:rPr>
             <a:t> Pending</a:t>
           </a:r>
+          <a:endParaRPr lang="en-US" sz="900" b="1" dirty="0">
+            <a:solidFill>
+              <a:sysClr val="windowText" lastClr="000000">
+                <a:hueOff val="0"/>
+                <a:satOff val="0"/>
+                <a:lumOff val="0"/>
+                <a:alphaOff val="0"/>
+              </a:sysClr>
+            </a:solidFill>
+            <a:latin typeface="Calibri" panose="020F0502020204030204"/>
+            <a:ea typeface="+mn-ea"/>
+            <a:cs typeface="+mn-cs"/>
+          </a:endParaRPr>
         </a:p>
       </dgm:t>
     </dgm:pt>
@@ -3064,9 +3082,6 @@
           <a:off x="4688" y="347229"/>
           <a:ext cx="1052748" cy="2916104"/>
         </a:xfrm>
-        <a:prstGeom prst="rect">
-          <a:avLst/>
-        </a:prstGeom>
         <a:solidFill>
           <a:srgbClr val="ED7D31">
             <a:tint val="40000"/>
@@ -3101,7 +3116,7 @@
             <a:buNone/>
           </a:pPr>
           <a:r>
-            <a:rPr lang="en-US" sz="900" dirty="0">
+            <a:rPr lang="en-US" sz="900">
               <a:solidFill>
                 <a:sysClr val="windowText" lastClr="000000">
                   <a:hueOff val="0"/>
@@ -3116,6 +3131,19 @@
             </a:rPr>
             <a:t>Investment percentage applied to loyalty balance</a:t>
           </a:r>
+          <a:endParaRPr lang="en-US" sz="900" dirty="0">
+            <a:solidFill>
+              <a:sysClr val="windowText" lastClr="000000">
+                <a:hueOff val="0"/>
+                <a:satOff val="0"/>
+                <a:lumOff val="0"/>
+                <a:alphaOff val="0"/>
+              </a:sysClr>
+            </a:solidFill>
+            <a:latin typeface="Calibri" panose="020F0502020204030204"/>
+            <a:ea typeface="+mn-ea"/>
+            <a:cs typeface="+mn-cs"/>
+          </a:endParaRPr>
         </a:p>
       </dgm:t>
     </dgm:pt>
@@ -3148,9 +3176,6 @@
           <a:off x="4688" y="347229"/>
           <a:ext cx="1052748" cy="2916104"/>
         </a:xfrm>
-        <a:prstGeom prst="rect">
-          <a:avLst/>
-        </a:prstGeom>
         <a:solidFill>
           <a:srgbClr val="ED7D31">
             <a:tint val="40000"/>
@@ -3185,7 +3210,7 @@
             <a:buNone/>
           </a:pPr>
           <a:r>
-            <a:rPr lang="en-US" sz="900" dirty="0">
+            <a:rPr lang="en-US" sz="900">
               <a:solidFill>
                 <a:sysClr val="windowText" lastClr="000000">
                   <a:hueOff val="0"/>
@@ -3200,6 +3225,19 @@
             </a:rPr>
             <a:t>Member selects securities in My Basket</a:t>
           </a:r>
+          <a:endParaRPr lang="en-US" sz="900" dirty="0">
+            <a:solidFill>
+              <a:sysClr val="windowText" lastClr="000000">
+                <a:hueOff val="0"/>
+                <a:satOff val="0"/>
+                <a:lumOff val="0"/>
+                <a:alphaOff val="0"/>
+              </a:sysClr>
+            </a:solidFill>
+            <a:latin typeface="Calibri" panose="020F0502020204030204"/>
+            <a:ea typeface="+mn-ea"/>
+            <a:cs typeface="+mn-cs"/>
+          </a:endParaRPr>
         </a:p>
       </dgm:t>
     </dgm:pt>
@@ -3232,11 +3270,6 @@
           <a:off x="1122198" y="169"/>
           <a:ext cx="1156866" cy="347059"/>
         </a:xfrm>
-        <a:prstGeom prst="chevron">
-          <a:avLst>
-            <a:gd name="adj" fmla="val 30000"/>
-          </a:avLst>
-        </a:prstGeom>
         <a:solidFill>
           <a:srgbClr val="A5A5A5">
             <a:hueOff val="0"/>
@@ -3267,7 +3300,7 @@
             <a:buNone/>
           </a:pPr>
           <a:r>
-            <a:rPr lang="en-US" sz="1050" dirty="0">
+            <a:rPr lang="en-US" sz="1050">
               <a:solidFill>
                 <a:sysClr val="window" lastClr="FFFFFF"/>
               </a:solidFill>
@@ -3277,6 +3310,14 @@
             </a:rPr>
             <a:t>Reserve Points</a:t>
           </a:r>
+          <a:endParaRPr lang="en-US" sz="1050" dirty="0">
+            <a:solidFill>
+              <a:sysClr val="window" lastClr="FFFFFF"/>
+            </a:solidFill>
+            <a:latin typeface="Calibri" panose="020F0502020204030204"/>
+            <a:ea typeface="+mn-ea"/>
+            <a:cs typeface="+mn-cs"/>
+          </a:endParaRPr>
         </a:p>
       </dgm:t>
     </dgm:pt>
@@ -3309,9 +3350,6 @@
           <a:off x="1122198" y="347229"/>
           <a:ext cx="1052748" cy="2916104"/>
         </a:xfrm>
-        <a:prstGeom prst="rect">
-          <a:avLst/>
-        </a:prstGeom>
         <a:solidFill>
           <a:srgbClr val="A5A5A5">
             <a:tint val="40000"/>
@@ -3346,7 +3384,7 @@
             <a:buNone/>
           </a:pPr>
           <a:r>
-            <a:rPr lang="en-US" sz="900" dirty="0">
+            <a:rPr lang="en-US" sz="900">
               <a:solidFill>
                 <a:sysClr val="windowText" lastClr="000000">
                   <a:hueOff val="0"/>
@@ -3365,6 +3403,19 @@
 Points status updated to Reserved
 Prevents double-spend or race conditions</a:t>
           </a:r>
+          <a:endParaRPr lang="en-US" sz="900" dirty="0">
+            <a:solidFill>
+              <a:sysClr val="windowText" lastClr="000000">
+                <a:hueOff val="0"/>
+                <a:satOff val="0"/>
+                <a:lumOff val="0"/>
+                <a:alphaOff val="0"/>
+              </a:sysClr>
+            </a:solidFill>
+            <a:latin typeface="Calibri" panose="020F0502020204030204"/>
+            <a:ea typeface="+mn-ea"/>
+            <a:cs typeface="+mn-cs"/>
+          </a:endParaRPr>
         </a:p>
       </dgm:t>
     </dgm:pt>
@@ -3397,11 +3448,6 @@
           <a:off x="2239708" y="169"/>
           <a:ext cx="1156866" cy="347059"/>
         </a:xfrm>
-        <a:prstGeom prst="chevron">
-          <a:avLst>
-            <a:gd name="adj" fmla="val 30000"/>
-          </a:avLst>
-        </a:prstGeom>
         <a:solidFill>
           <a:srgbClr val="FFC000">
             <a:hueOff val="0"/>
@@ -3432,7 +3478,7 @@
             <a:buNone/>
           </a:pPr>
           <a:r>
-            <a:rPr lang="en-US" sz="1050" dirty="0">
+            <a:rPr lang="en-US" sz="1050">
               <a:solidFill>
                 <a:sysClr val="window" lastClr="FFFFFF"/>
               </a:solidFill>
@@ -3442,6 +3488,14 @@
             </a:rPr>
             <a:t>Sweep (Order Submission)</a:t>
           </a:r>
+          <a:endParaRPr lang="en-US" sz="1050" dirty="0">
+            <a:solidFill>
+              <a:sysClr val="window" lastClr="FFFFFF"/>
+            </a:solidFill>
+            <a:latin typeface="Calibri" panose="020F0502020204030204"/>
+            <a:ea typeface="+mn-ea"/>
+            <a:cs typeface="+mn-cs"/>
+          </a:endParaRPr>
         </a:p>
       </dgm:t>
     </dgm:pt>
@@ -3474,9 +3528,6 @@
           <a:off x="2239708" y="347229"/>
           <a:ext cx="1052748" cy="2916104"/>
         </a:xfrm>
-        <a:prstGeom prst="rect">
-          <a:avLst/>
-        </a:prstGeom>
         <a:solidFill>
           <a:srgbClr val="FFC000">
             <a:tint val="40000"/>
@@ -3511,7 +3562,7 @@
             <a:buNone/>
           </a:pPr>
           <a:r>
-            <a:rPr lang="en-US" sz="900" dirty="0">
+            <a:rPr lang="en-US" sz="900">
               <a:solidFill>
                 <a:sysClr val="windowText" lastClr="000000">
                   <a:hueOff val="0"/>
@@ -3530,7 +3581,7 @@
 Orders marked </a:t>
           </a:r>
           <a:r>
-            <a:rPr lang="en-US" sz="900" b="1" dirty="0">
+            <a:rPr lang="en-US" sz="900" b="1">
               <a:solidFill>
                 <a:sysClr val="windowText" lastClr="000000">
                   <a:hueOff val="0"/>
@@ -3545,6 +3596,19 @@
             </a:rPr>
             <a:t>Placed</a:t>
           </a:r>
+          <a:endParaRPr lang="en-US" sz="900" b="1" dirty="0">
+            <a:solidFill>
+              <a:sysClr val="windowText" lastClr="000000">
+                <a:hueOff val="0"/>
+                <a:satOff val="0"/>
+                <a:lumOff val="0"/>
+                <a:alphaOff val="0"/>
+              </a:sysClr>
+            </a:solidFill>
+            <a:latin typeface="Calibri" panose="020F0502020204030204"/>
+            <a:ea typeface="+mn-ea"/>
+            <a:cs typeface="+mn-cs"/>
+          </a:endParaRPr>
         </a:p>
       </dgm:t>
     </dgm:pt>
@@ -3577,11 +3641,6 @@
           <a:off x="3357218" y="169"/>
           <a:ext cx="1156866" cy="347059"/>
         </a:xfrm>
-        <a:prstGeom prst="chevron">
-          <a:avLst>
-            <a:gd name="adj" fmla="val 30000"/>
-          </a:avLst>
-        </a:prstGeom>
         <a:solidFill>
           <a:srgbClr val="5B9BD5">
             <a:hueOff val="0"/>
@@ -3612,7 +3671,7 @@
             <a:buNone/>
           </a:pPr>
           <a:r>
-            <a:rPr lang="en-US" sz="1050" dirty="0">
+            <a:rPr lang="en-US" sz="1050">
               <a:solidFill>
                 <a:sysClr val="window" lastClr="FFFFFF"/>
               </a:solidFill>
@@ -3622,6 +3681,14 @@
             </a:rPr>
             <a:t>Debit Points</a:t>
           </a:r>
+          <a:endParaRPr lang="en-US" sz="1050" dirty="0">
+            <a:solidFill>
+              <a:sysClr val="window" lastClr="FFFFFF"/>
+            </a:solidFill>
+            <a:latin typeface="Calibri" panose="020F0502020204030204"/>
+            <a:ea typeface="+mn-ea"/>
+            <a:cs typeface="+mn-cs"/>
+          </a:endParaRPr>
         </a:p>
       </dgm:t>
     </dgm:pt>
@@ -3654,9 +3721,6 @@
           <a:off x="3357218" y="347229"/>
           <a:ext cx="1052748" cy="2916104"/>
         </a:xfrm>
-        <a:prstGeom prst="rect">
-          <a:avLst/>
-        </a:prstGeom>
         <a:solidFill>
           <a:srgbClr val="5B9BD5">
             <a:tint val="40000"/>
@@ -3691,7 +3755,7 @@
             <a:buNone/>
           </a:pPr>
           <a:r>
-            <a:rPr lang="en-US" sz="900" dirty="0">
+            <a:rPr lang="en-US" sz="900">
               <a:solidFill>
                 <a:sysClr val="windowText" lastClr="000000">
                   <a:hueOff val="0"/>
@@ -3710,6 +3774,19 @@
 Full audit linkage:
 Points status updated to Debited</a:t>
           </a:r>
+          <a:endParaRPr lang="en-US" sz="900" dirty="0">
+            <a:solidFill>
+              <a:sysClr val="windowText" lastClr="000000">
+                <a:hueOff val="0"/>
+                <a:satOff val="0"/>
+                <a:lumOff val="0"/>
+                <a:alphaOff val="0"/>
+              </a:sysClr>
+            </a:solidFill>
+            <a:latin typeface="Calibri" panose="020F0502020204030204"/>
+            <a:ea typeface="+mn-ea"/>
+            <a:cs typeface="+mn-cs"/>
+          </a:endParaRPr>
         </a:p>
       </dgm:t>
     </dgm:pt>
@@ -3742,11 +3819,6 @@
           <a:off x="4474728" y="169"/>
           <a:ext cx="1156866" cy="347059"/>
         </a:xfrm>
-        <a:prstGeom prst="chevron">
-          <a:avLst>
-            <a:gd name="adj" fmla="val 30000"/>
-          </a:avLst>
-        </a:prstGeom>
         <a:solidFill>
           <a:srgbClr val="70AD47">
             <a:hueOff val="0"/>
@@ -3777,7 +3849,7 @@
             <a:buNone/>
           </a:pPr>
           <a:r>
-            <a:rPr lang="en-US" sz="1050" dirty="0">
+            <a:rPr lang="en-US" sz="1050">
               <a:solidFill>
                 <a:sysClr val="window" lastClr="FFFFFF"/>
               </a:solidFill>
@@ -3787,6 +3859,14 @@
             </a:rPr>
             <a:t>Broker Execution</a:t>
           </a:r>
+          <a:endParaRPr lang="en-US" sz="1050" dirty="0">
+            <a:solidFill>
+              <a:sysClr val="window" lastClr="FFFFFF"/>
+            </a:solidFill>
+            <a:latin typeface="Calibri" panose="020F0502020204030204"/>
+            <a:ea typeface="+mn-ea"/>
+            <a:cs typeface="+mn-cs"/>
+          </a:endParaRPr>
         </a:p>
       </dgm:t>
     </dgm:pt>
@@ -3819,9 +3899,6 @@
           <a:off x="4474728" y="347229"/>
           <a:ext cx="1052748" cy="2916104"/>
         </a:xfrm>
-        <a:prstGeom prst="rect">
-          <a:avLst/>
-        </a:prstGeom>
         <a:solidFill>
           <a:srgbClr val="70AD47">
             <a:tint val="40000"/>
@@ -3856,7 +3933,7 @@
             <a:buNone/>
           </a:pPr>
           <a:r>
-            <a:rPr lang="en-US" sz="900" dirty="0">
+            <a:rPr lang="en-US" sz="900">
               <a:solidFill>
                 <a:sysClr val="windowText" lastClr="000000">
                   <a:hueOff val="0"/>
@@ -3874,7 +3951,7 @@
 Orders marked </a:t>
           </a:r>
           <a:r>
-            <a:rPr lang="en-US" sz="900" b="1" dirty="0">
+            <a:rPr lang="en-US" sz="900" b="1">
               <a:solidFill>
                 <a:sysClr val="windowText" lastClr="000000">
                   <a:hueOff val="0"/>
@@ -3889,6 +3966,19 @@
             </a:rPr>
             <a:t>Confirmed</a:t>
           </a:r>
+          <a:endParaRPr lang="en-US" sz="900" b="1" dirty="0">
+            <a:solidFill>
+              <a:sysClr val="windowText" lastClr="000000">
+                <a:hueOff val="0"/>
+                <a:satOff val="0"/>
+                <a:lumOff val="0"/>
+                <a:alphaOff val="0"/>
+              </a:sysClr>
+            </a:solidFill>
+            <a:latin typeface="Calibri" panose="020F0502020204030204"/>
+            <a:ea typeface="+mn-ea"/>
+            <a:cs typeface="+mn-cs"/>
+          </a:endParaRPr>
         </a:p>
       </dgm:t>
     </dgm:pt>
@@ -3921,11 +4011,6 @@
           <a:off x="5592238" y="169"/>
           <a:ext cx="1156866" cy="347059"/>
         </a:xfrm>
-        <a:prstGeom prst="chevron">
-          <a:avLst>
-            <a:gd name="adj" fmla="val 30000"/>
-          </a:avLst>
-        </a:prstGeom>
         <a:solidFill>
           <a:srgbClr val="ED7D31">
             <a:hueOff val="0"/>
@@ -3956,7 +4041,7 @@
             <a:buNone/>
           </a:pPr>
           <a:r>
-            <a:rPr lang="en-US" sz="1050" dirty="0">
+            <a:rPr lang="en-US" sz="1050">
               <a:solidFill>
                 <a:sysClr val="window" lastClr="FFFFFF"/>
               </a:solidFill>
@@ -3966,6 +4051,14 @@
             </a:rPr>
             <a:t>Payment &amp; Allocation</a:t>
           </a:r>
+          <a:endParaRPr lang="en-US" sz="1050" dirty="0">
+            <a:solidFill>
+              <a:sysClr val="window" lastClr="FFFFFF"/>
+            </a:solidFill>
+            <a:latin typeface="Calibri" panose="020F0502020204030204"/>
+            <a:ea typeface="+mn-ea"/>
+            <a:cs typeface="+mn-cs"/>
+          </a:endParaRPr>
         </a:p>
       </dgm:t>
     </dgm:pt>
@@ -3998,9 +4091,6 @@
           <a:off x="5592238" y="347229"/>
           <a:ext cx="1052748" cy="2916104"/>
         </a:xfrm>
-        <a:prstGeom prst="rect">
-          <a:avLst/>
-        </a:prstGeom>
         <a:solidFill>
           <a:srgbClr val="ED7D31">
             <a:tint val="40000"/>
@@ -4035,7 +4125,7 @@
             <a:buNone/>
           </a:pPr>
           <a:r>
-            <a:rPr lang="en-US" sz="900" dirty="0">
+            <a:rPr lang="en-US" sz="900">
               <a:solidFill>
                 <a:sysClr val="windowText" lastClr="000000">
                   <a:hueOff val="0"/>
@@ -4053,6 +4143,19 @@
 Merchant executes ACH payment to broker(s)
 Allocation file sent for account-level crediting</a:t>
           </a:r>
+          <a:endParaRPr lang="en-US" sz="900" dirty="0">
+            <a:solidFill>
+              <a:sysClr val="windowText" lastClr="000000">
+                <a:hueOff val="0"/>
+                <a:satOff val="0"/>
+                <a:lumOff val="0"/>
+                <a:alphaOff val="0"/>
+              </a:sysClr>
+            </a:solidFill>
+            <a:latin typeface="Calibri" panose="020F0502020204030204"/>
+            <a:ea typeface="+mn-ea"/>
+            <a:cs typeface="+mn-cs"/>
+          </a:endParaRPr>
         </a:p>
       </dgm:t>
     </dgm:pt>
@@ -4085,11 +4188,6 @@
           <a:off x="6709748" y="169"/>
           <a:ext cx="1156866" cy="347059"/>
         </a:xfrm>
-        <a:prstGeom prst="chevron">
-          <a:avLst>
-            <a:gd name="adj" fmla="val 30000"/>
-          </a:avLst>
-        </a:prstGeom>
         <a:solidFill>
           <a:srgbClr val="A5A5A5">
             <a:hueOff val="0"/>
@@ -4120,7 +4218,7 @@
             <a:buNone/>
           </a:pPr>
           <a:r>
-            <a:rPr lang="en-US" sz="1050" dirty="0">
+            <a:rPr lang="en-US" sz="1050">
               <a:solidFill>
                 <a:sysClr val="window" lastClr="FFFFFF"/>
               </a:solidFill>
@@ -4130,6 +4228,14 @@
             </a:rPr>
             <a:t>Settlement</a:t>
           </a:r>
+          <a:endParaRPr lang="en-US" sz="1050" dirty="0">
+            <a:solidFill>
+              <a:sysClr val="window" lastClr="FFFFFF"/>
+            </a:solidFill>
+            <a:latin typeface="Calibri" panose="020F0502020204030204"/>
+            <a:ea typeface="+mn-ea"/>
+            <a:cs typeface="+mn-cs"/>
+          </a:endParaRPr>
         </a:p>
       </dgm:t>
     </dgm:pt>
@@ -4162,9 +4268,6 @@
           <a:off x="6709748" y="347229"/>
           <a:ext cx="1052748" cy="2916104"/>
         </a:xfrm>
-        <a:prstGeom prst="rect">
-          <a:avLst/>
-        </a:prstGeom>
         <a:solidFill>
           <a:srgbClr val="A5A5A5">
             <a:tint val="40000"/>
@@ -4199,7 +4302,7 @@
             <a:buNone/>
           </a:pPr>
           <a:r>
-            <a:rPr lang="en-US" sz="900" dirty="0">
+            <a:rPr lang="en-US" sz="900">
               <a:solidFill>
                 <a:sysClr val="windowText" lastClr="000000">
                   <a:hueOff val="0"/>
@@ -4218,7 +4321,7 @@
 Orders marked </a:t>
           </a:r>
           <a:r>
-            <a:rPr lang="en-US" sz="900" b="1" dirty="0">
+            <a:rPr lang="en-US" sz="900" b="1">
               <a:solidFill>
                 <a:sysClr val="windowText" lastClr="000000">
                   <a:hueOff val="0"/>
@@ -4233,6 +4336,19 @@
             </a:rPr>
             <a:t>Settled</a:t>
           </a:r>
+          <a:endParaRPr lang="en-US" sz="900" b="1" dirty="0">
+            <a:solidFill>
+              <a:sysClr val="windowText" lastClr="000000">
+                <a:hueOff val="0"/>
+                <a:satOff val="0"/>
+                <a:lumOff val="0"/>
+                <a:alphaOff val="0"/>
+              </a:sysClr>
+            </a:solidFill>
+            <a:latin typeface="Calibri" panose="020F0502020204030204"/>
+            <a:ea typeface="+mn-ea"/>
+            <a:cs typeface="+mn-cs"/>
+          </a:endParaRPr>
         </a:p>
       </dgm:t>
     </dgm:pt>
@@ -4428,65 +4544,65 @@
   </dgm:ptLst>
   <dgm:cxnLst>
     <dgm:cxn modelId="{C8F87802-0AD9-4208-B08E-35C810E2F581}" srcId="{B73B1238-7923-48C7-ABE9-FACBBB3832A7}" destId="{06598F53-E5D4-453C-9371-3A02B99039CF}" srcOrd="2" destOrd="0" parTransId="{D4204FBA-28B5-4B1C-9E9D-6D116644DA10}" sibTransId="{8642233E-9F5C-4565-A1E2-95C753EBF591}"/>
+    <dgm:cxn modelId="{C59B7504-5D7B-4944-99D2-F85FAFC60E46}" type="presOf" srcId="{4CC738ED-9B9E-4DB9-8A29-76E53A7F98D7}" destId="{22315326-AAFA-455F-BF08-737964F35059}" srcOrd="0" destOrd="0" presId="urn:microsoft.com/office/officeart/2016/7/layout/ChevronBlockProcess"/>
     <dgm:cxn modelId="{11829905-B4DB-4799-B4D3-03A24CCFFE19}" srcId="{54599F1E-9F16-45A0-B7A4-8B1E1A3BA92C}" destId="{B73B1238-7923-48C7-ABE9-FACBBB3832A7}" srcOrd="0" destOrd="0" parTransId="{10A1987A-D226-4C52-BA41-D89284095598}" sibTransId="{34E5E44F-CDAA-4BCB-B3F8-26B37AAAF740}"/>
-    <dgm:cxn modelId="{8DC1A106-D9D8-408B-9677-622D41837A3E}" type="presOf" srcId="{754F0A54-669E-4DD2-AD04-7E7B41127BD5}" destId="{051D59D2-5011-4173-981B-7C4C52815315}" srcOrd="0" destOrd="0" presId="urn:microsoft.com/office/officeart/2016/7/layout/ChevronBlockProcess"/>
-    <dgm:cxn modelId="{48465C0A-3FB0-42A2-BE9B-24128FD58321}" type="presOf" srcId="{54599F1E-9F16-45A0-B7A4-8B1E1A3BA92C}" destId="{D76D8A39-AFAB-4590-9ADA-70A843A078E6}" srcOrd="0" destOrd="0" presId="urn:microsoft.com/office/officeart/2016/7/layout/ChevronBlockProcess"/>
+    <dgm:cxn modelId="{BAE94F06-95FA-4273-8131-416A74685E29}" type="presOf" srcId="{34987020-E065-4987-B47F-CA0A99D3B971}" destId="{A3D33916-F0A3-41EE-8DF9-F34AB6151A36}" srcOrd="0" destOrd="0" presId="urn:microsoft.com/office/officeart/2016/7/layout/ChevronBlockProcess"/>
+    <dgm:cxn modelId="{AB6B4507-CD7C-4739-A842-D67A1DC1B45C}" type="presOf" srcId="{7EFD594B-E294-4C5B-9F6B-6D7E4A5296EE}" destId="{0DDD180D-A51B-4119-AA9E-ADCD16A5A98D}" srcOrd="0" destOrd="0" presId="urn:microsoft.com/office/officeart/2016/7/layout/ChevronBlockProcess"/>
+    <dgm:cxn modelId="{7D84FA13-F140-462E-A215-22F831D41C5E}" type="presOf" srcId="{754F0A54-669E-4DD2-AD04-7E7B41127BD5}" destId="{051D59D2-5011-4173-981B-7C4C52815315}" srcOrd="0" destOrd="0" presId="urn:microsoft.com/office/officeart/2016/7/layout/ChevronBlockProcess"/>
+    <dgm:cxn modelId="{8610551D-695B-43D4-B3B7-FD0B04597866}" type="presOf" srcId="{06598F53-E5D4-453C-9371-3A02B99039CF}" destId="{20D96762-97A0-470C-9FBB-632E6E27EFE9}" srcOrd="0" destOrd="2" presId="urn:microsoft.com/office/officeart/2016/7/layout/ChevronBlockProcess"/>
+    <dgm:cxn modelId="{77BB9B2C-95A1-48B1-A669-020D7FA2B5C9}" type="presOf" srcId="{3B74C516-1A02-431D-89BC-3DB4885E9625}" destId="{35D36832-1BBE-43BD-9236-A527F6296E52}" srcOrd="0" destOrd="0" presId="urn:microsoft.com/office/officeart/2016/7/layout/ChevronBlockProcess"/>
     <dgm:cxn modelId="{F2BFAE2F-4B98-4586-B6A0-ED733A83B348}" srcId="{B73B1238-7923-48C7-ABE9-FACBBB3832A7}" destId="{9E13A00F-FB41-441A-838F-64BEF21FDB0D}" srcOrd="0" destOrd="0" parTransId="{6744D463-D826-45BE-8454-7A56A701A235}" sibTransId="{B822A0BD-9962-449E-8379-DA14F1CF70CF}"/>
     <dgm:cxn modelId="{3DB48B32-9660-434A-AD98-2E7F46E0CBBE}" srcId="{54599F1E-9F16-45A0-B7A4-8B1E1A3BA92C}" destId="{3D132F41-9DEA-4C61-97EB-C1F309C9CFE8}" srcOrd="6" destOrd="0" parTransId="{6C0CC1E0-9479-4561-AAC6-A00AD6758E79}" sibTransId="{88471558-6565-4E3C-9C1F-6C85CCC274F2}"/>
+    <dgm:cxn modelId="{250E4638-C209-428C-B303-391EA4277037}" type="presOf" srcId="{54599F1E-9F16-45A0-B7A4-8B1E1A3BA92C}" destId="{D76D8A39-AFAB-4590-9ADA-70A843A078E6}" srcOrd="0" destOrd="0" presId="urn:microsoft.com/office/officeart/2016/7/layout/ChevronBlockProcess"/>
     <dgm:cxn modelId="{0B07FF39-EB1C-41D6-8687-621CFC6AFEDA}" srcId="{34987020-E065-4987-B47F-CA0A99D3B971}" destId="{74A738E7-1343-42D1-ABE8-B4DFE7ED4DF6}" srcOrd="0" destOrd="0" parTransId="{6F07F362-4AB4-4E83-A63E-F6405440CA8F}" sibTransId="{93CB7C23-6B20-4E9D-A56A-253B080EFCC3}"/>
-    <dgm:cxn modelId="{AC4D145C-2A9C-45B4-8583-3184D484798E}" type="presOf" srcId="{3D132F41-9DEA-4C61-97EB-C1F309C9CFE8}" destId="{89B8602D-AB32-4941-A07E-ECDFE9CB006A}" srcOrd="0" destOrd="0" presId="urn:microsoft.com/office/officeart/2016/7/layout/ChevronBlockProcess"/>
-    <dgm:cxn modelId="{385D2160-0CDB-45DE-84AB-3EA84E31D4BD}" type="presOf" srcId="{9E7B3104-712F-455F-83AD-F8CADC38338C}" destId="{857D26C3-7545-4F25-980F-19E1C58A5E30}" srcOrd="0" destOrd="0" presId="urn:microsoft.com/office/officeart/2016/7/layout/ChevronBlockProcess"/>
-    <dgm:cxn modelId="{13A45E61-42F5-4B6E-A132-DA977F73AC2F}" type="presOf" srcId="{4ACF1667-D5F3-4B78-A499-BF09EBCAE075}" destId="{312EA159-4F3C-4FE9-8ED5-E9A8517E897B}" srcOrd="0" destOrd="0" presId="urn:microsoft.com/office/officeart/2016/7/layout/ChevronBlockProcess"/>
+    <dgm:cxn modelId="{B6640D3A-26C3-49FF-851F-D6708817143E}" type="presOf" srcId="{03EF6AB2-52EA-4558-AC11-B521DCEFB870}" destId="{20D96762-97A0-470C-9FBB-632E6E27EFE9}" srcOrd="0" destOrd="1" presId="urn:microsoft.com/office/officeart/2016/7/layout/ChevronBlockProcess"/>
     <dgm:cxn modelId="{57FA3A42-55EF-4483-AFF8-C57A6397ED80}" srcId="{54599F1E-9F16-45A0-B7A4-8B1E1A3BA92C}" destId="{34987020-E065-4987-B47F-CA0A99D3B971}" srcOrd="2" destOrd="0" parTransId="{8F8E13F2-E025-4A97-B30F-53971079A412}" sibTransId="{23DEBF26-9AE3-4046-9F54-C073D41B87C5}"/>
     <dgm:cxn modelId="{757D6966-D7F9-4EAA-BFDC-57A914C2BE49}" srcId="{4CC738ED-9B9E-4DB9-8A29-76E53A7F98D7}" destId="{9E7B3104-712F-455F-83AD-F8CADC38338C}" srcOrd="0" destOrd="0" parTransId="{BCC7673B-07A4-4145-88C0-573C4407C41F}" sibTransId="{4AF1CDC6-798F-4FE3-A684-A087C0366D0F}"/>
     <dgm:cxn modelId="{B3F09549-8EA0-4021-96E7-4D8441B0D33E}" srcId="{754F0A54-669E-4DD2-AD04-7E7B41127BD5}" destId="{7EFD594B-E294-4C5B-9F6B-6D7E4A5296EE}" srcOrd="0" destOrd="0" parTransId="{92EAE2C7-8A2D-4310-A853-6BFA712008E8}" sibTransId="{CF882C62-6174-4B88-9BA1-8EEAC33E6A2E}"/>
     <dgm:cxn modelId="{9FCA716F-BB0F-485A-A37B-109150E294EC}" srcId="{54599F1E-9F16-45A0-B7A4-8B1E1A3BA92C}" destId="{1BD865E2-8B1A-477B-A798-1BC582FF9BBC}" srcOrd="5" destOrd="0" parTransId="{AB8B7DA9-CE18-4B6A-976E-75B866ACDD01}" sibTransId="{8045FD05-35DF-4DA8-8222-85FAA25EF61E}"/>
+    <dgm:cxn modelId="{4587B76F-EBEA-466F-953B-0B4E3CFD99D6}" type="presOf" srcId="{780EEEFC-5117-4617-BC8C-367A804F313F}" destId="{BF0DBA5D-BC5C-429A-B4E4-5049F2DEF884}" srcOrd="0" destOrd="0" presId="urn:microsoft.com/office/officeart/2016/7/layout/ChevronBlockProcess"/>
     <dgm:cxn modelId="{362B8F74-FCBF-43F9-8AC4-A12700AA8FF7}" srcId="{3B74C516-1A02-431D-89BC-3DB4885E9625}" destId="{4ACF1667-D5F3-4B78-A499-BF09EBCAE075}" srcOrd="0" destOrd="0" parTransId="{2DBF5AB5-8123-49E0-A1ED-FE7B1A30376D}" sibTransId="{B82F3DA3-BAC5-40D9-975B-20C14A00464F}"/>
     <dgm:cxn modelId="{4F14A954-5426-46D4-81FE-777C9116F39E}" srcId="{B73B1238-7923-48C7-ABE9-FACBBB3832A7}" destId="{03EF6AB2-52EA-4558-AC11-B521DCEFB870}" srcOrd="1" destOrd="0" parTransId="{F2699EDE-8578-4E20-ABD2-8DD3A2D8BD4F}" sibTransId="{6D5E6109-9B3E-4DAF-8E0F-3B35EC0FC7D7}"/>
-    <dgm:cxn modelId="{7376CB56-3F37-44D9-9389-54941CEDD18C}" type="presOf" srcId="{06598F53-E5D4-453C-9371-3A02B99039CF}" destId="{20D96762-97A0-470C-9FBB-632E6E27EFE9}" srcOrd="0" destOrd="2" presId="urn:microsoft.com/office/officeart/2016/7/layout/ChevronBlockProcess"/>
-    <dgm:cxn modelId="{AC3EDC78-AECD-430E-8A40-FAE36F41E365}" type="presOf" srcId="{780EEEFC-5117-4617-BC8C-367A804F313F}" destId="{BF0DBA5D-BC5C-429A-B4E4-5049F2DEF884}" srcOrd="0" destOrd="0" presId="urn:microsoft.com/office/officeart/2016/7/layout/ChevronBlockProcess"/>
+    <dgm:cxn modelId="{2EC40A55-AB11-45E0-89B3-26A3AB5A3F29}" type="presOf" srcId="{1BD865E2-8B1A-477B-A798-1BC582FF9BBC}" destId="{A3CFFFB1-3FB1-4570-AE28-E80015BC2705}" srcOrd="0" destOrd="0" presId="urn:microsoft.com/office/officeart/2016/7/layout/ChevronBlockProcess"/>
     <dgm:cxn modelId="{DCF9FB5A-6FDD-45B4-B05A-94F3E8872CF4}" srcId="{54599F1E-9F16-45A0-B7A4-8B1E1A3BA92C}" destId="{754F0A54-669E-4DD2-AD04-7E7B41127BD5}" srcOrd="3" destOrd="0" parTransId="{5927736F-C96E-48BA-8621-A5E642A065E7}" sibTransId="{34EF5D88-3A2D-477D-8CBA-FACF0DEB1B39}"/>
+    <dgm:cxn modelId="{A534767D-3849-403C-8CF8-F2782A78AB84}" type="presOf" srcId="{3AF2A6B2-2120-4FC2-AB94-83A7D3B38353}" destId="{B8158CA7-0AF3-465C-9A61-114073BA4467}" srcOrd="0" destOrd="0" presId="urn:microsoft.com/office/officeart/2016/7/layout/ChevronBlockProcess"/>
     <dgm:cxn modelId="{D47DB396-C565-48B7-A93C-B3F4B196196F}" srcId="{1BD865E2-8B1A-477B-A798-1BC582FF9BBC}" destId="{3AF2A6B2-2120-4FC2-AB94-83A7D3B38353}" srcOrd="0" destOrd="0" parTransId="{FD67117C-1DFD-400F-809A-D4B68BA60A3B}" sibTransId="{BEA75424-558F-4028-9A5E-CB0717DB9452}"/>
-    <dgm:cxn modelId="{25A4B7B1-A6BD-46CA-AD26-EE5FD4022E1E}" type="presOf" srcId="{7EFD594B-E294-4C5B-9F6B-6D7E4A5296EE}" destId="{0DDD180D-A51B-4119-AA9E-ADCD16A5A98D}" srcOrd="0" destOrd="0" presId="urn:microsoft.com/office/officeart/2016/7/layout/ChevronBlockProcess"/>
+    <dgm:cxn modelId="{F9C601A0-1A2E-47DA-B504-B6F1058E28EF}" type="presOf" srcId="{B73B1238-7923-48C7-ABE9-FACBBB3832A7}" destId="{8EF171A3-6EBD-4520-9D64-FD9F390E1F97}" srcOrd="0" destOrd="0" presId="urn:microsoft.com/office/officeart/2016/7/layout/ChevronBlockProcess"/>
+    <dgm:cxn modelId="{B23935A2-9793-413B-AF7C-352CD9BC8A1D}" type="presOf" srcId="{9E7B3104-712F-455F-83AD-F8CADC38338C}" destId="{857D26C3-7545-4F25-980F-19E1C58A5E30}" srcOrd="0" destOrd="0" presId="urn:microsoft.com/office/officeart/2016/7/layout/ChevronBlockProcess"/>
+    <dgm:cxn modelId="{9F0CD0B5-CB91-49BD-9588-DFE1C3BD7316}" type="presOf" srcId="{74A738E7-1343-42D1-ABE8-B4DFE7ED4DF6}" destId="{1E7DDAB4-FEB2-4646-A347-907F2E8A0528}" srcOrd="0" destOrd="0" presId="urn:microsoft.com/office/officeart/2016/7/layout/ChevronBlockProcess"/>
+    <dgm:cxn modelId="{292202B7-B0B5-4443-8C93-6F63F72516CF}" type="presOf" srcId="{4ACF1667-D5F3-4B78-A499-BF09EBCAE075}" destId="{312EA159-4F3C-4FE9-8ED5-E9A8517E897B}" srcOrd="0" destOrd="0" presId="urn:microsoft.com/office/officeart/2016/7/layout/ChevronBlockProcess"/>
     <dgm:cxn modelId="{225E3FC3-380A-4368-BFC3-4EF20092970D}" srcId="{54599F1E-9F16-45A0-B7A4-8B1E1A3BA92C}" destId="{3B74C516-1A02-431D-89BC-3DB4885E9625}" srcOrd="1" destOrd="0" parTransId="{8C1E5477-30A6-4A76-9DEF-1F47626618FA}" sibTransId="{CDC9FD16-C91F-4B00-92F1-79FA10463A2D}"/>
-    <dgm:cxn modelId="{166870C6-F17F-4D70-97EB-B7AA76360626}" type="presOf" srcId="{34987020-E065-4987-B47F-CA0A99D3B971}" destId="{A3D33916-F0A3-41EE-8DF9-F34AB6151A36}" srcOrd="0" destOrd="0" presId="urn:microsoft.com/office/officeart/2016/7/layout/ChevronBlockProcess"/>
-    <dgm:cxn modelId="{3F761BC7-9FDD-4896-92D2-40270B2EDC5B}" type="presOf" srcId="{3AF2A6B2-2120-4FC2-AB94-83A7D3B38353}" destId="{B8158CA7-0AF3-465C-9A61-114073BA4467}" srcOrd="0" destOrd="0" presId="urn:microsoft.com/office/officeart/2016/7/layout/ChevronBlockProcess"/>
-    <dgm:cxn modelId="{D1EDFBCC-C2C0-428E-A674-4E45F4E015E9}" type="presOf" srcId="{4CC738ED-9B9E-4DB9-8A29-76E53A7F98D7}" destId="{22315326-AAFA-455F-BF08-737964F35059}" srcOrd="0" destOrd="0" presId="urn:microsoft.com/office/officeart/2016/7/layout/ChevronBlockProcess"/>
-    <dgm:cxn modelId="{8C636FCE-1E8D-4754-B45B-5883D1F90FBE}" type="presOf" srcId="{1BD865E2-8B1A-477B-A798-1BC582FF9BBC}" destId="{A3CFFFB1-3FB1-4570-AE28-E80015BC2705}" srcOrd="0" destOrd="0" presId="urn:microsoft.com/office/officeart/2016/7/layout/ChevronBlockProcess"/>
-    <dgm:cxn modelId="{95D6D4CE-2F57-4CFE-93A4-60E691060DAA}" type="presOf" srcId="{74A738E7-1343-42D1-ABE8-B4DFE7ED4DF6}" destId="{1E7DDAB4-FEB2-4646-A347-907F2E8A0528}" srcOrd="0" destOrd="0" presId="urn:microsoft.com/office/officeart/2016/7/layout/ChevronBlockProcess"/>
-    <dgm:cxn modelId="{4D742DD1-0E01-49F0-BD42-63182047315D}" type="presOf" srcId="{03EF6AB2-52EA-4558-AC11-B521DCEFB870}" destId="{20D96762-97A0-470C-9FBB-632E6E27EFE9}" srcOrd="0" destOrd="1" presId="urn:microsoft.com/office/officeart/2016/7/layout/ChevronBlockProcess"/>
+    <dgm:cxn modelId="{F57950CD-623D-4A3F-BC94-E5BFD4E11BFE}" type="presOf" srcId="{9E13A00F-FB41-441A-838F-64BEF21FDB0D}" destId="{20D96762-97A0-470C-9FBB-632E6E27EFE9}" srcOrd="0" destOrd="0" presId="urn:microsoft.com/office/officeart/2016/7/layout/ChevronBlockProcess"/>
     <dgm:cxn modelId="{81593BDE-5104-4A71-8387-EDF4235590BA}" srcId="{54599F1E-9F16-45A0-B7A4-8B1E1A3BA92C}" destId="{4CC738ED-9B9E-4DB9-8A29-76E53A7F98D7}" srcOrd="4" destOrd="0" parTransId="{AE374C4E-CBFA-4CE2-BC29-B719323EFD21}" sibTransId="{16A8C267-83B4-4DF5-95D8-EEDA264AE044}"/>
-    <dgm:cxn modelId="{231D15E0-965A-4835-BFF8-B873CA15ABE9}" type="presOf" srcId="{3B74C516-1A02-431D-89BC-3DB4885E9625}" destId="{35D36832-1BBE-43BD-9236-A527F6296E52}" srcOrd="0" destOrd="0" presId="urn:microsoft.com/office/officeart/2016/7/layout/ChevronBlockProcess"/>
-    <dgm:cxn modelId="{B31E41EA-62AA-40CF-BD21-12CE1A41CA3C}" type="presOf" srcId="{9E13A00F-FB41-441A-838F-64BEF21FDB0D}" destId="{20D96762-97A0-470C-9FBB-632E6E27EFE9}" srcOrd="0" destOrd="0" presId="urn:microsoft.com/office/officeart/2016/7/layout/ChevronBlockProcess"/>
-    <dgm:cxn modelId="{BBA4EFF7-00DD-455D-B3F0-E32D4C3152D8}" type="presOf" srcId="{B73B1238-7923-48C7-ABE9-FACBBB3832A7}" destId="{8EF171A3-6EBD-4520-9D64-FD9F390E1F97}" srcOrd="0" destOrd="0" presId="urn:microsoft.com/office/officeart/2016/7/layout/ChevronBlockProcess"/>
+    <dgm:cxn modelId="{0B309DE4-4230-454C-B55C-D47E41B8AB05}" type="presOf" srcId="{3D132F41-9DEA-4C61-97EB-C1F309C9CFE8}" destId="{89B8602D-AB32-4941-A07E-ECDFE9CB006A}" srcOrd="0" destOrd="0" presId="urn:microsoft.com/office/officeart/2016/7/layout/ChevronBlockProcess"/>
     <dgm:cxn modelId="{57B1E4FD-329D-42C3-B3CC-052EE6720C5A}" srcId="{3D132F41-9DEA-4C61-97EB-C1F309C9CFE8}" destId="{780EEEFC-5117-4617-BC8C-367A804F313F}" srcOrd="0" destOrd="0" parTransId="{245E7726-334A-4C95-8A27-5083D7334FE8}" sibTransId="{271A2AFF-8B6B-45C0-933C-50B23707A5D5}"/>
-    <dgm:cxn modelId="{C46345AE-621F-49F9-BA0B-EE01B7D4BDD6}" type="presParOf" srcId="{D76D8A39-AFAB-4590-9ADA-70A843A078E6}" destId="{CB6424A0-B346-4473-A5EC-B6CE292A004A}" srcOrd="0" destOrd="0" presId="urn:microsoft.com/office/officeart/2016/7/layout/ChevronBlockProcess"/>
-    <dgm:cxn modelId="{046F9BDE-E7CD-4687-96F5-D476BEF3FC9E}" type="presParOf" srcId="{CB6424A0-B346-4473-A5EC-B6CE292A004A}" destId="{8EF171A3-6EBD-4520-9D64-FD9F390E1F97}" srcOrd="0" destOrd="0" presId="urn:microsoft.com/office/officeart/2016/7/layout/ChevronBlockProcess"/>
-    <dgm:cxn modelId="{E9282BD0-BF35-4027-9937-1DAB8028D595}" type="presParOf" srcId="{CB6424A0-B346-4473-A5EC-B6CE292A004A}" destId="{20D96762-97A0-470C-9FBB-632E6E27EFE9}" srcOrd="1" destOrd="0" presId="urn:microsoft.com/office/officeart/2016/7/layout/ChevronBlockProcess"/>
-    <dgm:cxn modelId="{9C8C66D6-82E0-4C10-BB0F-CDDEF4E67666}" type="presParOf" srcId="{D76D8A39-AFAB-4590-9ADA-70A843A078E6}" destId="{7DB2ED02-4BF4-48F8-B67D-AAB13939F31E}" srcOrd="1" destOrd="0" presId="urn:microsoft.com/office/officeart/2016/7/layout/ChevronBlockProcess"/>
-    <dgm:cxn modelId="{3E8C6EF6-294E-428D-9A47-A3D9A2D40266}" type="presParOf" srcId="{D76D8A39-AFAB-4590-9ADA-70A843A078E6}" destId="{8B53BCB4-8F0A-45BA-AA2E-8DA54271E055}" srcOrd="2" destOrd="0" presId="urn:microsoft.com/office/officeart/2016/7/layout/ChevronBlockProcess"/>
-    <dgm:cxn modelId="{5C5A6CED-0C90-4220-8537-335F8D151ADB}" type="presParOf" srcId="{8B53BCB4-8F0A-45BA-AA2E-8DA54271E055}" destId="{35D36832-1BBE-43BD-9236-A527F6296E52}" srcOrd="0" destOrd="0" presId="urn:microsoft.com/office/officeart/2016/7/layout/ChevronBlockProcess"/>
-    <dgm:cxn modelId="{ED2364CE-2AE5-4B00-8482-B0DE14190F83}" type="presParOf" srcId="{8B53BCB4-8F0A-45BA-AA2E-8DA54271E055}" destId="{312EA159-4F3C-4FE9-8ED5-E9A8517E897B}" srcOrd="1" destOrd="0" presId="urn:microsoft.com/office/officeart/2016/7/layout/ChevronBlockProcess"/>
-    <dgm:cxn modelId="{FDD64AAE-D87E-4C57-A32A-1DD585514694}" type="presParOf" srcId="{D76D8A39-AFAB-4590-9ADA-70A843A078E6}" destId="{003622A2-1699-4413-9AA9-93E0EDBD3C7E}" srcOrd="3" destOrd="0" presId="urn:microsoft.com/office/officeart/2016/7/layout/ChevronBlockProcess"/>
-    <dgm:cxn modelId="{B20A3593-25E6-4552-A0A7-23C76AB79EC1}" type="presParOf" srcId="{D76D8A39-AFAB-4590-9ADA-70A843A078E6}" destId="{817920AE-C3B4-4880-B9E2-70B57EEF8BF8}" srcOrd="4" destOrd="0" presId="urn:microsoft.com/office/officeart/2016/7/layout/ChevronBlockProcess"/>
-    <dgm:cxn modelId="{850C5D7B-582F-4965-8A84-4FAE4C3C3035}" type="presParOf" srcId="{817920AE-C3B4-4880-B9E2-70B57EEF8BF8}" destId="{A3D33916-F0A3-41EE-8DF9-F34AB6151A36}" srcOrd="0" destOrd="0" presId="urn:microsoft.com/office/officeart/2016/7/layout/ChevronBlockProcess"/>
-    <dgm:cxn modelId="{3B9D5EC0-7B77-40D9-8FEA-FCFAD2BCC148}" type="presParOf" srcId="{817920AE-C3B4-4880-B9E2-70B57EEF8BF8}" destId="{1E7DDAB4-FEB2-4646-A347-907F2E8A0528}" srcOrd="1" destOrd="0" presId="urn:microsoft.com/office/officeart/2016/7/layout/ChevronBlockProcess"/>
-    <dgm:cxn modelId="{0FF91136-40E8-49E9-990C-25D27BD084A7}" type="presParOf" srcId="{D76D8A39-AFAB-4590-9ADA-70A843A078E6}" destId="{F5BD6B97-79A0-48A3-A61E-587C71BF641A}" srcOrd="5" destOrd="0" presId="urn:microsoft.com/office/officeart/2016/7/layout/ChevronBlockProcess"/>
-    <dgm:cxn modelId="{8405683A-7B52-4B73-A76B-D1C3F8413696}" type="presParOf" srcId="{D76D8A39-AFAB-4590-9ADA-70A843A078E6}" destId="{C3024D5E-A945-4069-9802-37DE1262E4A7}" srcOrd="6" destOrd="0" presId="urn:microsoft.com/office/officeart/2016/7/layout/ChevronBlockProcess"/>
-    <dgm:cxn modelId="{D0C8AC14-9306-4471-9589-815D299F8653}" type="presParOf" srcId="{C3024D5E-A945-4069-9802-37DE1262E4A7}" destId="{051D59D2-5011-4173-981B-7C4C52815315}" srcOrd="0" destOrd="0" presId="urn:microsoft.com/office/officeart/2016/7/layout/ChevronBlockProcess"/>
-    <dgm:cxn modelId="{517C3083-9331-46C0-AA14-BFEB8B2C42C2}" type="presParOf" srcId="{C3024D5E-A945-4069-9802-37DE1262E4A7}" destId="{0DDD180D-A51B-4119-AA9E-ADCD16A5A98D}" srcOrd="1" destOrd="0" presId="urn:microsoft.com/office/officeart/2016/7/layout/ChevronBlockProcess"/>
-    <dgm:cxn modelId="{91E73347-6CF6-4630-8530-0912F4CCF89C}" type="presParOf" srcId="{D76D8A39-AFAB-4590-9ADA-70A843A078E6}" destId="{65339EA7-D1DF-4B62-9C72-34DE6D6DEC71}" srcOrd="7" destOrd="0" presId="urn:microsoft.com/office/officeart/2016/7/layout/ChevronBlockProcess"/>
-    <dgm:cxn modelId="{EF8675A4-EC6B-4E21-9749-624A7CACB265}" type="presParOf" srcId="{D76D8A39-AFAB-4590-9ADA-70A843A078E6}" destId="{4D41B95F-1435-4F22-8C3D-AC30F07264A3}" srcOrd="8" destOrd="0" presId="urn:microsoft.com/office/officeart/2016/7/layout/ChevronBlockProcess"/>
-    <dgm:cxn modelId="{72E48B0D-D057-4A62-B8A2-E7E218C2CD32}" type="presParOf" srcId="{4D41B95F-1435-4F22-8C3D-AC30F07264A3}" destId="{22315326-AAFA-455F-BF08-737964F35059}" srcOrd="0" destOrd="0" presId="urn:microsoft.com/office/officeart/2016/7/layout/ChevronBlockProcess"/>
-    <dgm:cxn modelId="{31AD669A-83E2-4E35-BB10-9DB83E6278BB}" type="presParOf" srcId="{4D41B95F-1435-4F22-8C3D-AC30F07264A3}" destId="{857D26C3-7545-4F25-980F-19E1C58A5E30}" srcOrd="1" destOrd="0" presId="urn:microsoft.com/office/officeart/2016/7/layout/ChevronBlockProcess"/>
-    <dgm:cxn modelId="{0F1CA577-D496-40DC-8B22-4199ADDB8DC4}" type="presParOf" srcId="{D76D8A39-AFAB-4590-9ADA-70A843A078E6}" destId="{5446A149-A96E-4164-BB39-999901BF304E}" srcOrd="9" destOrd="0" presId="urn:microsoft.com/office/officeart/2016/7/layout/ChevronBlockProcess"/>
-    <dgm:cxn modelId="{3917B7B3-9E30-4EC9-B0EA-3A14C3F4BFDB}" type="presParOf" srcId="{D76D8A39-AFAB-4590-9ADA-70A843A078E6}" destId="{7298E3BF-73EF-44C7-9378-6921373B8344}" srcOrd="10" destOrd="0" presId="urn:microsoft.com/office/officeart/2016/7/layout/ChevronBlockProcess"/>
-    <dgm:cxn modelId="{967594CF-ABA4-4542-A53E-DA6247920558}" type="presParOf" srcId="{7298E3BF-73EF-44C7-9378-6921373B8344}" destId="{A3CFFFB1-3FB1-4570-AE28-E80015BC2705}" srcOrd="0" destOrd="0" presId="urn:microsoft.com/office/officeart/2016/7/layout/ChevronBlockProcess"/>
-    <dgm:cxn modelId="{87EE58D8-ECEC-464C-B61C-31B4782139E5}" type="presParOf" srcId="{7298E3BF-73EF-44C7-9378-6921373B8344}" destId="{B8158CA7-0AF3-465C-9A61-114073BA4467}" srcOrd="1" destOrd="0" presId="urn:microsoft.com/office/officeart/2016/7/layout/ChevronBlockProcess"/>
-    <dgm:cxn modelId="{6073EB86-2280-47BB-99FE-2CA2F421FE3F}" type="presParOf" srcId="{D76D8A39-AFAB-4590-9ADA-70A843A078E6}" destId="{651EE15E-7A6B-474D-BC37-B90A8793ABCC}" srcOrd="11" destOrd="0" presId="urn:microsoft.com/office/officeart/2016/7/layout/ChevronBlockProcess"/>
-    <dgm:cxn modelId="{4735DB30-F12F-4A8B-AAAF-D249977C83BA}" type="presParOf" srcId="{D76D8A39-AFAB-4590-9ADA-70A843A078E6}" destId="{9A0500C5-2895-4366-B72D-488865948767}" srcOrd="12" destOrd="0" presId="urn:microsoft.com/office/officeart/2016/7/layout/ChevronBlockProcess"/>
-    <dgm:cxn modelId="{205253B8-A17E-4F4A-A6E8-B45FDA244C8F}" type="presParOf" srcId="{9A0500C5-2895-4366-B72D-488865948767}" destId="{89B8602D-AB32-4941-A07E-ECDFE9CB006A}" srcOrd="0" destOrd="0" presId="urn:microsoft.com/office/officeart/2016/7/layout/ChevronBlockProcess"/>
-    <dgm:cxn modelId="{7CEE6D91-482F-40FF-9740-0F775A3BC694}" type="presParOf" srcId="{9A0500C5-2895-4366-B72D-488865948767}" destId="{BF0DBA5D-BC5C-429A-B4E4-5049F2DEF884}" srcOrd="1" destOrd="0" presId="urn:microsoft.com/office/officeart/2016/7/layout/ChevronBlockProcess"/>
+    <dgm:cxn modelId="{CD1336A8-C3D5-4090-93E9-A46908FD981B}" type="presParOf" srcId="{D76D8A39-AFAB-4590-9ADA-70A843A078E6}" destId="{CB6424A0-B346-4473-A5EC-B6CE292A004A}" srcOrd="0" destOrd="0" presId="urn:microsoft.com/office/officeart/2016/7/layout/ChevronBlockProcess"/>
+    <dgm:cxn modelId="{52CC1DEF-9ADE-44F4-B85E-A9D2AA3D3758}" type="presParOf" srcId="{CB6424A0-B346-4473-A5EC-B6CE292A004A}" destId="{8EF171A3-6EBD-4520-9D64-FD9F390E1F97}" srcOrd="0" destOrd="0" presId="urn:microsoft.com/office/officeart/2016/7/layout/ChevronBlockProcess"/>
+    <dgm:cxn modelId="{6F84EDDD-472E-4131-AA00-99A7EF3B5DE2}" type="presParOf" srcId="{CB6424A0-B346-4473-A5EC-B6CE292A004A}" destId="{20D96762-97A0-470C-9FBB-632E6E27EFE9}" srcOrd="1" destOrd="0" presId="urn:microsoft.com/office/officeart/2016/7/layout/ChevronBlockProcess"/>
+    <dgm:cxn modelId="{80D31A28-AAB4-4A32-AEC1-6BC9E8888C73}" type="presParOf" srcId="{D76D8A39-AFAB-4590-9ADA-70A843A078E6}" destId="{7DB2ED02-4BF4-48F8-B67D-AAB13939F31E}" srcOrd="1" destOrd="0" presId="urn:microsoft.com/office/officeart/2016/7/layout/ChevronBlockProcess"/>
+    <dgm:cxn modelId="{A0B6936D-6689-4D60-BBBC-40637D84E7D5}" type="presParOf" srcId="{D76D8A39-AFAB-4590-9ADA-70A843A078E6}" destId="{8B53BCB4-8F0A-45BA-AA2E-8DA54271E055}" srcOrd="2" destOrd="0" presId="urn:microsoft.com/office/officeart/2016/7/layout/ChevronBlockProcess"/>
+    <dgm:cxn modelId="{61DEEE9A-C5FF-42FC-9405-88A72439DD6E}" type="presParOf" srcId="{8B53BCB4-8F0A-45BA-AA2E-8DA54271E055}" destId="{35D36832-1BBE-43BD-9236-A527F6296E52}" srcOrd="0" destOrd="0" presId="urn:microsoft.com/office/officeart/2016/7/layout/ChevronBlockProcess"/>
+    <dgm:cxn modelId="{84031B53-9C04-4B03-A9CD-8EE6D07A2F2E}" type="presParOf" srcId="{8B53BCB4-8F0A-45BA-AA2E-8DA54271E055}" destId="{312EA159-4F3C-4FE9-8ED5-E9A8517E897B}" srcOrd="1" destOrd="0" presId="urn:microsoft.com/office/officeart/2016/7/layout/ChevronBlockProcess"/>
+    <dgm:cxn modelId="{A84B82ED-9A9F-4486-AA77-8D5E27BD69FE}" type="presParOf" srcId="{D76D8A39-AFAB-4590-9ADA-70A843A078E6}" destId="{003622A2-1699-4413-9AA9-93E0EDBD3C7E}" srcOrd="3" destOrd="0" presId="urn:microsoft.com/office/officeart/2016/7/layout/ChevronBlockProcess"/>
+    <dgm:cxn modelId="{275A839E-0E35-41E9-8CA9-4D2B91C7D4EA}" type="presParOf" srcId="{D76D8A39-AFAB-4590-9ADA-70A843A078E6}" destId="{817920AE-C3B4-4880-B9E2-70B57EEF8BF8}" srcOrd="4" destOrd="0" presId="urn:microsoft.com/office/officeart/2016/7/layout/ChevronBlockProcess"/>
+    <dgm:cxn modelId="{E124C518-1B11-4520-9DE5-4A8249833FF5}" type="presParOf" srcId="{817920AE-C3B4-4880-B9E2-70B57EEF8BF8}" destId="{A3D33916-F0A3-41EE-8DF9-F34AB6151A36}" srcOrd="0" destOrd="0" presId="urn:microsoft.com/office/officeart/2016/7/layout/ChevronBlockProcess"/>
+    <dgm:cxn modelId="{A0DFD140-D05B-4C8E-AAAE-A320002709D1}" type="presParOf" srcId="{817920AE-C3B4-4880-B9E2-70B57EEF8BF8}" destId="{1E7DDAB4-FEB2-4646-A347-907F2E8A0528}" srcOrd="1" destOrd="0" presId="urn:microsoft.com/office/officeart/2016/7/layout/ChevronBlockProcess"/>
+    <dgm:cxn modelId="{253E944F-7EB5-4D39-A8E0-3DE102489FF5}" type="presParOf" srcId="{D76D8A39-AFAB-4590-9ADA-70A843A078E6}" destId="{F5BD6B97-79A0-48A3-A61E-587C71BF641A}" srcOrd="5" destOrd="0" presId="urn:microsoft.com/office/officeart/2016/7/layout/ChevronBlockProcess"/>
+    <dgm:cxn modelId="{D178925E-6C54-4A2D-B019-5238ED04F030}" type="presParOf" srcId="{D76D8A39-AFAB-4590-9ADA-70A843A078E6}" destId="{C3024D5E-A945-4069-9802-37DE1262E4A7}" srcOrd="6" destOrd="0" presId="urn:microsoft.com/office/officeart/2016/7/layout/ChevronBlockProcess"/>
+    <dgm:cxn modelId="{AAE82BD0-292E-4B62-8EB3-547C124A5439}" type="presParOf" srcId="{C3024D5E-A945-4069-9802-37DE1262E4A7}" destId="{051D59D2-5011-4173-981B-7C4C52815315}" srcOrd="0" destOrd="0" presId="urn:microsoft.com/office/officeart/2016/7/layout/ChevronBlockProcess"/>
+    <dgm:cxn modelId="{4A945807-B721-44F8-85F2-07B726A0B5F0}" type="presParOf" srcId="{C3024D5E-A945-4069-9802-37DE1262E4A7}" destId="{0DDD180D-A51B-4119-AA9E-ADCD16A5A98D}" srcOrd="1" destOrd="0" presId="urn:microsoft.com/office/officeart/2016/7/layout/ChevronBlockProcess"/>
+    <dgm:cxn modelId="{B3D96D31-8ABD-4968-9338-2E041C3FEA52}" type="presParOf" srcId="{D76D8A39-AFAB-4590-9ADA-70A843A078E6}" destId="{65339EA7-D1DF-4B62-9C72-34DE6D6DEC71}" srcOrd="7" destOrd="0" presId="urn:microsoft.com/office/officeart/2016/7/layout/ChevronBlockProcess"/>
+    <dgm:cxn modelId="{DAFE2BAC-70BC-4632-BAB9-754B468D4818}" type="presParOf" srcId="{D76D8A39-AFAB-4590-9ADA-70A843A078E6}" destId="{4D41B95F-1435-4F22-8C3D-AC30F07264A3}" srcOrd="8" destOrd="0" presId="urn:microsoft.com/office/officeart/2016/7/layout/ChevronBlockProcess"/>
+    <dgm:cxn modelId="{F10BFA33-3720-442E-BE64-509D9FDFED63}" type="presParOf" srcId="{4D41B95F-1435-4F22-8C3D-AC30F07264A3}" destId="{22315326-AAFA-455F-BF08-737964F35059}" srcOrd="0" destOrd="0" presId="urn:microsoft.com/office/officeart/2016/7/layout/ChevronBlockProcess"/>
+    <dgm:cxn modelId="{4AA3CB3E-962B-4E24-AE5D-C71C74D459E2}" type="presParOf" srcId="{4D41B95F-1435-4F22-8C3D-AC30F07264A3}" destId="{857D26C3-7545-4F25-980F-19E1C58A5E30}" srcOrd="1" destOrd="0" presId="urn:microsoft.com/office/officeart/2016/7/layout/ChevronBlockProcess"/>
+    <dgm:cxn modelId="{1C4F61A5-5CCA-447F-9F47-E9BFA6486B13}" type="presParOf" srcId="{D76D8A39-AFAB-4590-9ADA-70A843A078E6}" destId="{5446A149-A96E-4164-BB39-999901BF304E}" srcOrd="9" destOrd="0" presId="urn:microsoft.com/office/officeart/2016/7/layout/ChevronBlockProcess"/>
+    <dgm:cxn modelId="{6D29E238-CC5B-4E54-85B8-4CF20871B427}" type="presParOf" srcId="{D76D8A39-AFAB-4590-9ADA-70A843A078E6}" destId="{7298E3BF-73EF-44C7-9378-6921373B8344}" srcOrd="10" destOrd="0" presId="urn:microsoft.com/office/officeart/2016/7/layout/ChevronBlockProcess"/>
+    <dgm:cxn modelId="{8D8DA2CB-F725-463B-A22D-86DE4E3FCFFB}" type="presParOf" srcId="{7298E3BF-73EF-44C7-9378-6921373B8344}" destId="{A3CFFFB1-3FB1-4570-AE28-E80015BC2705}" srcOrd="0" destOrd="0" presId="urn:microsoft.com/office/officeart/2016/7/layout/ChevronBlockProcess"/>
+    <dgm:cxn modelId="{D7DB1F90-71BD-4347-9378-9F1EB4F398E5}" type="presParOf" srcId="{7298E3BF-73EF-44C7-9378-6921373B8344}" destId="{B8158CA7-0AF3-465C-9A61-114073BA4467}" srcOrd="1" destOrd="0" presId="urn:microsoft.com/office/officeart/2016/7/layout/ChevronBlockProcess"/>
+    <dgm:cxn modelId="{5339A8DC-6617-41C3-9312-4752B906D319}" type="presParOf" srcId="{D76D8A39-AFAB-4590-9ADA-70A843A078E6}" destId="{651EE15E-7A6B-474D-BC37-B90A8793ABCC}" srcOrd="11" destOrd="0" presId="urn:microsoft.com/office/officeart/2016/7/layout/ChevronBlockProcess"/>
+    <dgm:cxn modelId="{78B75635-3627-4256-BEAC-29562000B050}" type="presParOf" srcId="{D76D8A39-AFAB-4590-9ADA-70A843A078E6}" destId="{9A0500C5-2895-4366-B72D-488865948767}" srcOrd="12" destOrd="0" presId="urn:microsoft.com/office/officeart/2016/7/layout/ChevronBlockProcess"/>
+    <dgm:cxn modelId="{45C04F83-C2FC-469C-AC36-E44D5B3F2909}" type="presParOf" srcId="{9A0500C5-2895-4366-B72D-488865948767}" destId="{89B8602D-AB32-4941-A07E-ECDFE9CB006A}" srcOrd="0" destOrd="0" presId="urn:microsoft.com/office/officeart/2016/7/layout/ChevronBlockProcess"/>
+    <dgm:cxn modelId="{286C6F9D-F3EF-4398-B5DA-204CF2D15835}" type="presParOf" srcId="{9A0500C5-2895-4366-B72D-488865948767}" destId="{BF0DBA5D-BC5C-429A-B4E4-5049F2DEF884}" srcOrd="1" destOrd="0" presId="urn:microsoft.com/office/officeart/2016/7/layout/ChevronBlockProcess"/>
   </dgm:cxnLst>
   <dgm:bg/>
   <dgm:whole/>
@@ -5327,7 +5443,7 @@
             <a:buNone/>
           </a:pPr>
           <a:r>
-            <a:rPr lang="en-US" sz="1050" kern="1200" dirty="0">
+            <a:rPr lang="en-US" sz="1050" kern="1200">
               <a:latin typeface="Calibri" panose="020F0502020204030204"/>
               <a:ea typeface="+mn-ea"/>
               <a:cs typeface="+mn-cs"/>
@@ -5336,7 +5452,7 @@
 </a:t>
           </a:r>
           <a:r>
-            <a:rPr lang="en-US" sz="1050" b="1" kern="1200" dirty="0">
+            <a:rPr lang="en-US" sz="1050" b="1" kern="1200">
               <a:latin typeface="Calibri" panose="020F0502020204030204"/>
               <a:ea typeface="+mn-ea"/>
               <a:cs typeface="+mn-cs"/>
@@ -5344,7 +5460,7 @@
             <a:t>One-Time</a:t>
           </a:r>
           <a:r>
-            <a:rPr lang="en-US" sz="1050" kern="1200" dirty="0">
+            <a:rPr lang="en-US" sz="1050" kern="1200">
               <a:latin typeface="Calibri" panose="020F0502020204030204"/>
               <a:ea typeface="+mn-ea"/>
               <a:cs typeface="+mn-cs"/>
@@ -5354,7 +5470,7 @@
 </a:t>
           </a:r>
           <a:r>
-            <a:rPr lang="en-US" sz="1050" b="1" kern="1200" dirty="0">
+            <a:rPr lang="en-US" sz="1050" b="1" kern="1200">
               <a:latin typeface="Calibri" panose="020F0502020204030204"/>
               <a:ea typeface="+mn-ea"/>
               <a:cs typeface="+mn-cs"/>
@@ -5362,7 +5478,7 @@
             <a:t>Monthly</a:t>
           </a:r>
           <a:r>
-            <a:rPr lang="en-US" sz="1050" kern="1200" dirty="0">
+            <a:rPr lang="en-US" sz="1050" kern="1200">
               <a:latin typeface="Calibri" panose="020F0502020204030204"/>
               <a:ea typeface="+mn-ea"/>
               <a:cs typeface="+mn-cs"/>
@@ -5370,6 +5486,11 @@
             <a:t>, Recurring sweep process
 Executes when sufficient points are available</a:t>
           </a:r>
+          <a:endParaRPr lang="en-US" sz="1050" kern="1200" dirty="0">
+            <a:latin typeface="Calibri" panose="020F0502020204030204"/>
+            <a:ea typeface="+mn-ea"/>
+            <a:cs typeface="+mn-cs"/>
+          </a:endParaRPr>
         </a:p>
       </dsp:txBody>
       <dsp:txXfrm>
@@ -5881,7 +6002,7 @@
             <a:buNone/>
           </a:pPr>
           <a:r>
-            <a:rPr lang="en-US" sz="1050" kern="1200" dirty="0">
+            <a:rPr lang="en-US" sz="1050" kern="1200">
               <a:solidFill>
                 <a:sysClr val="window" lastClr="FFFFFF"/>
               </a:solidFill>
@@ -5891,6 +6012,14 @@
             </a:rPr>
             <a:t>Prepare</a:t>
           </a:r>
+          <a:endParaRPr lang="en-US" sz="1050" kern="1200" dirty="0">
+            <a:solidFill>
+              <a:sysClr val="window" lastClr="FFFFFF"/>
+            </a:solidFill>
+            <a:latin typeface="Calibri" panose="020F0502020204030204"/>
+            <a:ea typeface="+mn-ea"/>
+            <a:cs typeface="+mn-cs"/>
+          </a:endParaRPr>
         </a:p>
       </dsp:txBody>
       <dsp:txXfrm>
@@ -5968,7 +6097,7 @@
             <a:buNone/>
           </a:pPr>
           <a:r>
-            <a:rPr lang="en-US" sz="900" kern="1200" dirty="0">
+            <a:rPr lang="en-US" sz="900" kern="1200">
               <a:solidFill>
                 <a:sysClr val="windowText" lastClr="000000">
                   <a:hueOff val="0"/>
@@ -5983,6 +6112,19 @@
             </a:rPr>
             <a:t>Member selects securities in My Basket</a:t>
           </a:r>
+          <a:endParaRPr lang="en-US" sz="900" kern="1200" dirty="0">
+            <a:solidFill>
+              <a:sysClr val="windowText" lastClr="000000">
+                <a:hueOff val="0"/>
+                <a:satOff val="0"/>
+                <a:lumOff val="0"/>
+                <a:alphaOff val="0"/>
+              </a:sysClr>
+            </a:solidFill>
+            <a:latin typeface="Calibri" panose="020F0502020204030204"/>
+            <a:ea typeface="+mn-ea"/>
+            <a:cs typeface="+mn-cs"/>
+          </a:endParaRPr>
         </a:p>
         <a:p>
           <a:pPr marL="0" lvl="0" indent="0" algn="l" defTabSz="400050">
@@ -5998,7 +6140,7 @@
             <a:buNone/>
           </a:pPr>
           <a:r>
-            <a:rPr lang="en-US" sz="900" kern="1200" dirty="0">
+            <a:rPr lang="en-US" sz="900" kern="1200">
               <a:solidFill>
                 <a:sysClr val="windowText" lastClr="000000">
                   <a:hueOff val="0"/>
@@ -6013,6 +6155,19 @@
             </a:rPr>
             <a:t>Investment percentage applied to loyalty balance</a:t>
           </a:r>
+          <a:endParaRPr lang="en-US" sz="900" kern="1200" dirty="0">
+            <a:solidFill>
+              <a:sysClr val="windowText" lastClr="000000">
+                <a:hueOff val="0"/>
+                <a:satOff val="0"/>
+                <a:lumOff val="0"/>
+                <a:alphaOff val="0"/>
+              </a:sysClr>
+            </a:solidFill>
+            <a:latin typeface="Calibri" panose="020F0502020204030204"/>
+            <a:ea typeface="+mn-ea"/>
+            <a:cs typeface="+mn-cs"/>
+          </a:endParaRPr>
         </a:p>
         <a:p>
           <a:pPr marL="0" lvl="0" indent="0" algn="l" defTabSz="400050">
@@ -6028,7 +6183,7 @@
             <a:buNone/>
           </a:pPr>
           <a:r>
-            <a:rPr lang="en-US" sz="900" kern="1200" dirty="0">
+            <a:rPr lang="en-US" sz="900" kern="1200">
               <a:solidFill>
                 <a:sysClr val="windowText" lastClr="000000">
                   <a:hueOff val="0"/>
@@ -6048,7 +6203,7 @@
 Orders marked</a:t>
           </a:r>
           <a:r>
-            <a:rPr lang="en-US" sz="900" b="1" kern="1200" dirty="0">
+            <a:rPr lang="en-US" sz="900" b="1" kern="1200">
               <a:solidFill>
                 <a:sysClr val="windowText" lastClr="000000">
                   <a:hueOff val="0"/>
@@ -6063,6 +6218,19 @@
             </a:rPr>
             <a:t> Pending</a:t>
           </a:r>
+          <a:endParaRPr lang="en-US" sz="900" b="1" kern="1200" dirty="0">
+            <a:solidFill>
+              <a:sysClr val="windowText" lastClr="000000">
+                <a:hueOff val="0"/>
+                <a:satOff val="0"/>
+                <a:lumOff val="0"/>
+                <a:alphaOff val="0"/>
+              </a:sysClr>
+            </a:solidFill>
+            <a:latin typeface="Calibri" panose="020F0502020204030204"/>
+            <a:ea typeface="+mn-ea"/>
+            <a:cs typeface="+mn-cs"/>
+          </a:endParaRPr>
         </a:p>
       </dsp:txBody>
       <dsp:txXfrm>
@@ -6140,7 +6308,7 @@
             <a:buNone/>
           </a:pPr>
           <a:r>
-            <a:rPr lang="en-US" sz="1050" kern="1200" dirty="0">
+            <a:rPr lang="en-US" sz="1050" kern="1200">
               <a:solidFill>
                 <a:sysClr val="window" lastClr="FFFFFF"/>
               </a:solidFill>
@@ -6150,6 +6318,14 @@
             </a:rPr>
             <a:t>Reserve Points</a:t>
           </a:r>
+          <a:endParaRPr lang="en-US" sz="1050" kern="1200" dirty="0">
+            <a:solidFill>
+              <a:sysClr val="window" lastClr="FFFFFF"/>
+            </a:solidFill>
+            <a:latin typeface="Calibri" panose="020F0502020204030204"/>
+            <a:ea typeface="+mn-ea"/>
+            <a:cs typeface="+mn-cs"/>
+          </a:endParaRPr>
         </a:p>
       </dsp:txBody>
       <dsp:txXfrm>
@@ -6227,7 +6403,7 @@
             <a:buNone/>
           </a:pPr>
           <a:r>
-            <a:rPr lang="en-US" sz="900" kern="1200" dirty="0">
+            <a:rPr lang="en-US" sz="900" kern="1200">
               <a:solidFill>
                 <a:sysClr val="windowText" lastClr="000000">
                   <a:hueOff val="0"/>
@@ -6246,6 +6422,19 @@
 Points status updated to Reserved
 Prevents double-spend or race conditions</a:t>
           </a:r>
+          <a:endParaRPr lang="en-US" sz="900" kern="1200" dirty="0">
+            <a:solidFill>
+              <a:sysClr val="windowText" lastClr="000000">
+                <a:hueOff val="0"/>
+                <a:satOff val="0"/>
+                <a:lumOff val="0"/>
+                <a:alphaOff val="0"/>
+              </a:sysClr>
+            </a:solidFill>
+            <a:latin typeface="Calibri" panose="020F0502020204030204"/>
+            <a:ea typeface="+mn-ea"/>
+            <a:cs typeface="+mn-cs"/>
+          </a:endParaRPr>
         </a:p>
       </dsp:txBody>
       <dsp:txXfrm>
@@ -6323,7 +6512,7 @@
             <a:buNone/>
           </a:pPr>
           <a:r>
-            <a:rPr lang="en-US" sz="1050" kern="1200" dirty="0">
+            <a:rPr lang="en-US" sz="1050" kern="1200">
               <a:solidFill>
                 <a:sysClr val="window" lastClr="FFFFFF"/>
               </a:solidFill>
@@ -6333,6 +6522,14 @@
             </a:rPr>
             <a:t>Sweep (Order Submission)</a:t>
           </a:r>
+          <a:endParaRPr lang="en-US" sz="1050" kern="1200" dirty="0">
+            <a:solidFill>
+              <a:sysClr val="window" lastClr="FFFFFF"/>
+            </a:solidFill>
+            <a:latin typeface="Calibri" panose="020F0502020204030204"/>
+            <a:ea typeface="+mn-ea"/>
+            <a:cs typeface="+mn-cs"/>
+          </a:endParaRPr>
         </a:p>
       </dsp:txBody>
       <dsp:txXfrm>
@@ -6410,7 +6607,7 @@
             <a:buNone/>
           </a:pPr>
           <a:r>
-            <a:rPr lang="en-US" sz="900" kern="1200" dirty="0">
+            <a:rPr lang="en-US" sz="900" kern="1200">
               <a:solidFill>
                 <a:sysClr val="windowText" lastClr="000000">
                   <a:hueOff val="0"/>
@@ -6429,7 +6626,7 @@
 Orders marked </a:t>
           </a:r>
           <a:r>
-            <a:rPr lang="en-US" sz="900" b="1" kern="1200" dirty="0">
+            <a:rPr lang="en-US" sz="900" b="1" kern="1200">
               <a:solidFill>
                 <a:sysClr val="windowText" lastClr="000000">
                   <a:hueOff val="0"/>
@@ -6444,6 +6641,19 @@
             </a:rPr>
             <a:t>Placed</a:t>
           </a:r>
+          <a:endParaRPr lang="en-US" sz="900" b="1" kern="1200" dirty="0">
+            <a:solidFill>
+              <a:sysClr val="windowText" lastClr="000000">
+                <a:hueOff val="0"/>
+                <a:satOff val="0"/>
+                <a:lumOff val="0"/>
+                <a:alphaOff val="0"/>
+              </a:sysClr>
+            </a:solidFill>
+            <a:latin typeface="Calibri" panose="020F0502020204030204"/>
+            <a:ea typeface="+mn-ea"/>
+            <a:cs typeface="+mn-cs"/>
+          </a:endParaRPr>
         </a:p>
       </dsp:txBody>
       <dsp:txXfrm>
@@ -6521,7 +6731,7 @@
             <a:buNone/>
           </a:pPr>
           <a:r>
-            <a:rPr lang="en-US" sz="1050" kern="1200" dirty="0">
+            <a:rPr lang="en-US" sz="1050" kern="1200">
               <a:solidFill>
                 <a:sysClr val="window" lastClr="FFFFFF"/>
               </a:solidFill>
@@ -6531,6 +6741,14 @@
             </a:rPr>
             <a:t>Debit Points</a:t>
           </a:r>
+          <a:endParaRPr lang="en-US" sz="1050" kern="1200" dirty="0">
+            <a:solidFill>
+              <a:sysClr val="window" lastClr="FFFFFF"/>
+            </a:solidFill>
+            <a:latin typeface="Calibri" panose="020F0502020204030204"/>
+            <a:ea typeface="+mn-ea"/>
+            <a:cs typeface="+mn-cs"/>
+          </a:endParaRPr>
         </a:p>
       </dsp:txBody>
       <dsp:txXfrm>
@@ -6608,7 +6826,7 @@
             <a:buNone/>
           </a:pPr>
           <a:r>
-            <a:rPr lang="en-US" sz="900" kern="1200" dirty="0">
+            <a:rPr lang="en-US" sz="900" kern="1200">
               <a:solidFill>
                 <a:sysClr val="windowText" lastClr="000000">
                   <a:hueOff val="0"/>
@@ -6627,6 +6845,19 @@
 Full audit linkage:
 Points status updated to Debited</a:t>
           </a:r>
+          <a:endParaRPr lang="en-US" sz="900" kern="1200" dirty="0">
+            <a:solidFill>
+              <a:sysClr val="windowText" lastClr="000000">
+                <a:hueOff val="0"/>
+                <a:satOff val="0"/>
+                <a:lumOff val="0"/>
+                <a:alphaOff val="0"/>
+              </a:sysClr>
+            </a:solidFill>
+            <a:latin typeface="Calibri" panose="020F0502020204030204"/>
+            <a:ea typeface="+mn-ea"/>
+            <a:cs typeface="+mn-cs"/>
+          </a:endParaRPr>
         </a:p>
       </dsp:txBody>
       <dsp:txXfrm>
@@ -6704,7 +6935,7 @@
             <a:buNone/>
           </a:pPr>
           <a:r>
-            <a:rPr lang="en-US" sz="1050" kern="1200" dirty="0">
+            <a:rPr lang="en-US" sz="1050" kern="1200">
               <a:solidFill>
                 <a:sysClr val="window" lastClr="FFFFFF"/>
               </a:solidFill>
@@ -6714,6 +6945,14 @@
             </a:rPr>
             <a:t>Broker Execution</a:t>
           </a:r>
+          <a:endParaRPr lang="en-US" sz="1050" kern="1200" dirty="0">
+            <a:solidFill>
+              <a:sysClr val="window" lastClr="FFFFFF"/>
+            </a:solidFill>
+            <a:latin typeface="Calibri" panose="020F0502020204030204"/>
+            <a:ea typeface="+mn-ea"/>
+            <a:cs typeface="+mn-cs"/>
+          </a:endParaRPr>
         </a:p>
       </dsp:txBody>
       <dsp:txXfrm>
@@ -6791,7 +7030,7 @@
             <a:buNone/>
           </a:pPr>
           <a:r>
-            <a:rPr lang="en-US" sz="900" kern="1200" dirty="0">
+            <a:rPr lang="en-US" sz="900" kern="1200">
               <a:solidFill>
                 <a:sysClr val="windowText" lastClr="000000">
                   <a:hueOff val="0"/>
@@ -6809,7 +7048,7 @@
 Orders marked </a:t>
           </a:r>
           <a:r>
-            <a:rPr lang="en-US" sz="900" b="1" kern="1200" dirty="0">
+            <a:rPr lang="en-US" sz="900" b="1" kern="1200">
               <a:solidFill>
                 <a:sysClr val="windowText" lastClr="000000">
                   <a:hueOff val="0"/>
@@ -6824,6 +7063,19 @@
             </a:rPr>
             <a:t>Confirmed</a:t>
           </a:r>
+          <a:endParaRPr lang="en-US" sz="900" b="1" kern="1200" dirty="0">
+            <a:solidFill>
+              <a:sysClr val="windowText" lastClr="000000">
+                <a:hueOff val="0"/>
+                <a:satOff val="0"/>
+                <a:lumOff val="0"/>
+                <a:alphaOff val="0"/>
+              </a:sysClr>
+            </a:solidFill>
+            <a:latin typeface="Calibri" panose="020F0502020204030204"/>
+            <a:ea typeface="+mn-ea"/>
+            <a:cs typeface="+mn-cs"/>
+          </a:endParaRPr>
         </a:p>
       </dsp:txBody>
       <dsp:txXfrm>
@@ -6901,7 +7153,7 @@
             <a:buNone/>
           </a:pPr>
           <a:r>
-            <a:rPr lang="en-US" sz="1050" kern="1200" dirty="0">
+            <a:rPr lang="en-US" sz="1050" kern="1200">
               <a:solidFill>
                 <a:sysClr val="window" lastClr="FFFFFF"/>
               </a:solidFill>
@@ -6911,6 +7163,14 @@
             </a:rPr>
             <a:t>Payment &amp; Allocation</a:t>
           </a:r>
+          <a:endParaRPr lang="en-US" sz="1050" kern="1200" dirty="0">
+            <a:solidFill>
+              <a:sysClr val="window" lastClr="FFFFFF"/>
+            </a:solidFill>
+            <a:latin typeface="Calibri" panose="020F0502020204030204"/>
+            <a:ea typeface="+mn-ea"/>
+            <a:cs typeface="+mn-cs"/>
+          </a:endParaRPr>
         </a:p>
       </dsp:txBody>
       <dsp:txXfrm>
@@ -6988,7 +7248,7 @@
             <a:buNone/>
           </a:pPr>
           <a:r>
-            <a:rPr lang="en-US" sz="900" kern="1200" dirty="0">
+            <a:rPr lang="en-US" sz="900" kern="1200">
               <a:solidFill>
                 <a:sysClr val="windowText" lastClr="000000">
                   <a:hueOff val="0"/>
@@ -7006,6 +7266,19 @@
 Merchant executes ACH payment to broker(s)
 Allocation file sent for account-level crediting</a:t>
           </a:r>
+          <a:endParaRPr lang="en-US" sz="900" kern="1200" dirty="0">
+            <a:solidFill>
+              <a:sysClr val="windowText" lastClr="000000">
+                <a:hueOff val="0"/>
+                <a:satOff val="0"/>
+                <a:lumOff val="0"/>
+                <a:alphaOff val="0"/>
+              </a:sysClr>
+            </a:solidFill>
+            <a:latin typeface="Calibri" panose="020F0502020204030204"/>
+            <a:ea typeface="+mn-ea"/>
+            <a:cs typeface="+mn-cs"/>
+          </a:endParaRPr>
         </a:p>
       </dsp:txBody>
       <dsp:txXfrm>
@@ -7083,7 +7356,7 @@
             <a:buNone/>
           </a:pPr>
           <a:r>
-            <a:rPr lang="en-US" sz="1050" kern="1200" dirty="0">
+            <a:rPr lang="en-US" sz="1050" kern="1200">
               <a:solidFill>
                 <a:sysClr val="window" lastClr="FFFFFF"/>
               </a:solidFill>
@@ -7093,6 +7366,14 @@
             </a:rPr>
             <a:t>Settlement</a:t>
           </a:r>
+          <a:endParaRPr lang="en-US" sz="1050" kern="1200" dirty="0">
+            <a:solidFill>
+              <a:sysClr val="window" lastClr="FFFFFF"/>
+            </a:solidFill>
+            <a:latin typeface="Calibri" panose="020F0502020204030204"/>
+            <a:ea typeface="+mn-ea"/>
+            <a:cs typeface="+mn-cs"/>
+          </a:endParaRPr>
         </a:p>
       </dsp:txBody>
       <dsp:txXfrm>
@@ -7170,7 +7451,7 @@
             <a:buNone/>
           </a:pPr>
           <a:r>
-            <a:rPr lang="en-US" sz="900" kern="1200" dirty="0">
+            <a:rPr lang="en-US" sz="900" kern="1200">
               <a:solidFill>
                 <a:sysClr val="windowText" lastClr="000000">
                   <a:hueOff val="0"/>
@@ -7189,7 +7470,7 @@
 Orders marked </a:t>
           </a:r>
           <a:r>
-            <a:rPr lang="en-US" sz="900" b="1" kern="1200" dirty="0">
+            <a:rPr lang="en-US" sz="900" b="1" kern="1200">
               <a:solidFill>
                 <a:sysClr val="windowText" lastClr="000000">
                   <a:hueOff val="0"/>
@@ -7204,6 +7485,19 @@
             </a:rPr>
             <a:t>Settled</a:t>
           </a:r>
+          <a:endParaRPr lang="en-US" sz="900" b="1" kern="1200" dirty="0">
+            <a:solidFill>
+              <a:sysClr val="windowText" lastClr="000000">
+                <a:hueOff val="0"/>
+                <a:satOff val="0"/>
+                <a:lumOff val="0"/>
+                <a:alphaOff val="0"/>
+              </a:sysClr>
+            </a:solidFill>
+            <a:latin typeface="Calibri" panose="020F0502020204030204"/>
+            <a:ea typeface="+mn-ea"/>
+            <a:cs typeface="+mn-cs"/>
+          </a:endParaRPr>
         </a:p>
       </dsp:txBody>
       <dsp:txXfrm>
@@ -10137,7 +10431,13 @@
   <p:cSld>
     <p:spTree>
       <p:nvGrpSpPr>
-        <p:cNvPr id="1" name=""/>
+        <p:cNvPr id="1" name="">
+          <a:extLst>
+            <a:ext uri="{FF2B5EF4-FFF2-40B4-BE49-F238E27FC236}">
+              <a16:creationId xmlns:a16="http://schemas.microsoft.com/office/drawing/2014/main" id="{4252B9AF-364B-C94E-06C7-BD867894FB1A}"/>
+            </a:ext>
+          </a:extLst>
+        </p:cNvPr>
         <p:cNvGrpSpPr/>
         <p:nvPr/>
       </p:nvGrpSpPr>
@@ -10149,57 +10449,12 @@
           <a:chExt cx="0" cy="0"/>
         </a:xfrm>
       </p:grpSpPr>
-      <p:sp>
-        <p:nvSpPr>
-          <p:cNvPr id="2" name="AutoShape 2">
+      <p:pic>
+        <p:nvPicPr>
+          <p:cNvPr id="5" name="Picture 4">
             <a:extLst>
               <a:ext uri="{FF2B5EF4-FFF2-40B4-BE49-F238E27FC236}">
-                <a16:creationId xmlns:a16="http://schemas.microsoft.com/office/drawing/2014/main" id="{8988E6D8-0388-15D0-79D4-8F5A1F4D5577}"/>
-              </a:ext>
-            </a:extLst>
-          </p:cNvPr>
-          <p:cNvSpPr>
-            <a:spLocks noChangeAspect="1" noChangeArrowheads="1"/>
-          </p:cNvSpPr>
-          <p:nvPr/>
-        </p:nvSpPr>
-        <p:spPr bwMode="auto">
-          <a:xfrm>
-            <a:off x="4419600" y="2419350"/>
-            <a:ext cx="304800" cy="304800"/>
-          </a:xfrm>
-          <a:prstGeom prst="rect">
-            <a:avLst/>
-          </a:prstGeom>
-          <a:noFill/>
-          <a:extLst>
-            <a:ext uri="{909E8E84-426E-40DD-AFC4-6F175D3DCCD1}">
-              <a14:hiddenFill xmlns:a14="http://schemas.microsoft.com/office/drawing/2010/main">
-                <a:solidFill>
-                  <a:srgbClr val="FFFFFF"/>
-                </a:solidFill>
-              </a14:hiddenFill>
-            </a:ext>
-          </a:extLst>
-        </p:spPr>
-        <p:txBody>
-          <a:bodyPr vert="horz" wrap="square" lIns="91440" tIns="45720" rIns="91440" bIns="45720" numCol="1" anchor="t" anchorCtr="0" compatLnSpc="1">
-            <a:prstTxWarp prst="textNoShape">
-              <a:avLst/>
-            </a:prstTxWarp>
-          </a:bodyPr>
-          <a:lstStyle/>
-          <a:p>
-            <a:endParaRPr lang="en-US"/>
-          </a:p>
-        </p:txBody>
-      </p:sp>
-      <p:pic>
-        <p:nvPicPr>
-          <p:cNvPr id="4" name="Picture 3">
-            <a:extLst>
-              <a:ext uri="{FF2B5EF4-FFF2-40B4-BE49-F238E27FC236}">
-                <a16:creationId xmlns:a16="http://schemas.microsoft.com/office/drawing/2014/main" id="{DCD0B116-6CF5-9C50-282B-CB7B793B28A3}"/>
+                <a16:creationId xmlns:a16="http://schemas.microsoft.com/office/drawing/2014/main" id="{ACAD7408-F5AA-05ED-6BAE-4C0FC8AE1A1A}"/>
               </a:ext>
             </a:extLst>
           </p:cNvPr>
@@ -10216,36 +10471,6 @@
         </p:blipFill>
         <p:spPr>
           <a:xfrm>
-            <a:off x="714375" y="0"/>
-            <a:ext cx="7715250" cy="5143500"/>
-          </a:xfrm>
-          <a:prstGeom prst="rect">
-            <a:avLst/>
-          </a:prstGeom>
-        </p:spPr>
-      </p:pic>
-      <p:pic>
-        <p:nvPicPr>
-          <p:cNvPr id="5" name="Picture 4">
-            <a:extLst>
-              <a:ext uri="{FF2B5EF4-FFF2-40B4-BE49-F238E27FC236}">
-                <a16:creationId xmlns:a16="http://schemas.microsoft.com/office/drawing/2014/main" id="{9B774FA9-3F79-C56F-FB2F-914E81F5AF77}"/>
-              </a:ext>
-            </a:extLst>
-          </p:cNvPr>
-          <p:cNvPicPr>
-            <a:picLocks noChangeAspect="1"/>
-          </p:cNvPicPr>
-          <p:nvPr/>
-        </p:nvPicPr>
-        <p:blipFill>
-          <a:blip r:embed="rId3"/>
-          <a:stretch>
-            <a:fillRect/>
-          </a:stretch>
-        </p:blipFill>
-        <p:spPr>
-          <a:xfrm>
             <a:off x="263877" y="156245"/>
             <a:ext cx="1102571" cy="330195"/>
           </a:xfrm>
@@ -10254,10 +10479,2546 @@
           </a:prstGeom>
         </p:spPr>
       </p:pic>
+      <p:sp>
+        <p:nvSpPr>
+          <p:cNvPr id="69" name="TextBox 68">
+            <a:extLst>
+              <a:ext uri="{FF2B5EF4-FFF2-40B4-BE49-F238E27FC236}">
+                <a16:creationId xmlns:a16="http://schemas.microsoft.com/office/drawing/2014/main" id="{F8E4A816-AD19-6702-8BD5-4B7DDDD8C5C2}"/>
+              </a:ext>
+            </a:extLst>
+          </p:cNvPr>
+          <p:cNvSpPr txBox="1"/>
+          <p:nvPr/>
+        </p:nvSpPr>
+        <p:spPr>
+          <a:xfrm>
+            <a:off x="2730152" y="15607"/>
+            <a:ext cx="3554178" cy="477054"/>
+          </a:xfrm>
+          <a:prstGeom prst="rect">
+            <a:avLst/>
+          </a:prstGeom>
+          <a:noFill/>
+        </p:spPr>
+        <p:txBody>
+          <a:bodyPr wrap="none" rtlCol="0">
+            <a:spAutoFit/>
+          </a:bodyPr>
+          <a:lstStyle/>
+          <a:p>
+            <a:pPr algn="ctr"/>
+            <a:r>
+              <a:rPr lang="en-US" sz="1400" b="1" dirty="0">
+                <a:solidFill>
+                  <a:schemeClr val="tx1">
+                    <a:lumMod val="85000"/>
+                    <a:lumOff val="15000"/>
+                  </a:schemeClr>
+                </a:solidFill>
+              </a:rPr>
+              <a:t>Stock</a:t>
+            </a:r>
+            <a:r>
+              <a:rPr lang="en-US" sz="1400" i="1" dirty="0">
+                <a:solidFill>
+                  <a:schemeClr val="tx1">
+                    <a:lumMod val="85000"/>
+                    <a:lumOff val="15000"/>
+                  </a:schemeClr>
+                </a:solidFill>
+              </a:rPr>
+              <a:t>Loyal</a:t>
+            </a:r>
+            <a:r>
+              <a:rPr lang="en-US" sz="1400" dirty="0">
+                <a:solidFill>
+                  <a:schemeClr val="tx1">
+                    <a:lumMod val="85000"/>
+                    <a:lumOff val="15000"/>
+                  </a:schemeClr>
+                </a:solidFill>
+              </a:rPr>
+              <a:t> Operating Model</a:t>
+            </a:r>
+          </a:p>
+          <a:p>
+            <a:pPr algn="ctr"/>
+            <a:r>
+              <a:rPr lang="en-US" sz="1100" dirty="0">
+                <a:solidFill>
+                  <a:schemeClr val="tx1">
+                    <a:lumMod val="85000"/>
+                    <a:lumOff val="15000"/>
+                  </a:schemeClr>
+                </a:solidFill>
+              </a:rPr>
+              <a:t>Loyalty Point Conversion </a:t>
+            </a:r>
+            <a:r>
+              <a:rPr lang="en-US" sz="1100" dirty="0">
+                <a:solidFill>
+                  <a:schemeClr val="tx1">
+                    <a:lumMod val="85000"/>
+                    <a:lumOff val="15000"/>
+                  </a:schemeClr>
+                </a:solidFill>
+                <a:sym typeface="Wingdings" panose="05000000000000000000" pitchFamily="2" charset="2"/>
+              </a:rPr>
+              <a:t> Trade Execution  Settlement</a:t>
+            </a:r>
+            <a:endParaRPr lang="en-US" sz="1100" dirty="0">
+              <a:solidFill>
+                <a:schemeClr val="tx1">
+                  <a:lumMod val="85000"/>
+                  <a:lumOff val="15000"/>
+                </a:schemeClr>
+              </a:solidFill>
+            </a:endParaRPr>
+          </a:p>
+        </p:txBody>
+      </p:sp>
+      <p:grpSp>
+        <p:nvGrpSpPr>
+          <p:cNvPr id="98" name="Group 97">
+            <a:extLst>
+              <a:ext uri="{FF2B5EF4-FFF2-40B4-BE49-F238E27FC236}">
+                <a16:creationId xmlns:a16="http://schemas.microsoft.com/office/drawing/2014/main" id="{EAA2B6AD-9FE6-461D-E5BA-7CB3ABF78B12}"/>
+              </a:ext>
+            </a:extLst>
+          </p:cNvPr>
+          <p:cNvGrpSpPr/>
+          <p:nvPr/>
+        </p:nvGrpSpPr>
+        <p:grpSpPr>
+          <a:xfrm>
+            <a:off x="898478" y="603408"/>
+            <a:ext cx="7644013" cy="4433203"/>
+            <a:chOff x="898478" y="603408"/>
+            <a:chExt cx="7644013" cy="4433203"/>
+          </a:xfrm>
+        </p:grpSpPr>
+        <p:grpSp>
+          <p:nvGrpSpPr>
+            <p:cNvPr id="13" name="Group 12">
+              <a:extLst>
+                <a:ext uri="{FF2B5EF4-FFF2-40B4-BE49-F238E27FC236}">
+                  <a16:creationId xmlns:a16="http://schemas.microsoft.com/office/drawing/2014/main" id="{051FF058-5B1B-F369-2836-F66D145F8872}"/>
+                </a:ext>
+              </a:extLst>
+            </p:cNvPr>
+            <p:cNvGrpSpPr/>
+            <p:nvPr/>
+          </p:nvGrpSpPr>
+          <p:grpSpPr>
+            <a:xfrm>
+              <a:off x="2462615" y="603408"/>
+              <a:ext cx="4111256" cy="843516"/>
+              <a:chOff x="2516372" y="1900570"/>
+              <a:chExt cx="4111256" cy="843516"/>
+            </a:xfrm>
+          </p:grpSpPr>
+          <p:sp>
+            <p:nvSpPr>
+              <p:cNvPr id="2" name="AutoShape 2">
+                <a:extLst>
+                  <a:ext uri="{FF2B5EF4-FFF2-40B4-BE49-F238E27FC236}">
+                    <a16:creationId xmlns:a16="http://schemas.microsoft.com/office/drawing/2014/main" id="{C452CC79-3F9C-44A1-2A96-6F53B1CF0841}"/>
+                  </a:ext>
+                </a:extLst>
+              </p:cNvPr>
+              <p:cNvSpPr>
+                <a:spLocks noChangeAspect="1" noChangeArrowheads="1"/>
+              </p:cNvSpPr>
+              <p:nvPr/>
+            </p:nvSpPr>
+            <p:spPr bwMode="auto">
+              <a:xfrm>
+                <a:off x="4419600" y="2419350"/>
+                <a:ext cx="304800" cy="304800"/>
+              </a:xfrm>
+              <a:prstGeom prst="rect">
+                <a:avLst/>
+              </a:prstGeom>
+              <a:noFill/>
+              <a:extLst>
+                <a:ext uri="{909E8E84-426E-40DD-AFC4-6F175D3DCCD1}">
+                  <a14:hiddenFill xmlns:a14="http://schemas.microsoft.com/office/drawing/2010/main">
+                    <a:solidFill>
+                      <a:srgbClr val="FFFFFF"/>
+                    </a:solidFill>
+                  </a14:hiddenFill>
+                </a:ext>
+              </a:extLst>
+            </p:spPr>
+            <p:txBody>
+              <a:bodyPr vert="horz" wrap="square" lIns="91440" tIns="45720" rIns="91440" bIns="45720" numCol="1" anchor="t" anchorCtr="0" compatLnSpc="1">
+                <a:prstTxWarp prst="textNoShape">
+                  <a:avLst/>
+                </a:prstTxWarp>
+              </a:bodyPr>
+              <a:lstStyle/>
+              <a:p>
+                <a:pPr marL="0" marR="0" lvl="0" indent="0" algn="l" defTabSz="914400" rtl="0" eaLnBrk="1" fontAlgn="auto" latinLnBrk="0" hangingPunct="1">
+                  <a:lnSpc>
+                    <a:spcPct val="100000"/>
+                  </a:lnSpc>
+                  <a:spcBef>
+                    <a:spcPts val="0"/>
+                  </a:spcBef>
+                  <a:spcAft>
+                    <a:spcPts val="0"/>
+                  </a:spcAft>
+                  <a:buClrTx/>
+                  <a:buSzTx/>
+                  <a:buFontTx/>
+                  <a:buNone/>
+                  <a:tabLst/>
+                  <a:defRPr/>
+                </a:pPr>
+                <a:endParaRPr kumimoji="0" lang="en-US" sz="1800" b="0" i="0" u="none" strike="noStrike" kern="1200" cap="none" spc="0" normalizeH="0" baseline="0" noProof="0">
+                  <a:ln>
+                    <a:noFill/>
+                  </a:ln>
+                  <a:solidFill>
+                    <a:prstClr val="black"/>
+                  </a:solidFill>
+                  <a:effectLst/>
+                  <a:uLnTx/>
+                  <a:uFillTx/>
+                  <a:latin typeface="Calibri" panose="020F0502020204030204"/>
+                  <a:ea typeface="+mn-ea"/>
+                  <a:cs typeface="+mn-cs"/>
+                </a:endParaRPr>
+              </a:p>
+            </p:txBody>
+          </p:sp>
+          <p:sp>
+            <p:nvSpPr>
+              <p:cNvPr id="3" name="Rectangle: Diagonal Corners Rounded 2">
+                <a:extLst>
+                  <a:ext uri="{FF2B5EF4-FFF2-40B4-BE49-F238E27FC236}">
+                    <a16:creationId xmlns:a16="http://schemas.microsoft.com/office/drawing/2014/main" id="{B3B43CC3-3388-BEB2-7CB7-372603C80C3C}"/>
+                  </a:ext>
+                </a:extLst>
+              </p:cNvPr>
+              <p:cNvSpPr/>
+              <p:nvPr/>
+            </p:nvSpPr>
+            <p:spPr>
+              <a:xfrm>
+                <a:off x="2516372" y="1900570"/>
+                <a:ext cx="4111256" cy="843516"/>
+              </a:xfrm>
+              <a:prstGeom prst="round2DiagRect">
+                <a:avLst>
+                  <a:gd name="adj1" fmla="val 8264"/>
+                  <a:gd name="adj2" fmla="val 0"/>
+                </a:avLst>
+              </a:prstGeom>
+              <a:gradFill flip="none" rotWithShape="1">
+                <a:gsLst>
+                  <a:gs pos="0">
+                    <a:schemeClr val="accent1">
+                      <a:lumMod val="67000"/>
+                    </a:schemeClr>
+                  </a:gs>
+                  <a:gs pos="48000">
+                    <a:schemeClr val="accent1">
+                      <a:lumMod val="97000"/>
+                      <a:lumOff val="3000"/>
+                    </a:schemeClr>
+                  </a:gs>
+                  <a:gs pos="100000">
+                    <a:schemeClr val="accent1">
+                      <a:lumMod val="60000"/>
+                      <a:lumOff val="40000"/>
+                    </a:schemeClr>
+                  </a:gs>
+                </a:gsLst>
+                <a:lin ang="18000000" scaled="0"/>
+                <a:tileRect/>
+              </a:gradFill>
+              <a:ln>
+                <a:noFill/>
+              </a:ln>
+            </p:spPr>
+            <p:style>
+              <a:lnRef idx="0">
+                <a:scrgbClr r="0" g="0" b="0"/>
+              </a:lnRef>
+              <a:fillRef idx="0">
+                <a:scrgbClr r="0" g="0" b="0"/>
+              </a:fillRef>
+              <a:effectRef idx="0">
+                <a:scrgbClr r="0" g="0" b="0"/>
+              </a:effectRef>
+              <a:fontRef idx="minor">
+                <a:schemeClr val="lt1"/>
+              </a:fontRef>
+            </p:style>
+            <p:txBody>
+              <a:bodyPr rtlCol="0" anchor="ctr"/>
+              <a:lstStyle/>
+              <a:p>
+                <a:pPr algn="ctr"/>
+                <a:endParaRPr lang="en-US" dirty="0"/>
+              </a:p>
+            </p:txBody>
+          </p:sp>
+          <p:pic>
+            <p:nvPicPr>
+              <p:cNvPr id="9" name="Graphic 8" descr="Trophy outline">
+                <a:extLst>
+                  <a:ext uri="{FF2B5EF4-FFF2-40B4-BE49-F238E27FC236}">
+                    <a16:creationId xmlns:a16="http://schemas.microsoft.com/office/drawing/2014/main" id="{D6A013F9-D8B9-7A62-0643-BEFE87CA667C}"/>
+                  </a:ext>
+                </a:extLst>
+              </p:cNvPr>
+              <p:cNvPicPr>
+                <a:picLocks noChangeAspect="1"/>
+              </p:cNvPicPr>
+              <p:nvPr/>
+            </p:nvPicPr>
+            <p:blipFill>
+              <a:blip r:embed="rId3">
+                <a:extLst>
+                  <a:ext uri="{96DAC541-7B7A-43D3-8B79-37D633B846F1}">
+                    <asvg:svgBlip xmlns:asvg="http://schemas.microsoft.com/office/drawing/2016/SVG/main" r:embed="rId4"/>
+                  </a:ext>
+                </a:extLst>
+              </a:blip>
+              <a:stretch>
+                <a:fillRect/>
+              </a:stretch>
+            </p:blipFill>
+            <p:spPr>
+              <a:xfrm>
+                <a:off x="2555249" y="1998920"/>
+                <a:ext cx="514019" cy="571943"/>
+              </a:xfrm>
+              <a:prstGeom prst="rect">
+                <a:avLst/>
+              </a:prstGeom>
+            </p:spPr>
+          </p:pic>
+          <p:sp>
+            <p:nvSpPr>
+              <p:cNvPr id="10" name="TextBox 9">
+                <a:extLst>
+                  <a:ext uri="{FF2B5EF4-FFF2-40B4-BE49-F238E27FC236}">
+                    <a16:creationId xmlns:a16="http://schemas.microsoft.com/office/drawing/2014/main" id="{C32689AB-0F7E-572E-59EF-D5AFFAE54491}"/>
+                  </a:ext>
+                </a:extLst>
+              </p:cNvPr>
+              <p:cNvSpPr txBox="1"/>
+              <p:nvPr/>
+            </p:nvSpPr>
+            <p:spPr>
+              <a:xfrm>
+                <a:off x="3046749" y="1986197"/>
+                <a:ext cx="2128531" cy="307777"/>
+              </a:xfrm>
+              <a:prstGeom prst="rect">
+                <a:avLst/>
+              </a:prstGeom>
+              <a:noFill/>
+            </p:spPr>
+            <p:txBody>
+              <a:bodyPr wrap="none" rtlCol="0">
+                <a:spAutoFit/>
+              </a:bodyPr>
+              <a:lstStyle/>
+              <a:p>
+                <a:r>
+                  <a:rPr lang="en-US" sz="1400" dirty="0">
+                    <a:solidFill>
+                      <a:schemeClr val="bg1"/>
+                    </a:solidFill>
+                  </a:rPr>
+                  <a:t>Merchant Loyalty Platform</a:t>
+                </a:r>
+              </a:p>
+            </p:txBody>
+          </p:sp>
+          <p:sp>
+            <p:nvSpPr>
+              <p:cNvPr id="11" name="TextBox 10">
+                <a:extLst>
+                  <a:ext uri="{FF2B5EF4-FFF2-40B4-BE49-F238E27FC236}">
+                    <a16:creationId xmlns:a16="http://schemas.microsoft.com/office/drawing/2014/main" id="{0CC4BEF6-3F20-2346-FD17-B9BD8D937A7B}"/>
+                  </a:ext>
+                </a:extLst>
+              </p:cNvPr>
+              <p:cNvSpPr txBox="1"/>
+              <p:nvPr/>
+            </p:nvSpPr>
+            <p:spPr>
+              <a:xfrm>
+                <a:off x="3052583" y="2226587"/>
+                <a:ext cx="1609095" cy="369332"/>
+              </a:xfrm>
+              <a:prstGeom prst="rect">
+                <a:avLst/>
+              </a:prstGeom>
+              <a:noFill/>
+            </p:spPr>
+            <p:txBody>
+              <a:bodyPr wrap="none" rtlCol="0">
+                <a:spAutoFit/>
+              </a:bodyPr>
+              <a:lstStyle/>
+              <a:p>
+                <a:pPr marL="91440" indent="-91440">
+                  <a:buFont typeface="Arial" panose="020B0604020202020204" pitchFamily="34" charset="0"/>
+                  <a:buChar char="•"/>
+                </a:pPr>
+                <a:r>
+                  <a:rPr lang="en-US" sz="900" dirty="0">
+                    <a:solidFill>
+                      <a:schemeClr val="bg1"/>
+                    </a:solidFill>
+                  </a:rPr>
+                  <a:t>Points balance management</a:t>
+                </a:r>
+              </a:p>
+              <a:p>
+                <a:pPr marL="91440" indent="-91440">
+                  <a:buFont typeface="Arial" panose="020B0604020202020204" pitchFamily="34" charset="0"/>
+                  <a:buChar char="•"/>
+                </a:pPr>
+                <a:r>
+                  <a:rPr lang="en-US" sz="900" dirty="0">
+                    <a:solidFill>
+                      <a:schemeClr val="bg1"/>
+                    </a:solidFill>
+                  </a:rPr>
+                  <a:t>Member eligibility</a:t>
+                </a:r>
+              </a:p>
+            </p:txBody>
+          </p:sp>
+          <p:sp>
+            <p:nvSpPr>
+              <p:cNvPr id="12" name="TextBox 11">
+                <a:extLst>
+                  <a:ext uri="{FF2B5EF4-FFF2-40B4-BE49-F238E27FC236}">
+                    <a16:creationId xmlns:a16="http://schemas.microsoft.com/office/drawing/2014/main" id="{D7B9B34E-53B2-7BEB-02A5-DC9F08CF17FC}"/>
+                  </a:ext>
+                </a:extLst>
+              </p:cNvPr>
+              <p:cNvSpPr txBox="1"/>
+              <p:nvPr/>
+            </p:nvSpPr>
+            <p:spPr>
+              <a:xfrm>
+                <a:off x="4746768" y="2234514"/>
+                <a:ext cx="1827103" cy="369332"/>
+              </a:xfrm>
+              <a:prstGeom prst="rect">
+                <a:avLst/>
+              </a:prstGeom>
+              <a:noFill/>
+            </p:spPr>
+            <p:txBody>
+              <a:bodyPr wrap="none" rtlCol="0">
+                <a:spAutoFit/>
+              </a:bodyPr>
+              <a:lstStyle/>
+              <a:p>
+                <a:pPr marL="91440" indent="-91440">
+                  <a:buFont typeface="Arial" panose="020B0604020202020204" pitchFamily="34" charset="0"/>
+                  <a:buChar char="•"/>
+                </a:pPr>
+                <a:r>
+                  <a:rPr lang="en-US" sz="900" dirty="0">
+                    <a:solidFill>
+                      <a:schemeClr val="bg1"/>
+                    </a:solidFill>
+                  </a:rPr>
+                  <a:t>Reservation | Debit confirmation</a:t>
+                </a:r>
+              </a:p>
+              <a:p>
+                <a:pPr marL="91440" indent="-91440">
+                  <a:buFont typeface="Arial" panose="020B0604020202020204" pitchFamily="34" charset="0"/>
+                  <a:buChar char="•"/>
+                </a:pPr>
+                <a:r>
+                  <a:rPr lang="en-US" sz="900" dirty="0">
+                    <a:solidFill>
+                      <a:schemeClr val="bg1"/>
+                    </a:solidFill>
+                  </a:rPr>
+                  <a:t>Loyalty ledger ownership</a:t>
+                </a:r>
+              </a:p>
+            </p:txBody>
+          </p:sp>
+        </p:grpSp>
+        <p:grpSp>
+          <p:nvGrpSpPr>
+            <p:cNvPr id="55" name="Group 54">
+              <a:extLst>
+                <a:ext uri="{FF2B5EF4-FFF2-40B4-BE49-F238E27FC236}">
+                  <a16:creationId xmlns:a16="http://schemas.microsoft.com/office/drawing/2014/main" id="{999F7D4B-5C4A-228E-F5E5-339818D5BE3A}"/>
+                </a:ext>
+              </a:extLst>
+            </p:cNvPr>
+            <p:cNvGrpSpPr/>
+            <p:nvPr/>
+          </p:nvGrpSpPr>
+          <p:grpSpPr>
+            <a:xfrm>
+              <a:off x="898478" y="3678818"/>
+              <a:ext cx="2615601" cy="1328906"/>
+              <a:chOff x="-905004" y="2292590"/>
+              <a:chExt cx="2615601" cy="1328906"/>
+            </a:xfrm>
+          </p:grpSpPr>
+          <p:grpSp>
+            <p:nvGrpSpPr>
+              <p:cNvPr id="35" name="Group 34">
+                <a:extLst>
+                  <a:ext uri="{FF2B5EF4-FFF2-40B4-BE49-F238E27FC236}">
+                    <a16:creationId xmlns:a16="http://schemas.microsoft.com/office/drawing/2014/main" id="{96341CF7-829B-2EBE-8303-FB332ADBED90}"/>
+                  </a:ext>
+                </a:extLst>
+              </p:cNvPr>
+              <p:cNvGrpSpPr/>
+              <p:nvPr/>
+            </p:nvGrpSpPr>
+            <p:grpSpPr>
+              <a:xfrm>
+                <a:off x="-905004" y="2292590"/>
+                <a:ext cx="2615601" cy="1328906"/>
+                <a:chOff x="2923773" y="2088023"/>
+                <a:chExt cx="2615601" cy="1328906"/>
+              </a:xfrm>
+            </p:grpSpPr>
+            <p:grpSp>
+              <p:nvGrpSpPr>
+                <p:cNvPr id="36" name="Group 35">
+                  <a:extLst>
+                    <a:ext uri="{FF2B5EF4-FFF2-40B4-BE49-F238E27FC236}">
+                      <a16:creationId xmlns:a16="http://schemas.microsoft.com/office/drawing/2014/main" id="{6DA4AB40-C3C3-14C1-C6B8-6AF93BA8A49A}"/>
+                    </a:ext>
+                  </a:extLst>
+                </p:cNvPr>
+                <p:cNvGrpSpPr/>
+                <p:nvPr/>
+              </p:nvGrpSpPr>
+              <p:grpSpPr>
+                <a:xfrm>
+                  <a:off x="2923773" y="2088023"/>
+                  <a:ext cx="2615601" cy="1328906"/>
+                  <a:chOff x="2916605" y="2654597"/>
+                  <a:chExt cx="2615601" cy="1328906"/>
+                </a:xfrm>
+              </p:grpSpPr>
+              <p:sp>
+                <p:nvSpPr>
+                  <p:cNvPr id="39" name="Rectangle: Diagonal Corners Rounded 38">
+                    <a:extLst>
+                      <a:ext uri="{FF2B5EF4-FFF2-40B4-BE49-F238E27FC236}">
+                        <a16:creationId xmlns:a16="http://schemas.microsoft.com/office/drawing/2014/main" id="{7EB4A95D-32AD-F6AA-5434-9839FB04E583}"/>
+                      </a:ext>
+                    </a:extLst>
+                  </p:cNvPr>
+                  <p:cNvSpPr/>
+                  <p:nvPr/>
+                </p:nvSpPr>
+                <p:spPr>
+                  <a:xfrm>
+                    <a:off x="2916605" y="2656385"/>
+                    <a:ext cx="2615601" cy="1327118"/>
+                  </a:xfrm>
+                  <a:prstGeom prst="round2DiagRect">
+                    <a:avLst>
+                      <a:gd name="adj1" fmla="val 3746"/>
+                      <a:gd name="adj2" fmla="val 0"/>
+                    </a:avLst>
+                  </a:prstGeom>
+                  <a:gradFill>
+                    <a:gsLst>
+                      <a:gs pos="0">
+                        <a:srgbClr val="D7F2ED"/>
+                      </a:gs>
+                      <a:gs pos="48000">
+                        <a:srgbClr val="F0FCFA"/>
+                      </a:gs>
+                      <a:gs pos="97000">
+                        <a:srgbClr val="FFFFFF"/>
+                      </a:gs>
+                    </a:gsLst>
+                    <a:lin ang="18000000" scaled="0"/>
+                  </a:gradFill>
+                  <a:ln w="15875">
+                    <a:solidFill>
+                      <a:srgbClr val="5E6986"/>
+                    </a:solidFill>
+                  </a:ln>
+                </p:spPr>
+                <p:style>
+                  <a:lnRef idx="0">
+                    <a:scrgbClr r="0" g="0" b="0"/>
+                  </a:lnRef>
+                  <a:fillRef idx="0">
+                    <a:scrgbClr r="0" g="0" b="0"/>
+                  </a:fillRef>
+                  <a:effectRef idx="0">
+                    <a:scrgbClr r="0" g="0" b="0"/>
+                  </a:effectRef>
+                  <a:fontRef idx="minor">
+                    <a:schemeClr val="lt1"/>
+                  </a:fontRef>
+                </p:style>
+                <p:txBody>
+                  <a:bodyPr rtlCol="0" anchor="ctr"/>
+                  <a:lstStyle/>
+                  <a:p>
+                    <a:pPr algn="ctr"/>
+                    <a:endParaRPr lang="en-US"/>
+                  </a:p>
+                </p:txBody>
+              </p:sp>
+              <p:grpSp>
+                <p:nvGrpSpPr>
+                  <p:cNvPr id="40" name="Group 39">
+                    <a:extLst>
+                      <a:ext uri="{FF2B5EF4-FFF2-40B4-BE49-F238E27FC236}">
+                        <a16:creationId xmlns:a16="http://schemas.microsoft.com/office/drawing/2014/main" id="{97F23E45-B3F8-01D9-08AF-7EA9C3189586}"/>
+                      </a:ext>
+                    </a:extLst>
+                  </p:cNvPr>
+                  <p:cNvGrpSpPr/>
+                  <p:nvPr/>
+                </p:nvGrpSpPr>
+                <p:grpSpPr>
+                  <a:xfrm>
+                    <a:off x="2916605" y="2654597"/>
+                    <a:ext cx="2615601" cy="565811"/>
+                    <a:chOff x="2916605" y="2654597"/>
+                    <a:chExt cx="2615601" cy="565811"/>
+                  </a:xfrm>
+                </p:grpSpPr>
+                <p:sp>
+                  <p:nvSpPr>
+                    <p:cNvPr id="41" name="Rectangle: Diagonal Corners Rounded 40">
+                      <a:extLst>
+                        <a:ext uri="{FF2B5EF4-FFF2-40B4-BE49-F238E27FC236}">
+                          <a16:creationId xmlns:a16="http://schemas.microsoft.com/office/drawing/2014/main" id="{8BDE5FBD-D4B3-E48D-36C9-832F065F4CB0}"/>
+                        </a:ext>
+                      </a:extLst>
+                    </p:cNvPr>
+                    <p:cNvSpPr/>
+                    <p:nvPr/>
+                  </p:nvSpPr>
+                  <p:spPr>
+                    <a:xfrm>
+                      <a:off x="2916605" y="2654597"/>
+                      <a:ext cx="2615601" cy="565811"/>
+                    </a:xfrm>
+                    <a:prstGeom prst="round2DiagRect">
+                      <a:avLst>
+                        <a:gd name="adj1" fmla="val 8900"/>
+                        <a:gd name="adj2" fmla="val 0"/>
+                      </a:avLst>
+                    </a:prstGeom>
+                    <a:gradFill flip="none" rotWithShape="1">
+                      <a:gsLst>
+                        <a:gs pos="0">
+                          <a:srgbClr val="313849"/>
+                        </a:gs>
+                        <a:gs pos="48000">
+                          <a:srgbClr val="4B546D"/>
+                        </a:gs>
+                        <a:gs pos="98000">
+                          <a:srgbClr val="6E7A9B"/>
+                        </a:gs>
+                      </a:gsLst>
+                      <a:lin ang="18000000" scaled="0"/>
+                      <a:tileRect/>
+                    </a:gradFill>
+                    <a:ln>
+                      <a:solidFill>
+                        <a:srgbClr val="569B96"/>
+                      </a:solidFill>
+                    </a:ln>
+                  </p:spPr>
+                  <p:style>
+                    <a:lnRef idx="0">
+                      <a:scrgbClr r="0" g="0" b="0"/>
+                    </a:lnRef>
+                    <a:fillRef idx="0">
+                      <a:scrgbClr r="0" g="0" b="0"/>
+                    </a:fillRef>
+                    <a:effectRef idx="0">
+                      <a:scrgbClr r="0" g="0" b="0"/>
+                    </a:effectRef>
+                    <a:fontRef idx="minor">
+                      <a:schemeClr val="lt1"/>
+                    </a:fontRef>
+                  </p:style>
+                  <p:txBody>
+                    <a:bodyPr rtlCol="0" anchor="ctr"/>
+                    <a:lstStyle/>
+                    <a:p>
+                      <a:pPr algn="ctr"/>
+                      <a:endParaRPr lang="en-US" dirty="0"/>
+                    </a:p>
+                  </p:txBody>
+                </p:sp>
+                <p:sp>
+                  <p:nvSpPr>
+                    <p:cNvPr id="42" name="TextBox 41">
+                      <a:extLst>
+                        <a:ext uri="{FF2B5EF4-FFF2-40B4-BE49-F238E27FC236}">
+                          <a16:creationId xmlns:a16="http://schemas.microsoft.com/office/drawing/2014/main" id="{4D1F3882-42E4-34F2-6CE6-2569EF9490CF}"/>
+                        </a:ext>
+                      </a:extLst>
+                    </p:cNvPr>
+                    <p:cNvSpPr txBox="1"/>
+                    <p:nvPr/>
+                  </p:nvSpPr>
+                  <p:spPr>
+                    <a:xfrm>
+                      <a:off x="3540862" y="2656385"/>
+                      <a:ext cx="1200329" cy="307777"/>
+                    </a:xfrm>
+                    <a:prstGeom prst="rect">
+                      <a:avLst/>
+                    </a:prstGeom>
+                    <a:noFill/>
+                  </p:spPr>
+                  <p:txBody>
+                    <a:bodyPr wrap="none" rtlCol="0">
+                      <a:spAutoFit/>
+                    </a:bodyPr>
+                    <a:lstStyle/>
+                    <a:p>
+                      <a:r>
+                        <a:rPr lang="en-US" sz="1400" dirty="0">
+                          <a:solidFill>
+                            <a:schemeClr val="bg1"/>
+                          </a:solidFill>
+                        </a:rPr>
+                        <a:t>Broker-Dealer</a:t>
+                      </a:r>
+                    </a:p>
+                  </p:txBody>
+                </p:sp>
+                <p:sp>
+                  <p:nvSpPr>
+                    <p:cNvPr id="43" name="TextBox 42">
+                      <a:extLst>
+                        <a:ext uri="{FF2B5EF4-FFF2-40B4-BE49-F238E27FC236}">
+                          <a16:creationId xmlns:a16="http://schemas.microsoft.com/office/drawing/2014/main" id="{9EC97C32-32BE-1E3E-F6F2-C201DE35BC2F}"/>
+                        </a:ext>
+                      </a:extLst>
+                    </p:cNvPr>
+                    <p:cNvSpPr txBox="1"/>
+                    <p:nvPr/>
+                  </p:nvSpPr>
+                  <p:spPr>
+                    <a:xfrm>
+                      <a:off x="3512428" y="2902819"/>
+                      <a:ext cx="1883849" cy="246221"/>
+                    </a:xfrm>
+                    <a:prstGeom prst="rect">
+                      <a:avLst/>
+                    </a:prstGeom>
+                    <a:noFill/>
+                  </p:spPr>
+                  <p:txBody>
+                    <a:bodyPr wrap="none" rtlCol="0">
+                      <a:spAutoFit/>
+                    </a:bodyPr>
+                    <a:lstStyle/>
+                    <a:p>
+                      <a:r>
+                        <a:rPr lang="en-US" sz="1000" dirty="0">
+                          <a:solidFill>
+                            <a:schemeClr val="bg1"/>
+                          </a:solidFill>
+                        </a:rPr>
+                        <a:t>Robinhood, Charles Schwab, etc.</a:t>
+                      </a:r>
+                    </a:p>
+                  </p:txBody>
+                </p:sp>
+              </p:grpSp>
+            </p:grpSp>
+            <p:sp>
+              <p:nvSpPr>
+                <p:cNvPr id="37" name="TextBox 36">
+                  <a:extLst>
+                    <a:ext uri="{FF2B5EF4-FFF2-40B4-BE49-F238E27FC236}">
+                      <a16:creationId xmlns:a16="http://schemas.microsoft.com/office/drawing/2014/main" id="{E84CBC40-0C7F-B514-28EB-8775C5676AE8}"/>
+                    </a:ext>
+                  </a:extLst>
+                </p:cNvPr>
+                <p:cNvSpPr txBox="1"/>
+                <p:nvPr/>
+              </p:nvSpPr>
+              <p:spPr>
+                <a:xfrm>
+                  <a:off x="3169848" y="2678047"/>
+                  <a:ext cx="1201932" cy="707886"/>
+                </a:xfrm>
+                <a:prstGeom prst="rect">
+                  <a:avLst/>
+                </a:prstGeom>
+                <a:noFill/>
+              </p:spPr>
+              <p:txBody>
+                <a:bodyPr wrap="none" rtlCol="0">
+                  <a:spAutoFit/>
+                </a:bodyPr>
+                <a:lstStyle/>
+                <a:p>
+                  <a:pPr marL="91440" indent="-91440">
+                    <a:buFont typeface="Arial" panose="020B0604020202020204" pitchFamily="34" charset="0"/>
+                    <a:buChar char="•"/>
+                  </a:pPr>
+                  <a:r>
+                    <a:rPr lang="en-US" sz="1000" dirty="0">
+                      <a:solidFill>
+                        <a:schemeClr val="tx1">
+                          <a:lumMod val="65000"/>
+                          <a:lumOff val="35000"/>
+                        </a:schemeClr>
+                      </a:solidFill>
+                    </a:rPr>
+                    <a:t>Trade execution</a:t>
+                  </a:r>
+                </a:p>
+                <a:p>
+                  <a:pPr marL="91440" indent="-91440">
+                    <a:buFont typeface="Arial" panose="020B0604020202020204" pitchFamily="34" charset="0"/>
+                    <a:buChar char="•"/>
+                  </a:pPr>
+                  <a:r>
+                    <a:rPr lang="en-US" sz="1000" dirty="0">
+                      <a:solidFill>
+                        <a:schemeClr val="tx1">
+                          <a:lumMod val="65000"/>
+                          <a:lumOff val="35000"/>
+                        </a:schemeClr>
+                      </a:solidFill>
+                    </a:rPr>
+                    <a:t>Market pricing</a:t>
+                  </a:r>
+                </a:p>
+                <a:p>
+                  <a:pPr marL="91440" indent="-91440">
+                    <a:buFont typeface="Arial" panose="020B0604020202020204" pitchFamily="34" charset="0"/>
+                    <a:buChar char="•"/>
+                  </a:pPr>
+                  <a:r>
+                    <a:rPr lang="en-US" sz="1000" dirty="0">
+                      <a:solidFill>
+                        <a:schemeClr val="tx1">
+                          <a:lumMod val="65000"/>
+                          <a:lumOff val="35000"/>
+                        </a:schemeClr>
+                      </a:solidFill>
+                    </a:rPr>
+                    <a:t>Confirmations</a:t>
+                  </a:r>
+                </a:p>
+                <a:p>
+                  <a:pPr marL="91440" indent="-91440">
+                    <a:buFont typeface="Arial" panose="020B0604020202020204" pitchFamily="34" charset="0"/>
+                    <a:buChar char="•"/>
+                  </a:pPr>
+                  <a:r>
+                    <a:rPr lang="en-US" sz="1000" dirty="0">
+                      <a:solidFill>
+                        <a:schemeClr val="tx1">
+                          <a:lumMod val="65000"/>
+                          <a:lumOff val="35000"/>
+                        </a:schemeClr>
+                      </a:solidFill>
+                    </a:rPr>
+                    <a:t>Custodial services</a:t>
+                  </a:r>
+                </a:p>
+              </p:txBody>
+            </p:sp>
+          </p:grpSp>
+          <p:pic>
+            <p:nvPicPr>
+              <p:cNvPr id="46" name="Graphic 45" descr="Bank outline">
+                <a:extLst>
+                  <a:ext uri="{FF2B5EF4-FFF2-40B4-BE49-F238E27FC236}">
+                    <a16:creationId xmlns:a16="http://schemas.microsoft.com/office/drawing/2014/main" id="{A39AB119-2706-E880-1FEA-27EDD8C1DC8E}"/>
+                  </a:ext>
+                </a:extLst>
+              </p:cNvPr>
+              <p:cNvPicPr>
+                <a:picLocks noChangeAspect="1"/>
+              </p:cNvPicPr>
+              <p:nvPr/>
+            </p:nvPicPr>
+            <p:blipFill>
+              <a:blip r:embed="rId5">
+                <a:extLst>
+                  <a:ext uri="{96DAC541-7B7A-43D3-8B79-37D633B846F1}">
+                    <asvg:svgBlip xmlns:asvg="http://schemas.microsoft.com/office/drawing/2016/SVG/main" r:embed="rId6"/>
+                  </a:ext>
+                </a:extLst>
+              </a:blip>
+              <a:stretch>
+                <a:fillRect/>
+              </a:stretch>
+            </p:blipFill>
+            <p:spPr>
+              <a:xfrm>
+                <a:off x="-788006" y="2323454"/>
+                <a:ext cx="441902" cy="441902"/>
+              </a:xfrm>
+              <a:prstGeom prst="rect">
+                <a:avLst/>
+              </a:prstGeom>
+            </p:spPr>
+          </p:pic>
+        </p:grpSp>
+        <p:grpSp>
+          <p:nvGrpSpPr>
+            <p:cNvPr id="58" name="Group 57">
+              <a:extLst>
+                <a:ext uri="{FF2B5EF4-FFF2-40B4-BE49-F238E27FC236}">
+                  <a16:creationId xmlns:a16="http://schemas.microsoft.com/office/drawing/2014/main" id="{7C28306F-4BFB-B5B0-3F23-D95A4C5F1B2E}"/>
+                </a:ext>
+              </a:extLst>
+            </p:cNvPr>
+            <p:cNvGrpSpPr/>
+            <p:nvPr/>
+          </p:nvGrpSpPr>
+          <p:grpSpPr>
+            <a:xfrm>
+              <a:off x="5926890" y="3707705"/>
+              <a:ext cx="2615601" cy="1328906"/>
+              <a:chOff x="6937721" y="2184444"/>
+              <a:chExt cx="2615601" cy="1328906"/>
+            </a:xfrm>
+          </p:grpSpPr>
+          <p:grpSp>
+            <p:nvGrpSpPr>
+              <p:cNvPr id="47" name="Group 46">
+                <a:extLst>
+                  <a:ext uri="{FF2B5EF4-FFF2-40B4-BE49-F238E27FC236}">
+                    <a16:creationId xmlns:a16="http://schemas.microsoft.com/office/drawing/2014/main" id="{5ADD912D-D267-260D-600F-7C6E90F42499}"/>
+                  </a:ext>
+                </a:extLst>
+              </p:cNvPr>
+              <p:cNvGrpSpPr/>
+              <p:nvPr/>
+            </p:nvGrpSpPr>
+            <p:grpSpPr>
+              <a:xfrm>
+                <a:off x="6937721" y="2184444"/>
+                <a:ext cx="2615601" cy="1328906"/>
+                <a:chOff x="2923773" y="2088023"/>
+                <a:chExt cx="2615601" cy="1328906"/>
+              </a:xfrm>
+            </p:grpSpPr>
+            <p:grpSp>
+              <p:nvGrpSpPr>
+                <p:cNvPr id="48" name="Group 47">
+                  <a:extLst>
+                    <a:ext uri="{FF2B5EF4-FFF2-40B4-BE49-F238E27FC236}">
+                      <a16:creationId xmlns:a16="http://schemas.microsoft.com/office/drawing/2014/main" id="{E076A802-12F6-59A8-5F8F-10B680CBC89F}"/>
+                    </a:ext>
+                  </a:extLst>
+                </p:cNvPr>
+                <p:cNvGrpSpPr/>
+                <p:nvPr/>
+              </p:nvGrpSpPr>
+              <p:grpSpPr>
+                <a:xfrm>
+                  <a:off x="2923773" y="2088023"/>
+                  <a:ext cx="2615601" cy="1328906"/>
+                  <a:chOff x="2916605" y="2654597"/>
+                  <a:chExt cx="2615601" cy="1328906"/>
+                </a:xfrm>
+              </p:grpSpPr>
+              <p:sp>
+                <p:nvSpPr>
+                  <p:cNvPr id="50" name="Rectangle: Diagonal Corners Rounded 49">
+                    <a:extLst>
+                      <a:ext uri="{FF2B5EF4-FFF2-40B4-BE49-F238E27FC236}">
+                        <a16:creationId xmlns:a16="http://schemas.microsoft.com/office/drawing/2014/main" id="{6BD317FF-7219-C4CE-E71E-7C82F2B7B0A6}"/>
+                      </a:ext>
+                    </a:extLst>
+                  </p:cNvPr>
+                  <p:cNvSpPr/>
+                  <p:nvPr/>
+                </p:nvSpPr>
+                <p:spPr>
+                  <a:xfrm>
+                    <a:off x="2916605" y="2656385"/>
+                    <a:ext cx="2615601" cy="1327118"/>
+                  </a:xfrm>
+                  <a:prstGeom prst="round2DiagRect">
+                    <a:avLst>
+                      <a:gd name="adj1" fmla="val 3746"/>
+                      <a:gd name="adj2" fmla="val 0"/>
+                    </a:avLst>
+                  </a:prstGeom>
+                  <a:gradFill>
+                    <a:gsLst>
+                      <a:gs pos="0">
+                        <a:srgbClr val="D7F2ED"/>
+                      </a:gs>
+                      <a:gs pos="48000">
+                        <a:srgbClr val="F0FCFA"/>
+                      </a:gs>
+                      <a:gs pos="97000">
+                        <a:srgbClr val="FFFFFF"/>
+                      </a:gs>
+                    </a:gsLst>
+                    <a:lin ang="18000000" scaled="0"/>
+                  </a:gradFill>
+                  <a:ln w="15875">
+                    <a:solidFill>
+                      <a:srgbClr val="4D566F"/>
+                    </a:solidFill>
+                  </a:ln>
+                </p:spPr>
+                <p:style>
+                  <a:lnRef idx="0">
+                    <a:scrgbClr r="0" g="0" b="0"/>
+                  </a:lnRef>
+                  <a:fillRef idx="0">
+                    <a:scrgbClr r="0" g="0" b="0"/>
+                  </a:fillRef>
+                  <a:effectRef idx="0">
+                    <a:scrgbClr r="0" g="0" b="0"/>
+                  </a:effectRef>
+                  <a:fontRef idx="minor">
+                    <a:schemeClr val="lt1"/>
+                  </a:fontRef>
+                </p:style>
+                <p:txBody>
+                  <a:bodyPr rtlCol="0" anchor="ctr"/>
+                  <a:lstStyle/>
+                  <a:p>
+                    <a:pPr algn="ctr"/>
+                    <a:endParaRPr lang="en-US"/>
+                  </a:p>
+                </p:txBody>
+              </p:sp>
+              <p:grpSp>
+                <p:nvGrpSpPr>
+                  <p:cNvPr id="51" name="Group 50">
+                    <a:extLst>
+                      <a:ext uri="{FF2B5EF4-FFF2-40B4-BE49-F238E27FC236}">
+                        <a16:creationId xmlns:a16="http://schemas.microsoft.com/office/drawing/2014/main" id="{7CB2380E-EFC9-E0DC-330E-377C60B56FF7}"/>
+                      </a:ext>
+                    </a:extLst>
+                  </p:cNvPr>
+                  <p:cNvGrpSpPr/>
+                  <p:nvPr/>
+                </p:nvGrpSpPr>
+                <p:grpSpPr>
+                  <a:xfrm>
+                    <a:off x="2916605" y="2654597"/>
+                    <a:ext cx="2615601" cy="565811"/>
+                    <a:chOff x="2916605" y="2654597"/>
+                    <a:chExt cx="2615601" cy="565811"/>
+                  </a:xfrm>
+                </p:grpSpPr>
+                <p:sp>
+                  <p:nvSpPr>
+                    <p:cNvPr id="52" name="Rectangle: Diagonal Corners Rounded 51">
+                      <a:extLst>
+                        <a:ext uri="{FF2B5EF4-FFF2-40B4-BE49-F238E27FC236}">
+                          <a16:creationId xmlns:a16="http://schemas.microsoft.com/office/drawing/2014/main" id="{D6E3B760-5D40-CE87-778F-C11375FCBBC5}"/>
+                        </a:ext>
+                      </a:extLst>
+                    </p:cNvPr>
+                    <p:cNvSpPr/>
+                    <p:nvPr/>
+                  </p:nvSpPr>
+                  <p:spPr>
+                    <a:xfrm>
+                      <a:off x="2916605" y="2654597"/>
+                      <a:ext cx="2615601" cy="565811"/>
+                    </a:xfrm>
+                    <a:prstGeom prst="round2DiagRect">
+                      <a:avLst>
+                        <a:gd name="adj1" fmla="val 8900"/>
+                        <a:gd name="adj2" fmla="val 0"/>
+                      </a:avLst>
+                    </a:prstGeom>
+                    <a:gradFill flip="none" rotWithShape="1">
+                      <a:gsLst>
+                        <a:gs pos="0">
+                          <a:srgbClr val="313849"/>
+                        </a:gs>
+                        <a:gs pos="48000">
+                          <a:srgbClr val="4B546D"/>
+                        </a:gs>
+                        <a:gs pos="98000">
+                          <a:srgbClr val="6E7A9B"/>
+                        </a:gs>
+                      </a:gsLst>
+                      <a:lin ang="18000000" scaled="0"/>
+                      <a:tileRect/>
+                    </a:gradFill>
+                    <a:ln>
+                      <a:solidFill>
+                        <a:srgbClr val="569B96"/>
+                      </a:solidFill>
+                    </a:ln>
+                  </p:spPr>
+                  <p:style>
+                    <a:lnRef idx="0">
+                      <a:scrgbClr r="0" g="0" b="0"/>
+                    </a:lnRef>
+                    <a:fillRef idx="0">
+                      <a:scrgbClr r="0" g="0" b="0"/>
+                    </a:fillRef>
+                    <a:effectRef idx="0">
+                      <a:scrgbClr r="0" g="0" b="0"/>
+                    </a:effectRef>
+                    <a:fontRef idx="minor">
+                      <a:schemeClr val="lt1"/>
+                    </a:fontRef>
+                  </p:style>
+                  <p:txBody>
+                    <a:bodyPr rtlCol="0" anchor="ctr"/>
+                    <a:lstStyle/>
+                    <a:p>
+                      <a:pPr algn="ctr"/>
+                      <a:endParaRPr lang="en-US" dirty="0"/>
+                    </a:p>
+                  </p:txBody>
+                </p:sp>
+                <p:sp>
+                  <p:nvSpPr>
+                    <p:cNvPr id="53" name="TextBox 52">
+                      <a:extLst>
+                        <a:ext uri="{FF2B5EF4-FFF2-40B4-BE49-F238E27FC236}">
+                          <a16:creationId xmlns:a16="http://schemas.microsoft.com/office/drawing/2014/main" id="{37CB5814-7BC0-CEF4-136C-2F2199B6B617}"/>
+                        </a:ext>
+                      </a:extLst>
+                    </p:cNvPr>
+                    <p:cNvSpPr txBox="1"/>
+                    <p:nvPr/>
+                  </p:nvSpPr>
+                  <p:spPr>
+                    <a:xfrm>
+                      <a:off x="3590478" y="2656385"/>
+                      <a:ext cx="1753237" cy="307777"/>
+                    </a:xfrm>
+                    <a:prstGeom prst="rect">
+                      <a:avLst/>
+                    </a:prstGeom>
+                    <a:noFill/>
+                  </p:spPr>
+                  <p:txBody>
+                    <a:bodyPr wrap="none" rtlCol="0">
+                      <a:spAutoFit/>
+                    </a:bodyPr>
+                    <a:lstStyle/>
+                    <a:p>
+                      <a:r>
+                        <a:rPr lang="en-US" sz="1400" dirty="0">
+                          <a:solidFill>
+                            <a:schemeClr val="bg1"/>
+                          </a:solidFill>
+                        </a:rPr>
+                        <a:t>Bank | ACH Network</a:t>
+                      </a:r>
+                    </a:p>
+                  </p:txBody>
+                </p:sp>
+                <p:sp>
+                  <p:nvSpPr>
+                    <p:cNvPr id="54" name="TextBox 53">
+                      <a:extLst>
+                        <a:ext uri="{FF2B5EF4-FFF2-40B4-BE49-F238E27FC236}">
+                          <a16:creationId xmlns:a16="http://schemas.microsoft.com/office/drawing/2014/main" id="{179D4002-9AC2-44F6-6FAE-44B69C2C6133}"/>
+                        </a:ext>
+                      </a:extLst>
+                    </p:cNvPr>
+                    <p:cNvSpPr txBox="1"/>
+                    <p:nvPr/>
+                  </p:nvSpPr>
+                  <p:spPr>
+                    <a:xfrm>
+                      <a:off x="3562044" y="2902819"/>
+                      <a:ext cx="1529586" cy="246221"/>
+                    </a:xfrm>
+                    <a:prstGeom prst="rect">
+                      <a:avLst/>
+                    </a:prstGeom>
+                    <a:noFill/>
+                  </p:spPr>
+                  <p:txBody>
+                    <a:bodyPr wrap="none" rtlCol="0">
+                      <a:spAutoFit/>
+                    </a:bodyPr>
+                    <a:lstStyle/>
+                    <a:p>
+                      <a:r>
+                        <a:rPr lang="en-US" sz="1000" dirty="0">
+                          <a:solidFill>
+                            <a:schemeClr val="bg1"/>
+                          </a:solidFill>
+                        </a:rPr>
+                        <a:t>Merchant ACH Processing</a:t>
+                      </a:r>
+                    </a:p>
+                  </p:txBody>
+                </p:sp>
+              </p:grpSp>
+            </p:grpSp>
+            <p:sp>
+              <p:nvSpPr>
+                <p:cNvPr id="49" name="TextBox 48">
+                  <a:extLst>
+                    <a:ext uri="{FF2B5EF4-FFF2-40B4-BE49-F238E27FC236}">
+                      <a16:creationId xmlns:a16="http://schemas.microsoft.com/office/drawing/2014/main" id="{0CEFA192-0BAD-D0BD-05BE-372D19F51467}"/>
+                    </a:ext>
+                  </a:extLst>
+                </p:cNvPr>
+                <p:cNvSpPr txBox="1"/>
+                <p:nvPr/>
+              </p:nvSpPr>
+              <p:spPr>
+                <a:xfrm>
+                  <a:off x="3169848" y="2678047"/>
+                  <a:ext cx="1533753" cy="707886"/>
+                </a:xfrm>
+                <a:prstGeom prst="rect">
+                  <a:avLst/>
+                </a:prstGeom>
+                <a:noFill/>
+              </p:spPr>
+              <p:txBody>
+                <a:bodyPr wrap="none" rtlCol="0">
+                  <a:spAutoFit/>
+                </a:bodyPr>
+                <a:lstStyle/>
+                <a:p>
+                  <a:pPr marL="91440" indent="-91440">
+                    <a:buFont typeface="Arial" panose="020B0604020202020204" pitchFamily="34" charset="0"/>
+                    <a:buChar char="•"/>
+                  </a:pPr>
+                  <a:r>
+                    <a:rPr lang="en-US" sz="1000" dirty="0">
+                      <a:solidFill>
+                        <a:schemeClr val="tx1">
+                          <a:lumMod val="65000"/>
+                          <a:lumOff val="35000"/>
+                        </a:schemeClr>
+                      </a:solidFill>
+                    </a:rPr>
+                    <a:t>Merchant ACH initiation</a:t>
+                  </a:r>
+                </a:p>
+                <a:p>
+                  <a:pPr marL="91440" indent="-91440">
+                    <a:buFont typeface="Arial" panose="020B0604020202020204" pitchFamily="34" charset="0"/>
+                    <a:buChar char="•"/>
+                  </a:pPr>
+                  <a:r>
+                    <a:rPr lang="en-US" sz="1000" dirty="0">
+                      <a:solidFill>
+                        <a:schemeClr val="tx1">
+                          <a:lumMod val="65000"/>
+                          <a:lumOff val="35000"/>
+                        </a:schemeClr>
+                      </a:solidFill>
+                    </a:rPr>
+                    <a:t>Broker account funding</a:t>
+                  </a:r>
+                </a:p>
+                <a:p>
+                  <a:pPr marL="91440" indent="-91440">
+                    <a:buFont typeface="Arial" panose="020B0604020202020204" pitchFamily="34" charset="0"/>
+                    <a:buChar char="•"/>
+                  </a:pPr>
+                  <a:r>
+                    <a:rPr lang="en-US" sz="1000" dirty="0">
+                      <a:solidFill>
+                        <a:schemeClr val="tx1">
+                          <a:lumMod val="65000"/>
+                          <a:lumOff val="35000"/>
+                        </a:schemeClr>
+                      </a:solidFill>
+                    </a:rPr>
+                    <a:t>Settlement movement</a:t>
+                  </a:r>
+                </a:p>
+                <a:p>
+                  <a:pPr marL="91440" indent="-91440">
+                    <a:buFont typeface="Arial" panose="020B0604020202020204" pitchFamily="34" charset="0"/>
+                    <a:buChar char="•"/>
+                  </a:pPr>
+                  <a:r>
+                    <a:rPr lang="en-US" sz="1000" dirty="0">
+                      <a:solidFill>
+                        <a:schemeClr val="tx1">
+                          <a:lumMod val="65000"/>
+                          <a:lumOff val="35000"/>
+                        </a:schemeClr>
+                      </a:solidFill>
+                    </a:rPr>
+                    <a:t>Account validation</a:t>
+                  </a:r>
+                </a:p>
+              </p:txBody>
+            </p:sp>
+          </p:grpSp>
+          <p:pic>
+            <p:nvPicPr>
+              <p:cNvPr id="57" name="Graphic 56" descr="Credit card outline">
+                <a:extLst>
+                  <a:ext uri="{FF2B5EF4-FFF2-40B4-BE49-F238E27FC236}">
+                    <a16:creationId xmlns:a16="http://schemas.microsoft.com/office/drawing/2014/main" id="{4C1D5D18-0677-127D-F15B-BAA9609E875E}"/>
+                  </a:ext>
+                </a:extLst>
+              </p:cNvPr>
+              <p:cNvPicPr>
+                <a:picLocks noChangeAspect="1"/>
+              </p:cNvPicPr>
+              <p:nvPr/>
+            </p:nvPicPr>
+            <p:blipFill>
+              <a:blip r:embed="rId7">
+                <a:extLst>
+                  <a:ext uri="{96DAC541-7B7A-43D3-8B79-37D633B846F1}">
+                    <asvg:svgBlip xmlns:asvg="http://schemas.microsoft.com/office/drawing/2016/SVG/main" r:embed="rId8"/>
+                  </a:ext>
+                </a:extLst>
+              </a:blip>
+              <a:stretch>
+                <a:fillRect/>
+              </a:stretch>
+            </p:blipFill>
+            <p:spPr>
+              <a:xfrm>
+                <a:off x="7027930" y="2203584"/>
+                <a:ext cx="529593" cy="529593"/>
+              </a:xfrm>
+              <a:prstGeom prst="rect">
+                <a:avLst/>
+              </a:prstGeom>
+            </p:spPr>
+          </p:pic>
+        </p:grpSp>
+        <p:cxnSp>
+          <p:nvCxnSpPr>
+            <p:cNvPr id="60" name="Connector: Elbow 59">
+              <a:extLst>
+                <a:ext uri="{FF2B5EF4-FFF2-40B4-BE49-F238E27FC236}">
+                  <a16:creationId xmlns:a16="http://schemas.microsoft.com/office/drawing/2014/main" id="{889CDB95-A698-ED04-D4D0-D4A50CACFAB9}"/>
+                </a:ext>
+              </a:extLst>
+            </p:cNvPr>
+            <p:cNvCxnSpPr>
+              <a:cxnSpLocks/>
+              <a:endCxn id="50" idx="2"/>
+            </p:cNvCxnSpPr>
+            <p:nvPr/>
+          </p:nvCxnSpPr>
+          <p:spPr>
+            <a:xfrm rot="16200000" flipH="1">
+              <a:off x="5029283" y="3475445"/>
+              <a:ext cx="959440" cy="835774"/>
+            </a:xfrm>
+            <a:prstGeom prst="bentConnector2">
+              <a:avLst/>
+            </a:prstGeom>
+            <a:ln>
+              <a:solidFill>
+                <a:schemeClr val="tx1">
+                  <a:lumMod val="50000"/>
+                  <a:lumOff val="50000"/>
+                </a:schemeClr>
+              </a:solidFill>
+              <a:prstDash val="sysDash"/>
+              <a:headEnd type="none"/>
+              <a:tailEnd type="stealth"/>
+            </a:ln>
+          </p:spPr>
+          <p:style>
+            <a:lnRef idx="1">
+              <a:schemeClr val="accent1"/>
+            </a:lnRef>
+            <a:fillRef idx="0">
+              <a:schemeClr val="accent1"/>
+            </a:fillRef>
+            <a:effectRef idx="0">
+              <a:schemeClr val="accent1"/>
+            </a:effectRef>
+            <a:fontRef idx="minor">
+              <a:schemeClr val="tx1"/>
+            </a:fontRef>
+          </p:style>
+        </p:cxnSp>
+        <p:cxnSp>
+          <p:nvCxnSpPr>
+            <p:cNvPr id="64" name="Straight Arrow Connector 63">
+              <a:extLst>
+                <a:ext uri="{FF2B5EF4-FFF2-40B4-BE49-F238E27FC236}">
+                  <a16:creationId xmlns:a16="http://schemas.microsoft.com/office/drawing/2014/main" id="{1916D567-62DF-55D4-E877-81AAA9EBB4FF}"/>
+                </a:ext>
+              </a:extLst>
+            </p:cNvPr>
+            <p:cNvCxnSpPr>
+              <a:cxnSpLocks/>
+              <a:stCxn id="3" idx="1"/>
+              <a:endCxn id="29" idx="3"/>
+            </p:cNvCxnSpPr>
+            <p:nvPr/>
+          </p:nvCxnSpPr>
+          <p:spPr>
+            <a:xfrm>
+              <a:off x="4518243" y="1446924"/>
+              <a:ext cx="1" cy="430910"/>
+            </a:xfrm>
+            <a:prstGeom prst="straightConnector1">
+              <a:avLst/>
+            </a:prstGeom>
+            <a:ln>
+              <a:solidFill>
+                <a:schemeClr val="tx1">
+                  <a:lumMod val="50000"/>
+                  <a:lumOff val="50000"/>
+                </a:schemeClr>
+              </a:solidFill>
+              <a:prstDash val="sysDash"/>
+              <a:headEnd type="stealth"/>
+              <a:tailEnd type="stealth"/>
+            </a:ln>
+          </p:spPr>
+          <p:style>
+            <a:lnRef idx="1">
+              <a:schemeClr val="accent1"/>
+            </a:lnRef>
+            <a:fillRef idx="0">
+              <a:schemeClr val="accent1"/>
+            </a:fillRef>
+            <a:effectRef idx="0">
+              <a:schemeClr val="accent1"/>
+            </a:effectRef>
+            <a:fontRef idx="minor">
+              <a:schemeClr val="tx1"/>
+            </a:fontRef>
+          </p:style>
+        </p:cxnSp>
+        <p:sp>
+          <p:nvSpPr>
+            <p:cNvPr id="73" name="TextBox 72">
+              <a:extLst>
+                <a:ext uri="{FF2B5EF4-FFF2-40B4-BE49-F238E27FC236}">
+                  <a16:creationId xmlns:a16="http://schemas.microsoft.com/office/drawing/2014/main" id="{6FF88392-31C0-66A6-991A-8C44134C6CE8}"/>
+                </a:ext>
+              </a:extLst>
+            </p:cNvPr>
+            <p:cNvSpPr txBox="1"/>
+            <p:nvPr/>
+          </p:nvSpPr>
+          <p:spPr>
+            <a:xfrm>
+              <a:off x="1378848" y="2353816"/>
+              <a:ext cx="1186004" cy="369332"/>
+            </a:xfrm>
+            <a:prstGeom prst="rect">
+              <a:avLst/>
+            </a:prstGeom>
+            <a:noFill/>
+          </p:spPr>
+          <p:txBody>
+            <a:bodyPr wrap="square" rtlCol="0">
+              <a:spAutoFit/>
+            </a:bodyPr>
+            <a:lstStyle/>
+            <a:p>
+              <a:pPr algn="r"/>
+              <a:r>
+                <a:rPr lang="en-US" sz="900" b="1" dirty="0">
+                  <a:solidFill>
+                    <a:schemeClr val="tx1">
+                      <a:lumMod val="65000"/>
+                      <a:lumOff val="35000"/>
+                    </a:schemeClr>
+                  </a:solidFill>
+                </a:rPr>
+                <a:t>JSON Events</a:t>
+              </a:r>
+            </a:p>
+            <a:p>
+              <a:pPr algn="r"/>
+              <a:r>
+                <a:rPr lang="en-US" sz="900" b="1" dirty="0">
+                  <a:solidFill>
+                    <a:schemeClr val="tx1">
+                      <a:lumMod val="65000"/>
+                      <a:lumOff val="35000"/>
+                    </a:schemeClr>
+                  </a:solidFill>
+                </a:rPr>
+                <a:t>Secure API Webhook</a:t>
+              </a:r>
+            </a:p>
+          </p:txBody>
+        </p:sp>
+        <p:cxnSp>
+          <p:nvCxnSpPr>
+            <p:cNvPr id="76" name="Connector: Elbow 75">
+              <a:extLst>
+                <a:ext uri="{FF2B5EF4-FFF2-40B4-BE49-F238E27FC236}">
+                  <a16:creationId xmlns:a16="http://schemas.microsoft.com/office/drawing/2014/main" id="{0B208172-6FF8-E62F-27FF-1FCB4A88594A}"/>
+                </a:ext>
+              </a:extLst>
+            </p:cNvPr>
+            <p:cNvCxnSpPr>
+              <a:cxnSpLocks/>
+              <a:stCxn id="39" idx="0"/>
+            </p:cNvCxnSpPr>
+            <p:nvPr/>
+          </p:nvCxnSpPr>
+          <p:spPr>
+            <a:xfrm flipV="1">
+              <a:off x="3514079" y="3423032"/>
+              <a:ext cx="851764" cy="921133"/>
+            </a:xfrm>
+            <a:prstGeom prst="bentConnector2">
+              <a:avLst/>
+            </a:prstGeom>
+            <a:ln>
+              <a:solidFill>
+                <a:schemeClr val="tx1">
+                  <a:lumMod val="50000"/>
+                  <a:lumOff val="50000"/>
+                </a:schemeClr>
+              </a:solidFill>
+              <a:prstDash val="sysDash"/>
+              <a:headEnd type="none"/>
+              <a:tailEnd type="stealth"/>
+            </a:ln>
+          </p:spPr>
+          <p:style>
+            <a:lnRef idx="1">
+              <a:schemeClr val="accent1"/>
+            </a:lnRef>
+            <a:fillRef idx="0">
+              <a:schemeClr val="accent1"/>
+            </a:fillRef>
+            <a:effectRef idx="0">
+              <a:schemeClr val="accent1"/>
+            </a:effectRef>
+            <a:fontRef idx="minor">
+              <a:schemeClr val="tx1"/>
+            </a:fontRef>
+          </p:style>
+        </p:cxnSp>
+        <p:sp>
+          <p:nvSpPr>
+            <p:cNvPr id="79" name="TextBox 78">
+              <a:extLst>
+                <a:ext uri="{FF2B5EF4-FFF2-40B4-BE49-F238E27FC236}">
+                  <a16:creationId xmlns:a16="http://schemas.microsoft.com/office/drawing/2014/main" id="{79F790F8-78BB-198F-9717-8D4B05BAF633}"/>
+                </a:ext>
+              </a:extLst>
+            </p:cNvPr>
+            <p:cNvSpPr txBox="1"/>
+            <p:nvPr/>
+          </p:nvSpPr>
+          <p:spPr>
+            <a:xfrm>
+              <a:off x="3497986" y="4122708"/>
+              <a:ext cx="910489" cy="230832"/>
+            </a:xfrm>
+            <a:prstGeom prst="rect">
+              <a:avLst/>
+            </a:prstGeom>
+            <a:noFill/>
+          </p:spPr>
+          <p:txBody>
+            <a:bodyPr wrap="square" rtlCol="0">
+              <a:spAutoFit/>
+            </a:bodyPr>
+            <a:lstStyle/>
+            <a:p>
+              <a:pPr algn="r"/>
+              <a:r>
+                <a:rPr lang="en-US" sz="900" dirty="0">
+                  <a:solidFill>
+                    <a:schemeClr val="tx1">
+                      <a:lumMod val="65000"/>
+                      <a:lumOff val="35000"/>
+                    </a:schemeClr>
+                  </a:solidFill>
+                </a:rPr>
+                <a:t>Confirmations</a:t>
+              </a:r>
+            </a:p>
+          </p:txBody>
+        </p:sp>
+        <p:cxnSp>
+          <p:nvCxnSpPr>
+            <p:cNvPr id="82" name="Straight Arrow Connector 81">
+              <a:extLst>
+                <a:ext uri="{FF2B5EF4-FFF2-40B4-BE49-F238E27FC236}">
+                  <a16:creationId xmlns:a16="http://schemas.microsoft.com/office/drawing/2014/main" id="{06D54540-3D61-DC78-9963-C1BE8D14CC0C}"/>
+                </a:ext>
+              </a:extLst>
+            </p:cNvPr>
+            <p:cNvCxnSpPr>
+              <a:cxnSpLocks/>
+            </p:cNvCxnSpPr>
+            <p:nvPr/>
+          </p:nvCxnSpPr>
+          <p:spPr>
+            <a:xfrm flipH="1">
+              <a:off x="3514079" y="4742121"/>
+              <a:ext cx="2412811" cy="0"/>
+            </a:xfrm>
+            <a:prstGeom prst="straightConnector1">
+              <a:avLst/>
+            </a:prstGeom>
+            <a:ln>
+              <a:solidFill>
+                <a:schemeClr val="tx1">
+                  <a:lumMod val="50000"/>
+                  <a:lumOff val="50000"/>
+                </a:schemeClr>
+              </a:solidFill>
+              <a:prstDash val="sysDash"/>
+              <a:headEnd type="none"/>
+              <a:tailEnd type="stealth"/>
+            </a:ln>
+          </p:spPr>
+          <p:style>
+            <a:lnRef idx="1">
+              <a:schemeClr val="accent1"/>
+            </a:lnRef>
+            <a:fillRef idx="0">
+              <a:schemeClr val="accent1"/>
+            </a:fillRef>
+            <a:effectRef idx="0">
+              <a:schemeClr val="accent1"/>
+            </a:effectRef>
+            <a:fontRef idx="minor">
+              <a:schemeClr val="tx1"/>
+            </a:fontRef>
+          </p:style>
+        </p:cxnSp>
+        <p:cxnSp>
+          <p:nvCxnSpPr>
+            <p:cNvPr id="84" name="Connector: Elbow 83">
+              <a:extLst>
+                <a:ext uri="{FF2B5EF4-FFF2-40B4-BE49-F238E27FC236}">
+                  <a16:creationId xmlns:a16="http://schemas.microsoft.com/office/drawing/2014/main" id="{D6C12B3E-212F-C9B4-9968-8BCFF9A605E6}"/>
+                </a:ext>
+              </a:extLst>
+            </p:cNvPr>
+            <p:cNvCxnSpPr>
+              <a:cxnSpLocks/>
+              <a:endCxn id="41" idx="0"/>
+            </p:cNvCxnSpPr>
+            <p:nvPr/>
+          </p:nvCxnSpPr>
+          <p:spPr>
+            <a:xfrm rot="5400000">
+              <a:off x="3365007" y="3572104"/>
+              <a:ext cx="538692" cy="240548"/>
+            </a:xfrm>
+            <a:prstGeom prst="bentConnector2">
+              <a:avLst/>
+            </a:prstGeom>
+            <a:ln>
+              <a:solidFill>
+                <a:schemeClr val="tx1">
+                  <a:lumMod val="50000"/>
+                  <a:lumOff val="50000"/>
+                </a:schemeClr>
+              </a:solidFill>
+              <a:prstDash val="sysDash"/>
+              <a:headEnd type="none"/>
+              <a:tailEnd type="stealth"/>
+            </a:ln>
+          </p:spPr>
+          <p:style>
+            <a:lnRef idx="1">
+              <a:schemeClr val="accent1"/>
+            </a:lnRef>
+            <a:fillRef idx="0">
+              <a:schemeClr val="accent1"/>
+            </a:fillRef>
+            <a:effectRef idx="0">
+              <a:schemeClr val="accent1"/>
+            </a:effectRef>
+            <a:fontRef idx="minor">
+              <a:schemeClr val="tx1"/>
+            </a:fontRef>
+          </p:style>
+        </p:cxnSp>
+        <p:sp>
+          <p:nvSpPr>
+            <p:cNvPr id="87" name="TextBox 86">
+              <a:extLst>
+                <a:ext uri="{FF2B5EF4-FFF2-40B4-BE49-F238E27FC236}">
+                  <a16:creationId xmlns:a16="http://schemas.microsoft.com/office/drawing/2014/main" id="{4155A7F4-2A97-634D-C73D-48C9B5E3F6C0}"/>
+                </a:ext>
+              </a:extLst>
+            </p:cNvPr>
+            <p:cNvSpPr txBox="1"/>
+            <p:nvPr/>
+          </p:nvSpPr>
+          <p:spPr>
+            <a:xfrm>
+              <a:off x="2877413" y="3438611"/>
+              <a:ext cx="910489" cy="230832"/>
+            </a:xfrm>
+            <a:prstGeom prst="rect">
+              <a:avLst/>
+            </a:prstGeom>
+            <a:noFill/>
+          </p:spPr>
+          <p:txBody>
+            <a:bodyPr wrap="square" rtlCol="0">
+              <a:spAutoFit/>
+            </a:bodyPr>
+            <a:lstStyle/>
+            <a:p>
+              <a:pPr algn="r"/>
+              <a:r>
+                <a:rPr lang="en-US" sz="900" dirty="0">
+                  <a:solidFill>
+                    <a:schemeClr val="tx1">
+                      <a:lumMod val="65000"/>
+                      <a:lumOff val="35000"/>
+                    </a:schemeClr>
+                  </a:solidFill>
+                </a:rPr>
+                <a:t>Buy Orders</a:t>
+              </a:r>
+            </a:p>
+          </p:txBody>
+        </p:sp>
+        <p:sp>
+          <p:nvSpPr>
+            <p:cNvPr id="88" name="TextBox 87">
+              <a:extLst>
+                <a:ext uri="{FF2B5EF4-FFF2-40B4-BE49-F238E27FC236}">
+                  <a16:creationId xmlns:a16="http://schemas.microsoft.com/office/drawing/2014/main" id="{01617A4C-151D-12F2-0470-F210E2D29ED8}"/>
+                </a:ext>
+              </a:extLst>
+            </p:cNvPr>
+            <p:cNvSpPr txBox="1"/>
+            <p:nvPr/>
+          </p:nvSpPr>
+          <p:spPr>
+            <a:xfrm>
+              <a:off x="3615070" y="4742121"/>
+              <a:ext cx="2217276" cy="230832"/>
+            </a:xfrm>
+            <a:prstGeom prst="rect">
+              <a:avLst/>
+            </a:prstGeom>
+            <a:noFill/>
+          </p:spPr>
+          <p:txBody>
+            <a:bodyPr wrap="square" rtlCol="0">
+              <a:spAutoFit/>
+            </a:bodyPr>
+            <a:lstStyle/>
+            <a:p>
+              <a:pPr algn="ctr"/>
+              <a:r>
+                <a:rPr lang="en-US" sz="900" dirty="0">
+                  <a:solidFill>
+                    <a:schemeClr val="tx1">
+                      <a:lumMod val="65000"/>
+                      <a:lumOff val="35000"/>
+                    </a:schemeClr>
+                  </a:solidFill>
+                </a:rPr>
+                <a:t>ACH Payments from Merchant to Broker</a:t>
+              </a:r>
+            </a:p>
+          </p:txBody>
+        </p:sp>
+        <p:sp>
+          <p:nvSpPr>
+            <p:cNvPr id="89" name="TextBox 88">
+              <a:extLst>
+                <a:ext uri="{FF2B5EF4-FFF2-40B4-BE49-F238E27FC236}">
+                  <a16:creationId xmlns:a16="http://schemas.microsoft.com/office/drawing/2014/main" id="{E7774AFB-05FB-7823-4317-205EA1F31117}"/>
+                </a:ext>
+              </a:extLst>
+            </p:cNvPr>
+            <p:cNvSpPr txBox="1"/>
+            <p:nvPr/>
+          </p:nvSpPr>
+          <p:spPr>
+            <a:xfrm>
+              <a:off x="5086055" y="3496013"/>
+              <a:ext cx="840835" cy="369332"/>
+            </a:xfrm>
+            <a:prstGeom prst="rect">
+              <a:avLst/>
+            </a:prstGeom>
+            <a:noFill/>
+          </p:spPr>
+          <p:txBody>
+            <a:bodyPr wrap="square" rtlCol="0">
+              <a:spAutoFit/>
+            </a:bodyPr>
+            <a:lstStyle/>
+            <a:p>
+              <a:r>
+                <a:rPr lang="en-US" sz="900" dirty="0">
+                  <a:solidFill>
+                    <a:schemeClr val="tx1">
+                      <a:lumMod val="65000"/>
+                      <a:lumOff val="35000"/>
+                    </a:schemeClr>
+                  </a:solidFill>
+                </a:rPr>
+                <a:t>ACH Payment Instructions</a:t>
+              </a:r>
+            </a:p>
+          </p:txBody>
+        </p:sp>
+        <p:cxnSp>
+          <p:nvCxnSpPr>
+            <p:cNvPr id="90" name="Straight Arrow Connector 89">
+              <a:extLst>
+                <a:ext uri="{FF2B5EF4-FFF2-40B4-BE49-F238E27FC236}">
+                  <a16:creationId xmlns:a16="http://schemas.microsoft.com/office/drawing/2014/main" id="{10902DB4-00BF-BB0F-D5DF-1711F6C6BE79}"/>
+                </a:ext>
+              </a:extLst>
+            </p:cNvPr>
+            <p:cNvCxnSpPr>
+              <a:cxnSpLocks/>
+            </p:cNvCxnSpPr>
+            <p:nvPr/>
+          </p:nvCxnSpPr>
+          <p:spPr>
+            <a:xfrm>
+              <a:off x="3615069" y="1442678"/>
+              <a:ext cx="1" cy="430910"/>
+            </a:xfrm>
+            <a:prstGeom prst="straightConnector1">
+              <a:avLst/>
+            </a:prstGeom>
+            <a:ln>
+              <a:solidFill>
+                <a:schemeClr val="tx1">
+                  <a:lumMod val="50000"/>
+                  <a:lumOff val="50000"/>
+                </a:schemeClr>
+              </a:solidFill>
+              <a:prstDash val="sysDash"/>
+              <a:headEnd type="none"/>
+              <a:tailEnd type="stealth"/>
+            </a:ln>
+          </p:spPr>
+          <p:style>
+            <a:lnRef idx="1">
+              <a:schemeClr val="accent1"/>
+            </a:lnRef>
+            <a:fillRef idx="0">
+              <a:schemeClr val="accent1"/>
+            </a:fillRef>
+            <a:effectRef idx="0">
+              <a:schemeClr val="accent1"/>
+            </a:effectRef>
+            <a:fontRef idx="minor">
+              <a:schemeClr val="tx1"/>
+            </a:fontRef>
+          </p:style>
+        </p:cxnSp>
+        <p:sp>
+          <p:nvSpPr>
+            <p:cNvPr id="91" name="TextBox 90">
+              <a:extLst>
+                <a:ext uri="{FF2B5EF4-FFF2-40B4-BE49-F238E27FC236}">
+                  <a16:creationId xmlns:a16="http://schemas.microsoft.com/office/drawing/2014/main" id="{87C5C5BE-EFF0-ED9E-6BB5-B9A6608EC688}"/>
+                </a:ext>
+              </a:extLst>
+            </p:cNvPr>
+            <p:cNvSpPr txBox="1"/>
+            <p:nvPr/>
+          </p:nvSpPr>
+          <p:spPr>
+            <a:xfrm>
+              <a:off x="4525558" y="1483001"/>
+              <a:ext cx="1208934" cy="369332"/>
+            </a:xfrm>
+            <a:prstGeom prst="rect">
+              <a:avLst/>
+            </a:prstGeom>
+            <a:noFill/>
+          </p:spPr>
+          <p:txBody>
+            <a:bodyPr wrap="square" rtlCol="0">
+              <a:spAutoFit/>
+            </a:bodyPr>
+            <a:lstStyle/>
+            <a:p>
+              <a:r>
+                <a:rPr lang="en-US" sz="900" dirty="0">
+                  <a:solidFill>
+                    <a:schemeClr val="tx1">
+                      <a:lumMod val="65000"/>
+                      <a:lumOff val="35000"/>
+                    </a:schemeClr>
+                  </a:solidFill>
+                </a:rPr>
+                <a:t>Point conversion &amp; reconciliation</a:t>
+              </a:r>
+            </a:p>
+          </p:txBody>
+        </p:sp>
+        <p:sp>
+          <p:nvSpPr>
+            <p:cNvPr id="92" name="TextBox 91">
+              <a:extLst>
+                <a:ext uri="{FF2B5EF4-FFF2-40B4-BE49-F238E27FC236}">
+                  <a16:creationId xmlns:a16="http://schemas.microsoft.com/office/drawing/2014/main" id="{7ECA5F65-F741-2659-D4C8-F616449F7BB4}"/>
+                </a:ext>
+              </a:extLst>
+            </p:cNvPr>
+            <p:cNvSpPr txBox="1"/>
+            <p:nvPr/>
+          </p:nvSpPr>
+          <p:spPr>
+            <a:xfrm>
+              <a:off x="2745566" y="1456299"/>
+              <a:ext cx="910489" cy="369332"/>
+            </a:xfrm>
+            <a:prstGeom prst="rect">
+              <a:avLst/>
+            </a:prstGeom>
+            <a:noFill/>
+          </p:spPr>
+          <p:txBody>
+            <a:bodyPr wrap="square" rtlCol="0">
+              <a:spAutoFit/>
+            </a:bodyPr>
+            <a:lstStyle/>
+            <a:p>
+              <a:pPr algn="r"/>
+              <a:r>
+                <a:rPr lang="en-US" sz="900" dirty="0">
+                  <a:solidFill>
+                    <a:schemeClr val="tx1">
+                      <a:lumMod val="65000"/>
+                      <a:lumOff val="35000"/>
+                    </a:schemeClr>
+                  </a:solidFill>
+                </a:rPr>
+                <a:t>Member onboarding</a:t>
+              </a:r>
+            </a:p>
+          </p:txBody>
+        </p:sp>
+        <p:sp>
+          <p:nvSpPr>
+            <p:cNvPr id="93" name="TextBox 92">
+              <a:extLst>
+                <a:ext uri="{FF2B5EF4-FFF2-40B4-BE49-F238E27FC236}">
+                  <a16:creationId xmlns:a16="http://schemas.microsoft.com/office/drawing/2014/main" id="{8B88FE78-6F96-3DCE-8702-92A60FB7CA28}"/>
+                </a:ext>
+              </a:extLst>
+            </p:cNvPr>
+            <p:cNvSpPr txBox="1"/>
+            <p:nvPr/>
+          </p:nvSpPr>
+          <p:spPr>
+            <a:xfrm>
+              <a:off x="6343071" y="2466070"/>
+              <a:ext cx="1116676" cy="369332"/>
+            </a:xfrm>
+            <a:prstGeom prst="rect">
+              <a:avLst/>
+            </a:prstGeom>
+            <a:noFill/>
+          </p:spPr>
+          <p:txBody>
+            <a:bodyPr wrap="square" rtlCol="0">
+              <a:spAutoFit/>
+            </a:bodyPr>
+            <a:lstStyle/>
+            <a:p>
+              <a:r>
+                <a:rPr lang="en-US" sz="900" b="1" dirty="0">
+                  <a:solidFill>
+                    <a:schemeClr val="tx1">
+                      <a:lumMod val="65000"/>
+                      <a:lumOff val="35000"/>
+                    </a:schemeClr>
+                  </a:solidFill>
+                </a:rPr>
+                <a:t>Non-Custodial</a:t>
+              </a:r>
+            </a:p>
+            <a:p>
+              <a:r>
+                <a:rPr lang="en-US" sz="900" b="1" dirty="0">
+                  <a:solidFill>
+                    <a:schemeClr val="tx1">
+                      <a:lumMod val="65000"/>
+                      <a:lumOff val="35000"/>
+                    </a:schemeClr>
+                  </a:solidFill>
+                </a:rPr>
+                <a:t>No Fund Held</a:t>
+              </a:r>
+            </a:p>
+          </p:txBody>
+        </p:sp>
+        <p:grpSp>
+          <p:nvGrpSpPr>
+            <p:cNvPr id="97" name="Group 96">
+              <a:extLst>
+                <a:ext uri="{FF2B5EF4-FFF2-40B4-BE49-F238E27FC236}">
+                  <a16:creationId xmlns:a16="http://schemas.microsoft.com/office/drawing/2014/main" id="{DD84156C-4BAF-8F94-77FD-12851EA84B3B}"/>
+                </a:ext>
+              </a:extLst>
+            </p:cNvPr>
+            <p:cNvGrpSpPr/>
+            <p:nvPr/>
+          </p:nvGrpSpPr>
+          <p:grpSpPr>
+            <a:xfrm>
+              <a:off x="2793867" y="1876046"/>
+              <a:ext cx="3448753" cy="1546986"/>
+              <a:chOff x="2793867" y="1876046"/>
+              <a:chExt cx="3448753" cy="1546986"/>
+            </a:xfrm>
+          </p:grpSpPr>
+          <p:grpSp>
+            <p:nvGrpSpPr>
+              <p:cNvPr id="31" name="Group 30">
+                <a:extLst>
+                  <a:ext uri="{FF2B5EF4-FFF2-40B4-BE49-F238E27FC236}">
+                    <a16:creationId xmlns:a16="http://schemas.microsoft.com/office/drawing/2014/main" id="{96C0546D-8B13-8F0D-BEA6-32DB8E8068DD}"/>
+                  </a:ext>
+                </a:extLst>
+              </p:cNvPr>
+              <p:cNvGrpSpPr/>
+              <p:nvPr/>
+            </p:nvGrpSpPr>
+            <p:grpSpPr>
+              <a:xfrm>
+                <a:off x="2793867" y="1876046"/>
+                <a:ext cx="3448753" cy="1546986"/>
+                <a:chOff x="2916605" y="2654597"/>
+                <a:chExt cx="3448753" cy="1546986"/>
+              </a:xfrm>
+            </p:grpSpPr>
+            <p:sp>
+              <p:nvSpPr>
+                <p:cNvPr id="29" name="Rectangle: Diagonal Corners Rounded 28">
+                  <a:extLst>
+                    <a:ext uri="{FF2B5EF4-FFF2-40B4-BE49-F238E27FC236}">
+                      <a16:creationId xmlns:a16="http://schemas.microsoft.com/office/drawing/2014/main" id="{083B5028-9D11-4AD1-D66F-048515336B3B}"/>
+                    </a:ext>
+                  </a:extLst>
+                </p:cNvPr>
+                <p:cNvSpPr/>
+                <p:nvPr/>
+              </p:nvSpPr>
+              <p:spPr>
+                <a:xfrm>
+                  <a:off x="2916605" y="2656385"/>
+                  <a:ext cx="3448753" cy="1545198"/>
+                </a:xfrm>
+                <a:prstGeom prst="round2DiagRect">
+                  <a:avLst>
+                    <a:gd name="adj1" fmla="val 3746"/>
+                    <a:gd name="adj2" fmla="val 0"/>
+                  </a:avLst>
+                </a:prstGeom>
+                <a:gradFill>
+                  <a:gsLst>
+                    <a:gs pos="0">
+                      <a:srgbClr val="D7F2ED"/>
+                    </a:gs>
+                    <a:gs pos="48000">
+                      <a:srgbClr val="F0FCFA"/>
+                    </a:gs>
+                    <a:gs pos="97000">
+                      <a:srgbClr val="FFFFFF"/>
+                    </a:gs>
+                  </a:gsLst>
+                  <a:lin ang="18000000" scaled="0"/>
+                </a:gradFill>
+                <a:ln w="15875">
+                  <a:solidFill>
+                    <a:srgbClr val="569B96"/>
+                  </a:solidFill>
+                </a:ln>
+              </p:spPr>
+              <p:style>
+                <a:lnRef idx="0">
+                  <a:scrgbClr r="0" g="0" b="0"/>
+                </a:lnRef>
+                <a:fillRef idx="0">
+                  <a:scrgbClr r="0" g="0" b="0"/>
+                </a:fillRef>
+                <a:effectRef idx="0">
+                  <a:scrgbClr r="0" g="0" b="0"/>
+                </a:effectRef>
+                <a:fontRef idx="minor">
+                  <a:schemeClr val="lt1"/>
+                </a:fontRef>
+              </p:style>
+              <p:txBody>
+                <a:bodyPr rtlCol="0" anchor="ctr"/>
+                <a:lstStyle/>
+                <a:p>
+                  <a:pPr algn="ctr"/>
+                  <a:endParaRPr lang="en-US"/>
+                </a:p>
+              </p:txBody>
+            </p:sp>
+            <p:grpSp>
+              <p:nvGrpSpPr>
+                <p:cNvPr id="30" name="Group 29">
+                  <a:extLst>
+                    <a:ext uri="{FF2B5EF4-FFF2-40B4-BE49-F238E27FC236}">
+                      <a16:creationId xmlns:a16="http://schemas.microsoft.com/office/drawing/2014/main" id="{BD31F52D-B262-02CD-2B70-AB810AC72E46}"/>
+                    </a:ext>
+                  </a:extLst>
+                </p:cNvPr>
+                <p:cNvGrpSpPr/>
+                <p:nvPr/>
+              </p:nvGrpSpPr>
+              <p:grpSpPr>
+                <a:xfrm>
+                  <a:off x="2916605" y="2654597"/>
+                  <a:ext cx="3448753" cy="565811"/>
+                  <a:chOff x="2916605" y="2654597"/>
+                  <a:chExt cx="3448753" cy="565811"/>
+                </a:xfrm>
+              </p:grpSpPr>
+              <p:sp>
+                <p:nvSpPr>
+                  <p:cNvPr id="25" name="Rectangle: Diagonal Corners Rounded 24">
+                    <a:extLst>
+                      <a:ext uri="{FF2B5EF4-FFF2-40B4-BE49-F238E27FC236}">
+                        <a16:creationId xmlns:a16="http://schemas.microsoft.com/office/drawing/2014/main" id="{1DC31754-4F3E-B228-C6EB-7B81B0A55D3F}"/>
+                      </a:ext>
+                    </a:extLst>
+                  </p:cNvPr>
+                  <p:cNvSpPr/>
+                  <p:nvPr/>
+                </p:nvSpPr>
+                <p:spPr>
+                  <a:xfrm>
+                    <a:off x="2916605" y="2654597"/>
+                    <a:ext cx="3448753" cy="565811"/>
+                  </a:xfrm>
+                  <a:prstGeom prst="round2DiagRect">
+                    <a:avLst>
+                      <a:gd name="adj1" fmla="val 8900"/>
+                      <a:gd name="adj2" fmla="val 0"/>
+                    </a:avLst>
+                  </a:prstGeom>
+                  <a:gradFill flip="none" rotWithShape="1">
+                    <a:gsLst>
+                      <a:gs pos="0">
+                        <a:srgbClr val="417977"/>
+                      </a:gs>
+                      <a:gs pos="48000">
+                        <a:srgbClr val="569B96"/>
+                      </a:gs>
+                      <a:gs pos="98000">
+                        <a:srgbClr val="6EC3BA"/>
+                      </a:gs>
+                    </a:gsLst>
+                    <a:lin ang="18000000" scaled="0"/>
+                    <a:tileRect/>
+                  </a:gradFill>
+                  <a:ln>
+                    <a:solidFill>
+                      <a:srgbClr val="569B96"/>
+                    </a:solidFill>
+                  </a:ln>
+                </p:spPr>
+                <p:style>
+                  <a:lnRef idx="0">
+                    <a:scrgbClr r="0" g="0" b="0"/>
+                  </a:lnRef>
+                  <a:fillRef idx="0">
+                    <a:scrgbClr r="0" g="0" b="0"/>
+                  </a:fillRef>
+                  <a:effectRef idx="0">
+                    <a:scrgbClr r="0" g="0" b="0"/>
+                  </a:effectRef>
+                  <a:fontRef idx="minor">
+                    <a:schemeClr val="lt1"/>
+                  </a:fontRef>
+                </p:style>
+                <p:txBody>
+                  <a:bodyPr rtlCol="0" anchor="ctr"/>
+                  <a:lstStyle/>
+                  <a:p>
+                    <a:pPr algn="ctr"/>
+                    <a:endParaRPr lang="en-US"/>
+                  </a:p>
+                </p:txBody>
+              </p:sp>
+              <p:sp>
+                <p:nvSpPr>
+                  <p:cNvPr id="26" name="TextBox 25">
+                    <a:extLst>
+                      <a:ext uri="{FF2B5EF4-FFF2-40B4-BE49-F238E27FC236}">
+                        <a16:creationId xmlns:a16="http://schemas.microsoft.com/office/drawing/2014/main" id="{78CCE338-2317-50C5-2A77-DF330AA59827}"/>
+                      </a:ext>
+                    </a:extLst>
+                  </p:cNvPr>
+                  <p:cNvSpPr txBox="1"/>
+                  <p:nvPr/>
+                </p:nvSpPr>
+                <p:spPr>
+                  <a:xfrm>
+                    <a:off x="3540862" y="2656385"/>
+                    <a:ext cx="1624547" cy="307777"/>
+                  </a:xfrm>
+                  <a:prstGeom prst="rect">
+                    <a:avLst/>
+                  </a:prstGeom>
+                  <a:noFill/>
+                </p:spPr>
+                <p:txBody>
+                  <a:bodyPr wrap="none" rtlCol="0">
+                    <a:spAutoFit/>
+                  </a:bodyPr>
+                  <a:lstStyle/>
+                  <a:p>
+                    <a:r>
+                      <a:rPr lang="en-US" sz="1400" b="1" dirty="0">
+                        <a:solidFill>
+                          <a:schemeClr val="bg1"/>
+                        </a:solidFill>
+                      </a:rPr>
+                      <a:t>Stock</a:t>
+                    </a:r>
+                    <a:r>
+                      <a:rPr lang="en-US" sz="1400" i="1" dirty="0">
+                        <a:solidFill>
+                          <a:schemeClr val="bg1"/>
+                        </a:solidFill>
+                      </a:rPr>
+                      <a:t>Loyal</a:t>
+                    </a:r>
+                    <a:r>
+                      <a:rPr lang="en-US" sz="1400" dirty="0">
+                        <a:solidFill>
+                          <a:schemeClr val="bg1"/>
+                        </a:solidFill>
+                      </a:rPr>
+                      <a:t> Platform</a:t>
+                    </a:r>
+                  </a:p>
+                </p:txBody>
+              </p:sp>
+              <p:sp>
+                <p:nvSpPr>
+                  <p:cNvPr id="27" name="TextBox 26">
+                    <a:extLst>
+                      <a:ext uri="{FF2B5EF4-FFF2-40B4-BE49-F238E27FC236}">
+                        <a16:creationId xmlns:a16="http://schemas.microsoft.com/office/drawing/2014/main" id="{7DA7B5E9-69F5-FB88-D67E-03C67C1EFA00}"/>
+                      </a:ext>
+                    </a:extLst>
+                  </p:cNvPr>
+                  <p:cNvSpPr txBox="1"/>
+                  <p:nvPr/>
+                </p:nvSpPr>
+                <p:spPr>
+                  <a:xfrm>
+                    <a:off x="3512428" y="2902819"/>
+                    <a:ext cx="2442656" cy="246221"/>
+                  </a:xfrm>
+                  <a:prstGeom prst="rect">
+                    <a:avLst/>
+                  </a:prstGeom>
+                  <a:noFill/>
+                </p:spPr>
+                <p:txBody>
+                  <a:bodyPr wrap="none" rtlCol="0">
+                    <a:spAutoFit/>
+                  </a:bodyPr>
+                  <a:lstStyle/>
+                  <a:p>
+                    <a:r>
+                      <a:rPr lang="en-US" sz="1000" dirty="0">
+                        <a:solidFill>
+                          <a:schemeClr val="bg1"/>
+                        </a:solidFill>
+                      </a:rPr>
+                      <a:t>Conversion &amp; Order Orchestration Engine</a:t>
+                    </a:r>
+                  </a:p>
+                </p:txBody>
+              </p:sp>
+              <p:pic>
+                <p:nvPicPr>
+                  <p:cNvPr id="28" name="Graphic 27" descr="Single gear outline">
+                    <a:extLst>
+                      <a:ext uri="{FF2B5EF4-FFF2-40B4-BE49-F238E27FC236}">
+                        <a16:creationId xmlns:a16="http://schemas.microsoft.com/office/drawing/2014/main" id="{70E951BE-52B0-CF03-8E98-8A54230A9804}"/>
+                      </a:ext>
+                    </a:extLst>
+                  </p:cNvPr>
+                  <p:cNvPicPr>
+                    <a:picLocks noChangeAspect="1"/>
+                  </p:cNvPicPr>
+                  <p:nvPr/>
+                </p:nvPicPr>
+                <p:blipFill>
+                  <a:blip r:embed="rId9">
+                    <a:extLst>
+                      <a:ext uri="{96DAC541-7B7A-43D3-8B79-37D633B846F1}">
+                        <asvg:svgBlip xmlns:asvg="http://schemas.microsoft.com/office/drawing/2016/SVG/main" r:embed="rId10"/>
+                      </a:ext>
+                    </a:extLst>
+                  </a:blip>
+                  <a:stretch>
+                    <a:fillRect/>
+                  </a:stretch>
+                </p:blipFill>
+                <p:spPr>
+                  <a:xfrm>
+                    <a:off x="3000151" y="2696464"/>
+                    <a:ext cx="502680" cy="502680"/>
+                  </a:xfrm>
+                  <a:prstGeom prst="rect">
+                    <a:avLst/>
+                  </a:prstGeom>
+                </p:spPr>
+              </p:pic>
+            </p:grpSp>
+          </p:grpSp>
+          <p:sp>
+            <p:nvSpPr>
+              <p:cNvPr id="32" name="TextBox 31">
+                <a:extLst>
+                  <a:ext uri="{FF2B5EF4-FFF2-40B4-BE49-F238E27FC236}">
+                    <a16:creationId xmlns:a16="http://schemas.microsoft.com/office/drawing/2014/main" id="{9793F670-5F61-068F-D073-A4A80BC8A7A7}"/>
+                  </a:ext>
+                </a:extLst>
+              </p:cNvPr>
+              <p:cNvSpPr txBox="1"/>
+              <p:nvPr/>
+            </p:nvSpPr>
+            <p:spPr>
+              <a:xfrm>
+                <a:off x="3039942" y="2466070"/>
+                <a:ext cx="1756571" cy="923330"/>
+              </a:xfrm>
+              <a:prstGeom prst="rect">
+                <a:avLst/>
+              </a:prstGeom>
+              <a:noFill/>
+            </p:spPr>
+            <p:txBody>
+              <a:bodyPr wrap="none" rtlCol="0">
+                <a:spAutoFit/>
+              </a:bodyPr>
+              <a:lstStyle/>
+              <a:p>
+                <a:pPr marL="91440" indent="-91440">
+                  <a:buFont typeface="Arial" panose="020B0604020202020204" pitchFamily="34" charset="0"/>
+                  <a:buChar char="•"/>
+                </a:pPr>
+                <a:r>
+                  <a:rPr lang="en-US" sz="900" dirty="0">
+                    <a:solidFill>
+                      <a:schemeClr val="tx1">
+                        <a:lumMod val="65000"/>
+                        <a:lumOff val="35000"/>
+                      </a:schemeClr>
+                    </a:solidFill>
+                  </a:rPr>
+                  <a:t>Points-to-cash conversion logic</a:t>
+                </a:r>
+              </a:p>
+              <a:p>
+                <a:pPr marL="91440" indent="-91440">
+                  <a:buFont typeface="Arial" panose="020B0604020202020204" pitchFamily="34" charset="0"/>
+                  <a:buChar char="•"/>
+                </a:pPr>
+                <a:r>
+                  <a:rPr lang="en-US" sz="900" dirty="0">
+                    <a:solidFill>
+                      <a:schemeClr val="tx1">
+                        <a:lumMod val="65000"/>
+                        <a:lumOff val="35000"/>
+                      </a:schemeClr>
+                    </a:solidFill>
+                  </a:rPr>
+                  <a:t>Basket stock allocation engine</a:t>
+                </a:r>
+              </a:p>
+              <a:p>
+                <a:pPr marL="91440" indent="-91440">
+                  <a:buFont typeface="Arial" panose="020B0604020202020204" pitchFamily="34" charset="0"/>
+                  <a:buChar char="•"/>
+                </a:pPr>
+                <a:r>
+                  <a:rPr lang="en-US" sz="900" dirty="0">
+                    <a:solidFill>
+                      <a:schemeClr val="tx1">
+                        <a:lumMod val="65000"/>
+                        <a:lumOff val="35000"/>
+                      </a:schemeClr>
+                    </a:solidFill>
+                  </a:rPr>
+                  <a:t>Points reservation coordination</a:t>
+                </a:r>
+              </a:p>
+              <a:p>
+                <a:pPr marL="91440" indent="-91440">
+                  <a:buFont typeface="Arial" panose="020B0604020202020204" pitchFamily="34" charset="0"/>
+                  <a:buChar char="•"/>
+                </a:pPr>
+                <a:r>
+                  <a:rPr lang="en-US" sz="900" dirty="0">
+                    <a:solidFill>
+                      <a:schemeClr val="tx1">
+                        <a:lumMod val="65000"/>
+                        <a:lumOff val="35000"/>
+                      </a:schemeClr>
+                    </a:solidFill>
+                  </a:rPr>
+                  <a:t>Order lifecycle management</a:t>
+                </a:r>
+              </a:p>
+              <a:p>
+                <a:pPr marL="91440" indent="-91440">
+                  <a:buFont typeface="Arial" panose="020B0604020202020204" pitchFamily="34" charset="0"/>
+                  <a:buChar char="•"/>
+                </a:pPr>
+                <a:r>
+                  <a:rPr lang="en-US" sz="900" dirty="0">
+                    <a:solidFill>
+                      <a:schemeClr val="tx1">
+                        <a:lumMod val="65000"/>
+                        <a:lumOff val="35000"/>
+                      </a:schemeClr>
+                    </a:solidFill>
+                  </a:rPr>
+                  <a:t>Audit &amp; reconciliation engine</a:t>
+                </a:r>
+              </a:p>
+              <a:p>
+                <a:pPr marL="91440" indent="-91440">
+                  <a:buFont typeface="Arial" panose="020B0604020202020204" pitchFamily="34" charset="0"/>
+                  <a:buChar char="•"/>
+                </a:pPr>
+                <a:r>
+                  <a:rPr lang="en-US" sz="900" dirty="0">
+                    <a:solidFill>
+                      <a:schemeClr val="tx1">
+                        <a:lumMod val="65000"/>
+                        <a:lumOff val="35000"/>
+                      </a:schemeClr>
+                    </a:solidFill>
+                  </a:rPr>
+                  <a:t>Portfolio tracking</a:t>
+                </a:r>
+              </a:p>
+            </p:txBody>
+          </p:sp>
+          <p:sp>
+            <p:nvSpPr>
+              <p:cNvPr id="33" name="TextBox 32">
+                <a:extLst>
+                  <a:ext uri="{FF2B5EF4-FFF2-40B4-BE49-F238E27FC236}">
+                    <a16:creationId xmlns:a16="http://schemas.microsoft.com/office/drawing/2014/main" id="{F43A0C8C-2894-9D9A-CE2D-BE60FC22F758}"/>
+                  </a:ext>
+                </a:extLst>
+              </p:cNvPr>
+              <p:cNvSpPr txBox="1"/>
+              <p:nvPr/>
+            </p:nvSpPr>
+            <p:spPr>
+              <a:xfrm>
+                <a:off x="5105292" y="2752529"/>
+                <a:ext cx="1116676" cy="230832"/>
+              </a:xfrm>
+              <a:prstGeom prst="rect">
+                <a:avLst/>
+              </a:prstGeom>
+              <a:noFill/>
+            </p:spPr>
+            <p:txBody>
+              <a:bodyPr wrap="square" rtlCol="0">
+                <a:spAutoFit/>
+              </a:bodyPr>
+              <a:lstStyle/>
+              <a:p>
+                <a:r>
+                  <a:rPr lang="en-US" sz="900" b="1" dirty="0">
+                    <a:solidFill>
+                      <a:schemeClr val="tx1">
+                        <a:lumMod val="65000"/>
+                        <a:lumOff val="35000"/>
+                      </a:schemeClr>
+                    </a:solidFill>
+                  </a:rPr>
+                  <a:t>Monthly Sweeps</a:t>
+                </a:r>
+              </a:p>
+            </p:txBody>
+          </p:sp>
+          <p:pic>
+            <p:nvPicPr>
+              <p:cNvPr id="95" name="Graphic 94" descr="Repeat outline">
+                <a:extLst>
+                  <a:ext uri="{FF2B5EF4-FFF2-40B4-BE49-F238E27FC236}">
+                    <a16:creationId xmlns:a16="http://schemas.microsoft.com/office/drawing/2014/main" id="{CC24E5B5-3D47-2716-842A-265237F4112B}"/>
+                  </a:ext>
+                </a:extLst>
+              </p:cNvPr>
+              <p:cNvPicPr>
+                <a:picLocks noChangeAspect="1"/>
+              </p:cNvPicPr>
+              <p:nvPr/>
+            </p:nvPicPr>
+            <p:blipFill>
+              <a:blip r:embed="rId11">
+                <a:extLst>
+                  <a:ext uri="{96DAC541-7B7A-43D3-8B79-37D633B846F1}">
+                    <asvg:svgBlip xmlns:asvg="http://schemas.microsoft.com/office/drawing/2016/SVG/main" r:embed="rId12"/>
+                  </a:ext>
+                </a:extLst>
+              </a:blip>
+              <a:stretch>
+                <a:fillRect/>
+              </a:stretch>
+            </p:blipFill>
+            <p:spPr>
+              <a:xfrm>
+                <a:off x="4860305" y="2708665"/>
+                <a:ext cx="313230" cy="313230"/>
+              </a:xfrm>
+              <a:prstGeom prst="rect">
+                <a:avLst/>
+              </a:prstGeom>
+            </p:spPr>
+          </p:pic>
+        </p:grpSp>
+      </p:grpSp>
     </p:spTree>
     <p:extLst>
       <p:ext uri="{BB962C8B-B14F-4D97-AF65-F5344CB8AC3E}">
-        <p14:creationId xmlns:p14="http://schemas.microsoft.com/office/powerpoint/2010/main" val="4257304386"/>
+        <p14:creationId xmlns:p14="http://schemas.microsoft.com/office/powerpoint/2010/main" val="3496213380"/>
       </p:ext>
     </p:extLst>
   </p:cSld>
@@ -10303,7 +13064,7 @@
           <p:nvPr>
             <p:extLst>
               <p:ext uri="{D42A27DB-BD31-4B8C-83A1-F6EECF244321}">
-                <p14:modId xmlns:p14="http://schemas.microsoft.com/office/powerpoint/2010/main" val="821401986"/>
+                <p14:modId xmlns:p14="http://schemas.microsoft.com/office/powerpoint/2010/main" val="1498666673"/>
               </p:ext>
             </p:extLst>
           </p:nvPr>
@@ -10347,9 +13108,10 @@
           <a:lstStyle/>
           <a:p>
             <a:r>
-              <a:rPr lang="en-US" dirty="0"/>
+              <a:rPr lang="en-US"/>
               <a:t>Member Investment Process</a:t>
             </a:r>
+            <a:endParaRPr lang="en-US" dirty="0"/>
           </a:p>
         </p:txBody>
       </p:sp>
@@ -10429,7 +13191,13 @@
             </a:extLst>
           </p:cNvPr>
           <p:cNvGraphicFramePr/>
-          <p:nvPr/>
+          <p:nvPr>
+            <p:extLst>
+              <p:ext uri="{D42A27DB-BD31-4B8C-83A1-F6EECF244321}">
+                <p14:modId xmlns:p14="http://schemas.microsoft.com/office/powerpoint/2010/main" val="1920393121"/>
+              </p:ext>
+            </p:extLst>
+          </p:nvPr>
         </p:nvGraphicFramePr>
         <p:xfrm>
           <a:off x="678269" y="887197"/>
@@ -10470,9 +13238,10 @@
           <a:lstStyle/>
           <a:p>
             <a:r>
-              <a:rPr lang="en-US" dirty="0"/>
+              <a:rPr lang="en-US"/>
               <a:t>Monthly Sweep Process Pipeline</a:t>
             </a:r>
+            <a:endParaRPr lang="en-US" dirty="0"/>
           </a:p>
         </p:txBody>
       </p:sp>

</xml_diff>